<commit_message>
Apresentação V2 e Versão de PDF
</commit_message>
<xml_diff>
--- a/doc/IFSP/Diet-csharp.pptx
+++ b/doc/IFSP/Diet-csharp.pptx
@@ -10,8 +10,16 @@
     <p:sldId id="260" r:id="rId4"/>
     <p:sldId id="259" r:id="rId5"/>
     <p:sldId id="263" r:id="rId6"/>
-    <p:sldId id="261" r:id="rId7"/>
-    <p:sldId id="262" r:id="rId8"/>
+    <p:sldId id="264" r:id="rId7"/>
+    <p:sldId id="267" r:id="rId8"/>
+    <p:sldId id="268" r:id="rId9"/>
+    <p:sldId id="269" r:id="rId10"/>
+    <p:sldId id="270" r:id="rId11"/>
+    <p:sldId id="266" r:id="rId12"/>
+    <p:sldId id="265" r:id="rId13"/>
+    <p:sldId id="271" r:id="rId14"/>
+    <p:sldId id="261" r:id="rId15"/>
+    <p:sldId id="262" r:id="rId16"/>
   </p:sldIdLst>
   <p:sldSz cx="12192000" cy="6858000"/>
   <p:notesSz cx="6858000" cy="9144000"/>
@@ -3531,6 +3539,1592 @@
 </p:sld>
 </file>
 
+<file path=ppt/slides/slide10.xml><?xml version="1.0" encoding="utf-8"?>
+<p:sld xmlns:a="http://schemas.openxmlformats.org/drawingml/2006/main" xmlns:r="http://schemas.openxmlformats.org/officeDocument/2006/relationships" xmlns:p="http://schemas.openxmlformats.org/presentationml/2006/main">
+  <p:cSld>
+    <p:bg>
+      <p:bgPr>
+        <a:solidFill>
+          <a:srgbClr val="5B616F"/>
+        </a:solidFill>
+        <a:effectLst/>
+      </p:bgPr>
+    </p:bg>
+    <p:spTree>
+      <p:nvGrpSpPr>
+        <p:cNvPr id="1" name=""/>
+        <p:cNvGrpSpPr/>
+        <p:nvPr/>
+      </p:nvGrpSpPr>
+      <p:grpSpPr>
+        <a:xfrm>
+          <a:off x="0" y="0"/>
+          <a:ext cx="0" cy="0"/>
+          <a:chOff x="0" y="0"/>
+          <a:chExt cx="0" cy="0"/>
+        </a:xfrm>
+      </p:grpSpPr>
+      <p:sp>
+        <p:nvSpPr>
+          <p:cNvPr id="2" name="Retângulo 1">
+            <a:extLst>
+              <a:ext uri="{FF2B5EF4-FFF2-40B4-BE49-F238E27FC236}">
+                <a16:creationId xmlns:a16="http://schemas.microsoft.com/office/drawing/2014/main" id="{8C911EF0-0065-4173-87F6-89015AA6DCA1}"/>
+              </a:ext>
+            </a:extLst>
+          </p:cNvPr>
+          <p:cNvSpPr/>
+          <p:nvPr/>
+        </p:nvSpPr>
+        <p:spPr>
+          <a:xfrm rot="5400000">
+            <a:off x="5542547" y="-5542545"/>
+            <a:ext cx="1106907" cy="12192000"/>
+          </a:xfrm>
+          <a:prstGeom prst="rect">
+            <a:avLst/>
+          </a:prstGeom>
+          <a:solidFill>
+            <a:srgbClr val="DBA1A1"/>
+          </a:solidFill>
+          <a:ln>
+            <a:noFill/>
+          </a:ln>
+        </p:spPr>
+        <p:style>
+          <a:lnRef idx="2">
+            <a:schemeClr val="accent1">
+              <a:shade val="50000"/>
+            </a:schemeClr>
+          </a:lnRef>
+          <a:fillRef idx="1">
+            <a:schemeClr val="accent1"/>
+          </a:fillRef>
+          <a:effectRef idx="0">
+            <a:schemeClr val="accent1"/>
+          </a:effectRef>
+          <a:fontRef idx="minor">
+            <a:schemeClr val="lt1"/>
+          </a:fontRef>
+        </p:style>
+        <p:txBody>
+          <a:bodyPr rtlCol="0" anchor="ctr"/>
+          <a:lstStyle/>
+          <a:p>
+            <a:pPr algn="ctr"/>
+            <a:endParaRPr lang="pt-BR" dirty="0">
+              <a:ln>
+                <a:solidFill>
+                  <a:srgbClr val="DBA1A1"/>
+                </a:solidFill>
+              </a:ln>
+              <a:solidFill>
+                <a:srgbClr val="DBA1A1"/>
+              </a:solidFill>
+            </a:endParaRPr>
+          </a:p>
+        </p:txBody>
+      </p:sp>
+      <p:sp>
+        <p:nvSpPr>
+          <p:cNvPr id="3" name="CaixaDeTexto 2">
+            <a:extLst>
+              <a:ext uri="{FF2B5EF4-FFF2-40B4-BE49-F238E27FC236}">
+                <a16:creationId xmlns:a16="http://schemas.microsoft.com/office/drawing/2014/main" id="{EA906822-E252-4415-BE2C-766952557E58}"/>
+              </a:ext>
+            </a:extLst>
+          </p:cNvPr>
+          <p:cNvSpPr txBox="1"/>
+          <p:nvPr/>
+        </p:nvSpPr>
+        <p:spPr>
+          <a:xfrm>
+            <a:off x="3043797" y="199512"/>
+            <a:ext cx="6658133" cy="707886"/>
+          </a:xfrm>
+          <a:prstGeom prst="rect">
+            <a:avLst/>
+          </a:prstGeom>
+          <a:noFill/>
+        </p:spPr>
+        <p:txBody>
+          <a:bodyPr wrap="square" rtlCol="0">
+            <a:spAutoFit/>
+          </a:bodyPr>
+          <a:lstStyle/>
+          <a:p>
+            <a:pPr algn="ctr"/>
+            <a:r>
+              <a:rPr lang="pt-BR" sz="4000" dirty="0">
+                <a:solidFill>
+                  <a:srgbClr val="5B616F"/>
+                </a:solidFill>
+                <a:latin typeface="Agency FB" panose="020B0503020202020204" pitchFamily="34" charset="0"/>
+              </a:rPr>
+              <a:t>Requisitos Funcionais e Não Funcionais</a:t>
+            </a:r>
+          </a:p>
+        </p:txBody>
+      </p:sp>
+      <p:graphicFrame>
+        <p:nvGraphicFramePr>
+          <p:cNvPr id="4" name="Tabela 4">
+            <a:extLst>
+              <a:ext uri="{FF2B5EF4-FFF2-40B4-BE49-F238E27FC236}">
+                <a16:creationId xmlns:a16="http://schemas.microsoft.com/office/drawing/2014/main" id="{0D65BD39-23AE-4817-883A-7F07F263DD1C}"/>
+              </a:ext>
+            </a:extLst>
+          </p:cNvPr>
+          <p:cNvGraphicFramePr>
+            <a:graphicFrameLocks noGrp="1"/>
+          </p:cNvGraphicFramePr>
+          <p:nvPr>
+            <p:extLst>
+              <p:ext uri="{D42A27DB-BD31-4B8C-83A1-F6EECF244321}">
+                <p14:modId xmlns:p14="http://schemas.microsoft.com/office/powerpoint/2010/main" val="3968153120"/>
+              </p:ext>
+            </p:extLst>
+          </p:nvPr>
+        </p:nvGraphicFramePr>
+        <p:xfrm>
+          <a:off x="818545" y="2471427"/>
+          <a:ext cx="10853490" cy="3022600"/>
+        </p:xfrm>
+        <a:graphic>
+          <a:graphicData uri="http://schemas.openxmlformats.org/drawingml/2006/table">
+            <a:tbl>
+              <a:tblPr firstRow="1" bandRow="1">
+                <a:tableStyleId>{5C22544A-7EE6-4342-B048-85BDC9FD1C3A}</a:tableStyleId>
+              </a:tblPr>
+              <a:tblGrid>
+                <a:gridCol w="5426745">
+                  <a:extLst>
+                    <a:ext uri="{9D8B030D-6E8A-4147-A177-3AD203B41FA5}">
+                      <a16:colId xmlns:a16="http://schemas.microsoft.com/office/drawing/2014/main" val="2504239251"/>
+                    </a:ext>
+                  </a:extLst>
+                </a:gridCol>
+                <a:gridCol w="5426745">
+                  <a:extLst>
+                    <a:ext uri="{9D8B030D-6E8A-4147-A177-3AD203B41FA5}">
+                      <a16:colId xmlns:a16="http://schemas.microsoft.com/office/drawing/2014/main" val="354975263"/>
+                    </a:ext>
+                  </a:extLst>
+                </a:gridCol>
+              </a:tblGrid>
+              <a:tr h="370840">
+                <a:tc>
+                  <a:txBody>
+                    <a:bodyPr/>
+                    <a:lstStyle/>
+                    <a:p>
+                      <a:r>
+                        <a:rPr lang="pt-BR" dirty="0">
+                          <a:solidFill>
+                            <a:srgbClr val="DBA1A1"/>
+                          </a:solidFill>
+                          <a:latin typeface="Agency FB" panose="020B0503020202020204" pitchFamily="34" charset="0"/>
+                        </a:rPr>
+                        <a:t>Funcional</a:t>
+                      </a:r>
+                    </a:p>
+                  </a:txBody>
+                  <a:tcPr>
+                    <a:lnL w="12700" cap="flat" cmpd="sng" algn="ctr">
+                      <a:noFill/>
+                      <a:prstDash val="solid"/>
+                      <a:round/>
+                      <a:headEnd type="none" w="med" len="med"/>
+                      <a:tailEnd type="none" w="med" len="med"/>
+                    </a:lnL>
+                    <a:lnR w="12700" cap="flat" cmpd="sng" algn="ctr">
+                      <a:noFill/>
+                      <a:prstDash val="solid"/>
+                      <a:round/>
+                      <a:headEnd type="none" w="med" len="med"/>
+                      <a:tailEnd type="none" w="med" len="med"/>
+                    </a:lnR>
+                    <a:lnT w="12700" cap="flat" cmpd="sng" algn="ctr">
+                      <a:noFill/>
+                      <a:prstDash val="solid"/>
+                      <a:round/>
+                      <a:headEnd type="none" w="med" len="med"/>
+                      <a:tailEnd type="none" w="med" len="med"/>
+                    </a:lnT>
+                    <a:lnB w="12700" cap="flat" cmpd="sng" algn="ctr">
+                      <a:noFill/>
+                      <a:prstDash val="solid"/>
+                      <a:round/>
+                      <a:headEnd type="none" w="med" len="med"/>
+                      <a:tailEnd type="none" w="med" len="med"/>
+                    </a:lnB>
+                    <a:lnTlToBr w="12700" cmpd="sng">
+                      <a:noFill/>
+                      <a:prstDash val="solid"/>
+                    </a:lnTlToBr>
+                    <a:lnBlToTr w="12700" cmpd="sng">
+                      <a:noFill/>
+                      <a:prstDash val="solid"/>
+                    </a:lnBlToTr>
+                    <a:solidFill>
+                      <a:srgbClr val="5B616F"/>
+                    </a:solidFill>
+                  </a:tcPr>
+                </a:tc>
+                <a:tc>
+                  <a:txBody>
+                    <a:bodyPr/>
+                    <a:lstStyle/>
+                    <a:p>
+                      <a:r>
+                        <a:rPr lang="pt-BR" dirty="0">
+                          <a:solidFill>
+                            <a:srgbClr val="DBA1A1"/>
+                          </a:solidFill>
+                          <a:latin typeface="Agency FB" panose="020B0503020202020204" pitchFamily="34" charset="0"/>
+                        </a:rPr>
+                        <a:t>Não Funcional</a:t>
+                      </a:r>
+                    </a:p>
+                  </a:txBody>
+                  <a:tcPr>
+                    <a:lnL w="12700" cap="flat" cmpd="sng" algn="ctr">
+                      <a:noFill/>
+                      <a:prstDash val="solid"/>
+                      <a:round/>
+                      <a:headEnd type="none" w="med" len="med"/>
+                      <a:tailEnd type="none" w="med" len="med"/>
+                    </a:lnL>
+                    <a:lnR w="12700" cap="flat" cmpd="sng" algn="ctr">
+                      <a:noFill/>
+                      <a:prstDash val="solid"/>
+                      <a:round/>
+                      <a:headEnd type="none" w="med" len="med"/>
+                      <a:tailEnd type="none" w="med" len="med"/>
+                    </a:lnR>
+                    <a:lnT w="12700" cap="flat" cmpd="sng" algn="ctr">
+                      <a:noFill/>
+                      <a:prstDash val="solid"/>
+                      <a:round/>
+                      <a:headEnd type="none" w="med" len="med"/>
+                      <a:tailEnd type="none" w="med" len="med"/>
+                    </a:lnT>
+                    <a:lnB w="12700" cap="flat" cmpd="sng" algn="ctr">
+                      <a:noFill/>
+                      <a:prstDash val="solid"/>
+                      <a:round/>
+                      <a:headEnd type="none" w="med" len="med"/>
+                      <a:tailEnd type="none" w="med" len="med"/>
+                    </a:lnB>
+                    <a:lnTlToBr w="12700" cmpd="sng">
+                      <a:noFill/>
+                      <a:prstDash val="solid"/>
+                    </a:lnTlToBr>
+                    <a:lnBlToTr w="12700" cmpd="sng">
+                      <a:noFill/>
+                      <a:prstDash val="solid"/>
+                    </a:lnBlToTr>
+                    <a:solidFill>
+                      <a:srgbClr val="5B616F"/>
+                    </a:solidFill>
+                  </a:tcPr>
+                </a:tc>
+                <a:extLst>
+                  <a:ext uri="{0D108BD9-81ED-4DB2-BD59-A6C34878D82A}">
+                    <a16:rowId xmlns:a16="http://schemas.microsoft.com/office/drawing/2014/main" val="2395872218"/>
+                  </a:ext>
+                </a:extLst>
+              </a:tr>
+              <a:tr h="370840">
+                <a:tc rowSpan="2">
+                  <a:txBody>
+                    <a:bodyPr/>
+                    <a:lstStyle/>
+                    <a:p>
+                      <a:pPr algn="l"/>
+                      <a:r>
+                        <a:rPr lang="pt-BR" sz="1800" kern="1200" dirty="0">
+                          <a:solidFill>
+                            <a:srgbClr val="DBA1A1"/>
+                          </a:solidFill>
+                          <a:effectLst/>
+                          <a:latin typeface="Agency FB" panose="020B0503020202020204" pitchFamily="34" charset="0"/>
+                          <a:ea typeface="+mn-ea"/>
+                          <a:cs typeface="+mn-cs"/>
+                        </a:rPr>
+                        <a:t>Login -  O usuário deve efetuar um login para que possa usar o programa.</a:t>
+                      </a:r>
+                      <a:endParaRPr lang="pt-BR" dirty="0">
+                        <a:solidFill>
+                          <a:srgbClr val="DBA1A1"/>
+                        </a:solidFill>
+                        <a:latin typeface="Agency FB" panose="020B0503020202020204" pitchFamily="34" charset="0"/>
+                      </a:endParaRPr>
+                    </a:p>
+                  </a:txBody>
+                  <a:tcPr>
+                    <a:lnL w="12700" cap="flat" cmpd="sng" algn="ctr">
+                      <a:noFill/>
+                      <a:prstDash val="solid"/>
+                      <a:round/>
+                      <a:headEnd type="none" w="med" len="med"/>
+                      <a:tailEnd type="none" w="med" len="med"/>
+                    </a:lnL>
+                    <a:lnR w="12700" cap="flat" cmpd="sng" algn="ctr">
+                      <a:noFill/>
+                      <a:prstDash val="solid"/>
+                      <a:round/>
+                      <a:headEnd type="none" w="med" len="med"/>
+                      <a:tailEnd type="none" w="med" len="med"/>
+                    </a:lnR>
+                    <a:lnT w="12700" cap="flat" cmpd="sng" algn="ctr">
+                      <a:noFill/>
+                      <a:prstDash val="solid"/>
+                      <a:round/>
+                      <a:headEnd type="none" w="med" len="med"/>
+                      <a:tailEnd type="none" w="med" len="med"/>
+                    </a:lnT>
+                    <a:lnB w="12700" cap="flat" cmpd="sng" algn="ctr">
+                      <a:noFill/>
+                      <a:prstDash val="solid"/>
+                      <a:round/>
+                      <a:headEnd type="none" w="med" len="med"/>
+                      <a:tailEnd type="none" w="med" len="med"/>
+                    </a:lnB>
+                    <a:lnTlToBr w="12700" cmpd="sng">
+                      <a:noFill/>
+                      <a:prstDash val="solid"/>
+                    </a:lnTlToBr>
+                    <a:lnBlToTr w="12700" cmpd="sng">
+                      <a:noFill/>
+                      <a:prstDash val="solid"/>
+                    </a:lnBlToTr>
+                    <a:solidFill>
+                      <a:srgbClr val="5B616F"/>
+                    </a:solidFill>
+                  </a:tcPr>
+                </a:tc>
+                <a:tc>
+                  <a:txBody>
+                    <a:bodyPr/>
+                    <a:lstStyle/>
+                    <a:p>
+                      <a:pPr marL="0" marR="0" lvl="0" indent="0" algn="l" defTabSz="914400" rtl="0" eaLnBrk="1" fontAlgn="auto" latinLnBrk="0" hangingPunct="1">
+                        <a:lnSpc>
+                          <a:spcPct val="100000"/>
+                        </a:lnSpc>
+                        <a:spcBef>
+                          <a:spcPts val="0"/>
+                        </a:spcBef>
+                        <a:spcAft>
+                          <a:spcPts val="0"/>
+                        </a:spcAft>
+                        <a:buClrTx/>
+                        <a:buSzTx/>
+                        <a:buFontTx/>
+                        <a:buNone/>
+                        <a:tabLst/>
+                        <a:defRPr/>
+                      </a:pPr>
+                      <a:r>
+                        <a:rPr lang="pt-BR" sz="1800" kern="1200" dirty="0">
+                          <a:solidFill>
+                            <a:srgbClr val="DBA1A1"/>
+                          </a:solidFill>
+                          <a:effectLst/>
+                          <a:latin typeface="Agency FB" panose="020B0503020202020204" pitchFamily="34" charset="0"/>
+                          <a:ea typeface="+mn-ea"/>
+                          <a:cs typeface="+mn-cs"/>
+                        </a:rPr>
+                        <a:t>Ocultar a senha</a:t>
+                      </a:r>
+                    </a:p>
+                    <a:p>
+                      <a:pPr marL="0" marR="0" lvl="0" indent="0" algn="l" defTabSz="914400" rtl="0" eaLnBrk="1" fontAlgn="auto" latinLnBrk="0" hangingPunct="1">
+                        <a:lnSpc>
+                          <a:spcPct val="100000"/>
+                        </a:lnSpc>
+                        <a:spcBef>
+                          <a:spcPts val="0"/>
+                        </a:spcBef>
+                        <a:spcAft>
+                          <a:spcPts val="0"/>
+                        </a:spcAft>
+                        <a:buClrTx/>
+                        <a:buSzTx/>
+                        <a:buFontTx/>
+                        <a:buNone/>
+                        <a:tabLst/>
+                        <a:defRPr/>
+                      </a:pPr>
+                      <a:r>
+                        <a:rPr lang="pt-BR" sz="1800" kern="1200" dirty="0">
+                          <a:solidFill>
+                            <a:srgbClr val="DBA1A1"/>
+                          </a:solidFill>
+                          <a:effectLst/>
+                          <a:latin typeface="Agency FB" panose="020B0503020202020204" pitchFamily="34" charset="0"/>
+                          <a:ea typeface="+mn-ea"/>
+                          <a:cs typeface="+mn-cs"/>
+                        </a:rPr>
+                        <a:t>- Enquanto digita a senha devem aparecer * no lugar do que é digitado.	Segurança</a:t>
+                      </a:r>
+                    </a:p>
+                    <a:p>
+                      <a:r>
+                        <a:rPr lang="pt-BR" sz="1800" kern="1200" dirty="0">
+                          <a:solidFill>
+                            <a:srgbClr val="DBA1A1"/>
+                          </a:solidFill>
+                          <a:effectLst/>
+                          <a:latin typeface="Agency FB" panose="020B0503020202020204" pitchFamily="34" charset="0"/>
+                          <a:ea typeface="+mn-ea"/>
+                          <a:cs typeface="+mn-cs"/>
+                        </a:rPr>
+                        <a:t>	Obrigatório</a:t>
+                      </a:r>
+                    </a:p>
+                  </a:txBody>
+                  <a:tcPr>
+                    <a:lnL w="12700" cap="flat" cmpd="sng" algn="ctr">
+                      <a:noFill/>
+                      <a:prstDash val="solid"/>
+                      <a:round/>
+                      <a:headEnd type="none" w="med" len="med"/>
+                      <a:tailEnd type="none" w="med" len="med"/>
+                    </a:lnL>
+                    <a:lnR w="12700" cap="flat" cmpd="sng" algn="ctr">
+                      <a:noFill/>
+                      <a:prstDash val="solid"/>
+                      <a:round/>
+                      <a:headEnd type="none" w="med" len="med"/>
+                      <a:tailEnd type="none" w="med" len="med"/>
+                    </a:lnR>
+                    <a:lnT w="12700" cap="flat" cmpd="sng" algn="ctr">
+                      <a:noFill/>
+                      <a:prstDash val="solid"/>
+                      <a:round/>
+                      <a:headEnd type="none" w="med" len="med"/>
+                      <a:tailEnd type="none" w="med" len="med"/>
+                    </a:lnT>
+                    <a:lnB w="12700" cap="flat" cmpd="sng" algn="ctr">
+                      <a:noFill/>
+                      <a:prstDash val="solid"/>
+                      <a:round/>
+                      <a:headEnd type="none" w="med" len="med"/>
+                      <a:tailEnd type="none" w="med" len="med"/>
+                    </a:lnB>
+                    <a:lnTlToBr w="12700" cmpd="sng">
+                      <a:noFill/>
+                      <a:prstDash val="solid"/>
+                    </a:lnTlToBr>
+                    <a:lnBlToTr w="12700" cmpd="sng">
+                      <a:noFill/>
+                      <a:prstDash val="solid"/>
+                    </a:lnBlToTr>
+                    <a:solidFill>
+                      <a:srgbClr val="5B616F"/>
+                    </a:solidFill>
+                  </a:tcPr>
+                </a:tc>
+                <a:extLst>
+                  <a:ext uri="{0D108BD9-81ED-4DB2-BD59-A6C34878D82A}">
+                    <a16:rowId xmlns:a16="http://schemas.microsoft.com/office/drawing/2014/main" val="3034851657"/>
+                  </a:ext>
+                </a:extLst>
+              </a:tr>
+              <a:tr h="370840">
+                <a:tc vMerge="1">
+                  <a:txBody>
+                    <a:bodyPr/>
+                    <a:lstStyle/>
+                    <a:p>
+                      <a:pPr algn="l"/>
+                      <a:endParaRPr lang="pt-BR" dirty="0">
+                        <a:solidFill>
+                          <a:srgbClr val="DBA1A1"/>
+                        </a:solidFill>
+                        <a:latin typeface="Agency FB" panose="020B0503020202020204" pitchFamily="34" charset="0"/>
+                      </a:endParaRPr>
+                    </a:p>
+                  </a:txBody>
+                  <a:tcPr>
+                    <a:lnL w="12700" cap="flat" cmpd="sng" algn="ctr">
+                      <a:noFill/>
+                      <a:prstDash val="solid"/>
+                      <a:round/>
+                      <a:headEnd type="none" w="med" len="med"/>
+                      <a:tailEnd type="none" w="med" len="med"/>
+                    </a:lnL>
+                    <a:lnR w="12700" cap="flat" cmpd="sng" algn="ctr">
+                      <a:noFill/>
+                      <a:prstDash val="solid"/>
+                      <a:round/>
+                      <a:headEnd type="none" w="med" len="med"/>
+                      <a:tailEnd type="none" w="med" len="med"/>
+                    </a:lnR>
+                    <a:lnT w="12700" cap="flat" cmpd="sng" algn="ctr">
+                      <a:noFill/>
+                      <a:prstDash val="solid"/>
+                      <a:round/>
+                      <a:headEnd type="none" w="med" len="med"/>
+                      <a:tailEnd type="none" w="med" len="med"/>
+                    </a:lnT>
+                    <a:lnB w="12700" cap="flat" cmpd="sng" algn="ctr">
+                      <a:noFill/>
+                      <a:prstDash val="solid"/>
+                      <a:round/>
+                      <a:headEnd type="none" w="med" len="med"/>
+                      <a:tailEnd type="none" w="med" len="med"/>
+                    </a:lnB>
+                    <a:lnTlToBr w="12700" cmpd="sng">
+                      <a:noFill/>
+                      <a:prstDash val="solid"/>
+                    </a:lnTlToBr>
+                    <a:lnBlToTr w="12700" cmpd="sng">
+                      <a:noFill/>
+                      <a:prstDash val="solid"/>
+                    </a:lnBlToTr>
+                    <a:solidFill>
+                      <a:srgbClr val="5B616F"/>
+                    </a:solidFill>
+                  </a:tcPr>
+                </a:tc>
+                <a:tc>
+                  <a:txBody>
+                    <a:bodyPr/>
+                    <a:lstStyle/>
+                    <a:p>
+                      <a:pPr marL="0" marR="0" lvl="0" indent="0" algn="l" defTabSz="914400" rtl="0" eaLnBrk="1" fontAlgn="auto" latinLnBrk="0" hangingPunct="1">
+                        <a:lnSpc>
+                          <a:spcPct val="100000"/>
+                        </a:lnSpc>
+                        <a:spcBef>
+                          <a:spcPts val="0"/>
+                        </a:spcBef>
+                        <a:spcAft>
+                          <a:spcPts val="0"/>
+                        </a:spcAft>
+                        <a:buClrTx/>
+                        <a:buSzTx/>
+                        <a:buFontTx/>
+                        <a:buNone/>
+                        <a:tabLst/>
+                        <a:defRPr/>
+                      </a:pPr>
+                      <a:r>
+                        <a:rPr lang="pt-BR" sz="1800" kern="1200" dirty="0">
+                          <a:solidFill>
+                            <a:srgbClr val="DBA1A1"/>
+                          </a:solidFill>
+                          <a:effectLst/>
+                          <a:latin typeface="Agency FB" panose="020B0503020202020204" pitchFamily="34" charset="0"/>
+                          <a:ea typeface="+mn-ea"/>
+                          <a:cs typeface="+mn-cs"/>
+                        </a:rPr>
+                        <a:t>Separar o tipo de usuário.</a:t>
+                      </a:r>
+                    </a:p>
+                    <a:p>
+                      <a:pPr marL="0" marR="0" lvl="0" indent="0" algn="l" defTabSz="914400" rtl="0" eaLnBrk="1" fontAlgn="auto" latinLnBrk="0" hangingPunct="1">
+                        <a:lnSpc>
+                          <a:spcPct val="100000"/>
+                        </a:lnSpc>
+                        <a:spcBef>
+                          <a:spcPts val="0"/>
+                        </a:spcBef>
+                        <a:spcAft>
+                          <a:spcPts val="0"/>
+                        </a:spcAft>
+                        <a:buClrTx/>
+                        <a:buSzTx/>
+                        <a:buFontTx/>
+                        <a:buNone/>
+                        <a:tabLst/>
+                        <a:defRPr/>
+                      </a:pPr>
+                      <a:r>
+                        <a:rPr lang="pt-BR" sz="1800" kern="1200" dirty="0">
+                          <a:solidFill>
+                            <a:srgbClr val="DBA1A1"/>
+                          </a:solidFill>
+                          <a:effectLst/>
+                          <a:latin typeface="Agency FB" panose="020B0503020202020204" pitchFamily="34" charset="0"/>
+                          <a:ea typeface="+mn-ea"/>
+                          <a:cs typeface="+mn-cs"/>
+                        </a:rPr>
+                        <a:t>- O login deve conter a função de levar o usuário a sua tela correta, o nutricionista para seu menu e o paciente para o dele..	Usabilidade/Segurança</a:t>
+                      </a:r>
+                    </a:p>
+                    <a:p>
+                      <a:r>
+                        <a:rPr lang="pt-BR" sz="1800" kern="1200" dirty="0">
+                          <a:solidFill>
+                            <a:srgbClr val="DBA1A1"/>
+                          </a:solidFill>
+                          <a:effectLst/>
+                          <a:latin typeface="Agency FB" panose="020B0503020202020204" pitchFamily="34" charset="0"/>
+                          <a:ea typeface="+mn-ea"/>
+                          <a:cs typeface="+mn-cs"/>
+                        </a:rPr>
+                        <a:t>	Obrigatório</a:t>
+                      </a:r>
+                    </a:p>
+                  </a:txBody>
+                  <a:tcPr>
+                    <a:lnL w="12700" cap="flat" cmpd="sng" algn="ctr">
+                      <a:noFill/>
+                      <a:prstDash val="solid"/>
+                      <a:round/>
+                      <a:headEnd type="none" w="med" len="med"/>
+                      <a:tailEnd type="none" w="med" len="med"/>
+                    </a:lnL>
+                    <a:lnR w="12700" cap="flat" cmpd="sng" algn="ctr">
+                      <a:noFill/>
+                      <a:prstDash val="solid"/>
+                      <a:round/>
+                      <a:headEnd type="none" w="med" len="med"/>
+                      <a:tailEnd type="none" w="med" len="med"/>
+                    </a:lnR>
+                    <a:lnT w="12700" cap="flat" cmpd="sng" algn="ctr">
+                      <a:noFill/>
+                      <a:prstDash val="solid"/>
+                      <a:round/>
+                      <a:headEnd type="none" w="med" len="med"/>
+                      <a:tailEnd type="none" w="med" len="med"/>
+                    </a:lnT>
+                    <a:lnB w="12700" cap="flat" cmpd="sng" algn="ctr">
+                      <a:noFill/>
+                      <a:prstDash val="solid"/>
+                      <a:round/>
+                      <a:headEnd type="none" w="med" len="med"/>
+                      <a:tailEnd type="none" w="med" len="med"/>
+                    </a:lnB>
+                    <a:lnTlToBr w="12700" cmpd="sng">
+                      <a:noFill/>
+                      <a:prstDash val="solid"/>
+                    </a:lnTlToBr>
+                    <a:lnBlToTr w="12700" cmpd="sng">
+                      <a:noFill/>
+                      <a:prstDash val="solid"/>
+                    </a:lnBlToTr>
+                    <a:solidFill>
+                      <a:srgbClr val="5B616F"/>
+                    </a:solidFill>
+                  </a:tcPr>
+                </a:tc>
+                <a:extLst>
+                  <a:ext uri="{0D108BD9-81ED-4DB2-BD59-A6C34878D82A}">
+                    <a16:rowId xmlns:a16="http://schemas.microsoft.com/office/drawing/2014/main" val="1001868768"/>
+                  </a:ext>
+                </a:extLst>
+              </a:tr>
+            </a:tbl>
+          </a:graphicData>
+        </a:graphic>
+      </p:graphicFrame>
+    </p:spTree>
+    <p:extLst>
+      <p:ext uri="{BB962C8B-B14F-4D97-AF65-F5344CB8AC3E}">
+        <p14:creationId xmlns:p14="http://schemas.microsoft.com/office/powerpoint/2010/main" val="1348566746"/>
+      </p:ext>
+    </p:extLst>
+  </p:cSld>
+  <p:clrMapOvr>
+    <a:masterClrMapping/>
+  </p:clrMapOvr>
+</p:sld>
+</file>
+
+<file path=ppt/slides/slide11.xml><?xml version="1.0" encoding="utf-8"?>
+<p:sld xmlns:a="http://schemas.openxmlformats.org/drawingml/2006/main" xmlns:r="http://schemas.openxmlformats.org/officeDocument/2006/relationships" xmlns:p="http://schemas.openxmlformats.org/presentationml/2006/main">
+  <p:cSld>
+    <p:bg>
+      <p:bgPr>
+        <a:solidFill>
+          <a:srgbClr val="5B616F"/>
+        </a:solidFill>
+        <a:effectLst/>
+      </p:bgPr>
+    </p:bg>
+    <p:spTree>
+      <p:nvGrpSpPr>
+        <p:cNvPr id="1" name=""/>
+        <p:cNvGrpSpPr/>
+        <p:nvPr/>
+      </p:nvGrpSpPr>
+      <p:grpSpPr>
+        <a:xfrm>
+          <a:off x="0" y="0"/>
+          <a:ext cx="0" cy="0"/>
+          <a:chOff x="0" y="0"/>
+          <a:chExt cx="0" cy="0"/>
+        </a:xfrm>
+      </p:grpSpPr>
+      <p:sp>
+        <p:nvSpPr>
+          <p:cNvPr id="2" name="Retângulo 1">
+            <a:extLst>
+              <a:ext uri="{FF2B5EF4-FFF2-40B4-BE49-F238E27FC236}">
+                <a16:creationId xmlns:a16="http://schemas.microsoft.com/office/drawing/2014/main" id="{8C911EF0-0065-4173-87F6-89015AA6DCA1}"/>
+              </a:ext>
+            </a:extLst>
+          </p:cNvPr>
+          <p:cNvSpPr/>
+          <p:nvPr/>
+        </p:nvSpPr>
+        <p:spPr>
+          <a:xfrm rot="5400000">
+            <a:off x="5542547" y="-5542545"/>
+            <a:ext cx="1106907" cy="12192000"/>
+          </a:xfrm>
+          <a:prstGeom prst="rect">
+            <a:avLst/>
+          </a:prstGeom>
+          <a:solidFill>
+            <a:srgbClr val="DBA1A1"/>
+          </a:solidFill>
+          <a:ln>
+            <a:noFill/>
+          </a:ln>
+        </p:spPr>
+        <p:style>
+          <a:lnRef idx="2">
+            <a:schemeClr val="accent1">
+              <a:shade val="50000"/>
+            </a:schemeClr>
+          </a:lnRef>
+          <a:fillRef idx="1">
+            <a:schemeClr val="accent1"/>
+          </a:fillRef>
+          <a:effectRef idx="0">
+            <a:schemeClr val="accent1"/>
+          </a:effectRef>
+          <a:fontRef idx="minor">
+            <a:schemeClr val="lt1"/>
+          </a:fontRef>
+        </p:style>
+        <p:txBody>
+          <a:bodyPr rtlCol="0" anchor="ctr"/>
+          <a:lstStyle/>
+          <a:p>
+            <a:pPr algn="ctr"/>
+            <a:endParaRPr lang="pt-BR" dirty="0">
+              <a:ln>
+                <a:solidFill>
+                  <a:srgbClr val="DBA1A1"/>
+                </a:solidFill>
+              </a:ln>
+              <a:solidFill>
+                <a:srgbClr val="DBA1A1"/>
+              </a:solidFill>
+            </a:endParaRPr>
+          </a:p>
+        </p:txBody>
+      </p:sp>
+      <p:sp>
+        <p:nvSpPr>
+          <p:cNvPr id="3" name="CaixaDeTexto 2">
+            <a:extLst>
+              <a:ext uri="{FF2B5EF4-FFF2-40B4-BE49-F238E27FC236}">
+                <a16:creationId xmlns:a16="http://schemas.microsoft.com/office/drawing/2014/main" id="{EA906822-E252-4415-BE2C-766952557E58}"/>
+              </a:ext>
+            </a:extLst>
+          </p:cNvPr>
+          <p:cNvSpPr txBox="1"/>
+          <p:nvPr/>
+        </p:nvSpPr>
+        <p:spPr>
+          <a:xfrm>
+            <a:off x="4381709" y="199512"/>
+            <a:ext cx="3428582" cy="707886"/>
+          </a:xfrm>
+          <a:prstGeom prst="rect">
+            <a:avLst/>
+          </a:prstGeom>
+          <a:noFill/>
+        </p:spPr>
+        <p:txBody>
+          <a:bodyPr wrap="square" rtlCol="0">
+            <a:spAutoFit/>
+          </a:bodyPr>
+          <a:lstStyle/>
+          <a:p>
+            <a:pPr algn="ctr"/>
+            <a:r>
+              <a:rPr lang="pt-BR" sz="4000" dirty="0">
+                <a:solidFill>
+                  <a:srgbClr val="5B616F"/>
+                </a:solidFill>
+                <a:latin typeface="Agency FB" panose="020B0503020202020204" pitchFamily="34" charset="0"/>
+              </a:rPr>
+              <a:t>Caso de Uso</a:t>
+            </a:r>
+          </a:p>
+        </p:txBody>
+      </p:sp>
+      <p:pic>
+        <p:nvPicPr>
+          <p:cNvPr id="19" name="Imagem 18">
+            <a:extLst>
+              <a:ext uri="{FF2B5EF4-FFF2-40B4-BE49-F238E27FC236}">
+                <a16:creationId xmlns:a16="http://schemas.microsoft.com/office/drawing/2014/main" id="{68F9BA98-58CA-4DC5-A29B-F8F546FD2A49}"/>
+              </a:ext>
+            </a:extLst>
+          </p:cNvPr>
+          <p:cNvPicPr>
+            <a:picLocks noChangeAspect="1"/>
+          </p:cNvPicPr>
+          <p:nvPr/>
+        </p:nvPicPr>
+        <p:blipFill rotWithShape="1">
+          <a:blip r:embed="rId2"/>
+          <a:srcRect l="9467" t="16139" r="5863" b="4465"/>
+          <a:stretch/>
+        </p:blipFill>
+        <p:spPr>
+          <a:xfrm>
+            <a:off x="2223082" y="1306420"/>
+            <a:ext cx="8212822" cy="5444894"/>
+          </a:xfrm>
+          <a:prstGeom prst="rect">
+            <a:avLst/>
+          </a:prstGeom>
+        </p:spPr>
+      </p:pic>
+    </p:spTree>
+    <p:extLst>
+      <p:ext uri="{BB962C8B-B14F-4D97-AF65-F5344CB8AC3E}">
+        <p14:creationId xmlns:p14="http://schemas.microsoft.com/office/powerpoint/2010/main" val="1888800592"/>
+      </p:ext>
+    </p:extLst>
+  </p:cSld>
+  <p:clrMapOvr>
+    <a:masterClrMapping/>
+  </p:clrMapOvr>
+</p:sld>
+</file>
+
+<file path=ppt/slides/slide12.xml><?xml version="1.0" encoding="utf-8"?>
+<p:sld xmlns:a="http://schemas.openxmlformats.org/drawingml/2006/main" xmlns:r="http://schemas.openxmlformats.org/officeDocument/2006/relationships" xmlns:p="http://schemas.openxmlformats.org/presentationml/2006/main">
+  <p:cSld>
+    <p:bg>
+      <p:bgPr>
+        <a:solidFill>
+          <a:srgbClr val="5B616F"/>
+        </a:solidFill>
+        <a:effectLst/>
+      </p:bgPr>
+    </p:bg>
+    <p:spTree>
+      <p:nvGrpSpPr>
+        <p:cNvPr id="1" name=""/>
+        <p:cNvGrpSpPr/>
+        <p:nvPr/>
+      </p:nvGrpSpPr>
+      <p:grpSpPr>
+        <a:xfrm>
+          <a:off x="0" y="0"/>
+          <a:ext cx="0" cy="0"/>
+          <a:chOff x="0" y="0"/>
+          <a:chExt cx="0" cy="0"/>
+        </a:xfrm>
+      </p:grpSpPr>
+      <p:sp>
+        <p:nvSpPr>
+          <p:cNvPr id="2" name="Retângulo 1">
+            <a:extLst>
+              <a:ext uri="{FF2B5EF4-FFF2-40B4-BE49-F238E27FC236}">
+                <a16:creationId xmlns:a16="http://schemas.microsoft.com/office/drawing/2014/main" id="{8C911EF0-0065-4173-87F6-89015AA6DCA1}"/>
+              </a:ext>
+            </a:extLst>
+          </p:cNvPr>
+          <p:cNvSpPr/>
+          <p:nvPr/>
+        </p:nvSpPr>
+        <p:spPr>
+          <a:xfrm rot="5400000">
+            <a:off x="5542547" y="-5607860"/>
+            <a:ext cx="1106907" cy="12192000"/>
+          </a:xfrm>
+          <a:prstGeom prst="rect">
+            <a:avLst/>
+          </a:prstGeom>
+          <a:solidFill>
+            <a:srgbClr val="DBA1A1"/>
+          </a:solidFill>
+          <a:ln>
+            <a:noFill/>
+          </a:ln>
+        </p:spPr>
+        <p:style>
+          <a:lnRef idx="2">
+            <a:schemeClr val="accent1">
+              <a:shade val="50000"/>
+            </a:schemeClr>
+          </a:lnRef>
+          <a:fillRef idx="1">
+            <a:schemeClr val="accent1"/>
+          </a:fillRef>
+          <a:effectRef idx="0">
+            <a:schemeClr val="accent1"/>
+          </a:effectRef>
+          <a:fontRef idx="minor">
+            <a:schemeClr val="lt1"/>
+          </a:fontRef>
+        </p:style>
+        <p:txBody>
+          <a:bodyPr rtlCol="0" anchor="ctr"/>
+          <a:lstStyle/>
+          <a:p>
+            <a:pPr algn="ctr"/>
+            <a:endParaRPr lang="pt-BR" dirty="0">
+              <a:ln>
+                <a:solidFill>
+                  <a:srgbClr val="DBA1A1"/>
+                </a:solidFill>
+              </a:ln>
+              <a:solidFill>
+                <a:srgbClr val="DBA1A1"/>
+              </a:solidFill>
+            </a:endParaRPr>
+          </a:p>
+        </p:txBody>
+      </p:sp>
+      <p:sp>
+        <p:nvSpPr>
+          <p:cNvPr id="3" name="CaixaDeTexto 2">
+            <a:extLst>
+              <a:ext uri="{FF2B5EF4-FFF2-40B4-BE49-F238E27FC236}">
+                <a16:creationId xmlns:a16="http://schemas.microsoft.com/office/drawing/2014/main" id="{EA906822-E252-4415-BE2C-766952557E58}"/>
+              </a:ext>
+            </a:extLst>
+          </p:cNvPr>
+          <p:cNvSpPr txBox="1"/>
+          <p:nvPr/>
+        </p:nvSpPr>
+        <p:spPr>
+          <a:xfrm>
+            <a:off x="3692483" y="199512"/>
+            <a:ext cx="5274019" cy="707886"/>
+          </a:xfrm>
+          <a:prstGeom prst="rect">
+            <a:avLst/>
+          </a:prstGeom>
+          <a:noFill/>
+        </p:spPr>
+        <p:txBody>
+          <a:bodyPr wrap="square" rtlCol="0">
+            <a:spAutoFit/>
+          </a:bodyPr>
+          <a:lstStyle/>
+          <a:p>
+            <a:pPr algn="ctr"/>
+            <a:r>
+              <a:rPr lang="pt-BR" sz="4000" dirty="0">
+                <a:solidFill>
+                  <a:srgbClr val="5B616F"/>
+                </a:solidFill>
+                <a:latin typeface="Agency FB" panose="020B0503020202020204" pitchFamily="34" charset="0"/>
+              </a:rPr>
+              <a:t>Protótipo</a:t>
+            </a:r>
+          </a:p>
+        </p:txBody>
+      </p:sp>
+      <p:pic>
+        <p:nvPicPr>
+          <p:cNvPr id="5" name="Imagem 4">
+            <a:extLst>
+              <a:ext uri="{FF2B5EF4-FFF2-40B4-BE49-F238E27FC236}">
+                <a16:creationId xmlns:a16="http://schemas.microsoft.com/office/drawing/2014/main" id="{5DAE12E0-2F84-4A09-97AE-5C807B276D6B}"/>
+              </a:ext>
+            </a:extLst>
+          </p:cNvPr>
+          <p:cNvPicPr/>
+          <p:nvPr/>
+        </p:nvPicPr>
+        <p:blipFill>
+          <a:blip r:embed="rId2">
+            <a:extLst>
+              <a:ext uri="{28A0092B-C50C-407E-A947-70E740481C1C}">
+                <a14:useLocalDpi xmlns:a14="http://schemas.microsoft.com/office/drawing/2010/main" val="0"/>
+              </a:ext>
+            </a:extLst>
+          </a:blip>
+          <a:srcRect/>
+          <a:stretch>
+            <a:fillRect/>
+          </a:stretch>
+        </p:blipFill>
+        <p:spPr bwMode="auto">
+          <a:xfrm>
+            <a:off x="767345" y="1380347"/>
+            <a:ext cx="2371725" cy="2343150"/>
+          </a:xfrm>
+          <a:prstGeom prst="rect">
+            <a:avLst/>
+          </a:prstGeom>
+          <a:noFill/>
+          <a:ln>
+            <a:noFill/>
+          </a:ln>
+        </p:spPr>
+      </p:pic>
+      <p:pic>
+        <p:nvPicPr>
+          <p:cNvPr id="6" name="Imagem 5">
+            <a:extLst>
+              <a:ext uri="{FF2B5EF4-FFF2-40B4-BE49-F238E27FC236}">
+                <a16:creationId xmlns:a16="http://schemas.microsoft.com/office/drawing/2014/main" id="{7CEC0A35-1AAC-46B5-8F1E-3BF3BDA89204}"/>
+              </a:ext>
+            </a:extLst>
+          </p:cNvPr>
+          <p:cNvPicPr/>
+          <p:nvPr/>
+        </p:nvPicPr>
+        <p:blipFill>
+          <a:blip r:embed="rId3">
+            <a:extLst>
+              <a:ext uri="{28A0092B-C50C-407E-A947-70E740481C1C}">
+                <a14:useLocalDpi xmlns:a14="http://schemas.microsoft.com/office/drawing/2010/main" val="0"/>
+              </a:ext>
+            </a:extLst>
+          </a:blip>
+          <a:srcRect/>
+          <a:stretch>
+            <a:fillRect/>
+          </a:stretch>
+        </p:blipFill>
+        <p:spPr bwMode="auto">
+          <a:xfrm>
+            <a:off x="3954935" y="1380347"/>
+            <a:ext cx="3440495" cy="2343150"/>
+          </a:xfrm>
+          <a:prstGeom prst="rect">
+            <a:avLst/>
+          </a:prstGeom>
+          <a:noFill/>
+          <a:ln>
+            <a:noFill/>
+          </a:ln>
+        </p:spPr>
+      </p:pic>
+      <p:pic>
+        <p:nvPicPr>
+          <p:cNvPr id="7" name="Imagem 6">
+            <a:extLst>
+              <a:ext uri="{FF2B5EF4-FFF2-40B4-BE49-F238E27FC236}">
+                <a16:creationId xmlns:a16="http://schemas.microsoft.com/office/drawing/2014/main" id="{FFE61159-FC01-417E-9947-B7DCECA452E9}"/>
+              </a:ext>
+            </a:extLst>
+          </p:cNvPr>
+          <p:cNvPicPr/>
+          <p:nvPr/>
+        </p:nvPicPr>
+        <p:blipFill>
+          <a:blip r:embed="rId4">
+            <a:extLst>
+              <a:ext uri="{28A0092B-C50C-407E-A947-70E740481C1C}">
+                <a14:useLocalDpi xmlns:a14="http://schemas.microsoft.com/office/drawing/2010/main" val="0"/>
+              </a:ext>
+            </a:extLst>
+          </a:blip>
+          <a:srcRect/>
+          <a:stretch>
+            <a:fillRect/>
+          </a:stretch>
+        </p:blipFill>
+        <p:spPr bwMode="auto">
+          <a:xfrm>
+            <a:off x="7929296" y="1306420"/>
+            <a:ext cx="3704590" cy="2512060"/>
+          </a:xfrm>
+          <a:prstGeom prst="rect">
+            <a:avLst/>
+          </a:prstGeom>
+          <a:noFill/>
+          <a:ln>
+            <a:noFill/>
+          </a:ln>
+        </p:spPr>
+      </p:pic>
+      <p:pic>
+        <p:nvPicPr>
+          <p:cNvPr id="8" name="Imagem 7">
+            <a:extLst>
+              <a:ext uri="{FF2B5EF4-FFF2-40B4-BE49-F238E27FC236}">
+                <a16:creationId xmlns:a16="http://schemas.microsoft.com/office/drawing/2014/main" id="{AE23833B-6330-4441-A999-95A7945F3E49}"/>
+              </a:ext>
+            </a:extLst>
+          </p:cNvPr>
+          <p:cNvPicPr/>
+          <p:nvPr/>
+        </p:nvPicPr>
+        <p:blipFill>
+          <a:blip r:embed="rId5">
+            <a:extLst>
+              <a:ext uri="{28A0092B-C50C-407E-A947-70E740481C1C}">
+                <a14:useLocalDpi xmlns:a14="http://schemas.microsoft.com/office/drawing/2010/main" val="0"/>
+              </a:ext>
+            </a:extLst>
+          </a:blip>
+          <a:srcRect/>
+          <a:stretch>
+            <a:fillRect/>
+          </a:stretch>
+        </p:blipFill>
+        <p:spPr bwMode="auto">
+          <a:xfrm>
+            <a:off x="767345" y="3862738"/>
+            <a:ext cx="3327549" cy="2795750"/>
+          </a:xfrm>
+          <a:prstGeom prst="rect">
+            <a:avLst/>
+          </a:prstGeom>
+          <a:noFill/>
+          <a:ln>
+            <a:noFill/>
+          </a:ln>
+        </p:spPr>
+      </p:pic>
+    </p:spTree>
+    <p:extLst>
+      <p:ext uri="{BB962C8B-B14F-4D97-AF65-F5344CB8AC3E}">
+        <p14:creationId xmlns:p14="http://schemas.microsoft.com/office/powerpoint/2010/main" val="221351180"/>
+      </p:ext>
+    </p:extLst>
+  </p:cSld>
+  <p:clrMapOvr>
+    <a:masterClrMapping/>
+  </p:clrMapOvr>
+</p:sld>
+</file>
+
+<file path=ppt/slides/slide13.xml><?xml version="1.0" encoding="utf-8"?>
+<p:sld xmlns:a="http://schemas.openxmlformats.org/drawingml/2006/main" xmlns:r="http://schemas.openxmlformats.org/officeDocument/2006/relationships" xmlns:p="http://schemas.openxmlformats.org/presentationml/2006/main">
+  <p:cSld>
+    <p:bg>
+      <p:bgPr>
+        <a:solidFill>
+          <a:srgbClr val="5B616F"/>
+        </a:solidFill>
+        <a:effectLst/>
+      </p:bgPr>
+    </p:bg>
+    <p:spTree>
+      <p:nvGrpSpPr>
+        <p:cNvPr id="1" name=""/>
+        <p:cNvGrpSpPr/>
+        <p:nvPr/>
+      </p:nvGrpSpPr>
+      <p:grpSpPr>
+        <a:xfrm>
+          <a:off x="0" y="0"/>
+          <a:ext cx="0" cy="0"/>
+          <a:chOff x="0" y="0"/>
+          <a:chExt cx="0" cy="0"/>
+        </a:xfrm>
+      </p:grpSpPr>
+      <p:sp>
+        <p:nvSpPr>
+          <p:cNvPr id="2" name="Retângulo 1">
+            <a:extLst>
+              <a:ext uri="{FF2B5EF4-FFF2-40B4-BE49-F238E27FC236}">
+                <a16:creationId xmlns:a16="http://schemas.microsoft.com/office/drawing/2014/main" id="{8C911EF0-0065-4173-87F6-89015AA6DCA1}"/>
+              </a:ext>
+            </a:extLst>
+          </p:cNvPr>
+          <p:cNvSpPr/>
+          <p:nvPr/>
+        </p:nvSpPr>
+        <p:spPr>
+          <a:xfrm rot="5400000">
+            <a:off x="5542547" y="-5607860"/>
+            <a:ext cx="1106907" cy="12192000"/>
+          </a:xfrm>
+          <a:prstGeom prst="rect">
+            <a:avLst/>
+          </a:prstGeom>
+          <a:solidFill>
+            <a:srgbClr val="DBA1A1"/>
+          </a:solidFill>
+          <a:ln>
+            <a:noFill/>
+          </a:ln>
+        </p:spPr>
+        <p:style>
+          <a:lnRef idx="2">
+            <a:schemeClr val="accent1">
+              <a:shade val="50000"/>
+            </a:schemeClr>
+          </a:lnRef>
+          <a:fillRef idx="1">
+            <a:schemeClr val="accent1"/>
+          </a:fillRef>
+          <a:effectRef idx="0">
+            <a:schemeClr val="accent1"/>
+          </a:effectRef>
+          <a:fontRef idx="minor">
+            <a:schemeClr val="lt1"/>
+          </a:fontRef>
+        </p:style>
+        <p:txBody>
+          <a:bodyPr rtlCol="0" anchor="ctr"/>
+          <a:lstStyle/>
+          <a:p>
+            <a:pPr algn="ctr"/>
+            <a:endParaRPr lang="pt-BR" dirty="0">
+              <a:ln>
+                <a:solidFill>
+                  <a:srgbClr val="DBA1A1"/>
+                </a:solidFill>
+              </a:ln>
+              <a:solidFill>
+                <a:srgbClr val="DBA1A1"/>
+              </a:solidFill>
+            </a:endParaRPr>
+          </a:p>
+        </p:txBody>
+      </p:sp>
+      <p:sp>
+        <p:nvSpPr>
+          <p:cNvPr id="3" name="CaixaDeTexto 2">
+            <a:extLst>
+              <a:ext uri="{FF2B5EF4-FFF2-40B4-BE49-F238E27FC236}">
+                <a16:creationId xmlns:a16="http://schemas.microsoft.com/office/drawing/2014/main" id="{EA906822-E252-4415-BE2C-766952557E58}"/>
+              </a:ext>
+            </a:extLst>
+          </p:cNvPr>
+          <p:cNvSpPr txBox="1"/>
+          <p:nvPr/>
+        </p:nvSpPr>
+        <p:spPr>
+          <a:xfrm>
+            <a:off x="3692483" y="199512"/>
+            <a:ext cx="5274019" cy="707886"/>
+          </a:xfrm>
+          <a:prstGeom prst="rect">
+            <a:avLst/>
+          </a:prstGeom>
+          <a:noFill/>
+        </p:spPr>
+        <p:txBody>
+          <a:bodyPr wrap="square" rtlCol="0">
+            <a:spAutoFit/>
+          </a:bodyPr>
+          <a:lstStyle/>
+          <a:p>
+            <a:pPr algn="ctr"/>
+            <a:r>
+              <a:rPr lang="pt-BR" sz="4000" dirty="0">
+                <a:solidFill>
+                  <a:srgbClr val="5B616F"/>
+                </a:solidFill>
+                <a:latin typeface="Agency FB" panose="020B0503020202020204" pitchFamily="34" charset="0"/>
+              </a:rPr>
+              <a:t>Versão Final</a:t>
+            </a:r>
+          </a:p>
+        </p:txBody>
+      </p:sp>
+      <p:pic>
+        <p:nvPicPr>
+          <p:cNvPr id="9" name="Imagem 8">
+            <a:extLst>
+              <a:ext uri="{FF2B5EF4-FFF2-40B4-BE49-F238E27FC236}">
+                <a16:creationId xmlns:a16="http://schemas.microsoft.com/office/drawing/2014/main" id="{EC67E932-6630-42C1-8CD9-3498DE5DDF86}"/>
+              </a:ext>
+            </a:extLst>
+          </p:cNvPr>
+          <p:cNvPicPr>
+            <a:picLocks noChangeAspect="1"/>
+          </p:cNvPicPr>
+          <p:nvPr/>
+        </p:nvPicPr>
+        <p:blipFill>
+          <a:blip r:embed="rId2"/>
+          <a:stretch>
+            <a:fillRect/>
+          </a:stretch>
+        </p:blipFill>
+        <p:spPr>
+          <a:xfrm>
+            <a:off x="269502" y="1162895"/>
+            <a:ext cx="3098849" cy="2608154"/>
+          </a:xfrm>
+          <a:prstGeom prst="rect">
+            <a:avLst/>
+          </a:prstGeom>
+        </p:spPr>
+      </p:pic>
+      <p:pic>
+        <p:nvPicPr>
+          <p:cNvPr id="11" name="Imagem 10">
+            <a:extLst>
+              <a:ext uri="{FF2B5EF4-FFF2-40B4-BE49-F238E27FC236}">
+                <a16:creationId xmlns:a16="http://schemas.microsoft.com/office/drawing/2014/main" id="{9BEAA337-BD5F-4769-B6D8-E90E99E5A574}"/>
+              </a:ext>
+            </a:extLst>
+          </p:cNvPr>
+          <p:cNvPicPr>
+            <a:picLocks noChangeAspect="1"/>
+          </p:cNvPicPr>
+          <p:nvPr/>
+        </p:nvPicPr>
+        <p:blipFill rotWithShape="1">
+          <a:blip r:embed="rId3"/>
+          <a:srcRect l="1681" t="2761" r="1654" b="-39"/>
+          <a:stretch/>
+        </p:blipFill>
+        <p:spPr>
+          <a:xfrm>
+            <a:off x="3900196" y="2157155"/>
+            <a:ext cx="3816221" cy="2543689"/>
+          </a:xfrm>
+          <a:prstGeom prst="rect">
+            <a:avLst/>
+          </a:prstGeom>
+        </p:spPr>
+      </p:pic>
+      <p:pic>
+        <p:nvPicPr>
+          <p:cNvPr id="13" name="Imagem 12">
+            <a:extLst>
+              <a:ext uri="{FF2B5EF4-FFF2-40B4-BE49-F238E27FC236}">
+                <a16:creationId xmlns:a16="http://schemas.microsoft.com/office/drawing/2014/main" id="{18D6C8A8-EDFB-4C3E-B7E5-AD061E98047D}"/>
+              </a:ext>
+            </a:extLst>
+          </p:cNvPr>
+          <p:cNvPicPr>
+            <a:picLocks noChangeAspect="1"/>
+          </p:cNvPicPr>
+          <p:nvPr/>
+        </p:nvPicPr>
+        <p:blipFill>
+          <a:blip r:embed="rId4"/>
+          <a:stretch>
+            <a:fillRect/>
+          </a:stretch>
+        </p:blipFill>
+        <p:spPr>
+          <a:xfrm>
+            <a:off x="7977674" y="3110272"/>
+            <a:ext cx="4047461" cy="3548216"/>
+          </a:xfrm>
+          <a:prstGeom prst="rect">
+            <a:avLst/>
+          </a:prstGeom>
+        </p:spPr>
+      </p:pic>
+      <p:sp>
+        <p:nvSpPr>
+          <p:cNvPr id="15" name="CaixaDeTexto 14">
+            <a:extLst>
+              <a:ext uri="{FF2B5EF4-FFF2-40B4-BE49-F238E27FC236}">
+                <a16:creationId xmlns:a16="http://schemas.microsoft.com/office/drawing/2014/main" id="{9E0E3EA9-383E-49FA-8A4B-AA18433E4160}"/>
+              </a:ext>
+            </a:extLst>
+          </p:cNvPr>
+          <p:cNvSpPr txBox="1"/>
+          <p:nvPr/>
+        </p:nvSpPr>
+        <p:spPr>
+          <a:xfrm>
+            <a:off x="166865" y="6289156"/>
+            <a:ext cx="2212441" cy="369332"/>
+          </a:xfrm>
+          <a:prstGeom prst="rect">
+            <a:avLst/>
+          </a:prstGeom>
+          <a:noFill/>
+        </p:spPr>
+        <p:txBody>
+          <a:bodyPr wrap="square">
+            <a:spAutoFit/>
+          </a:bodyPr>
+          <a:lstStyle/>
+          <a:p>
+            <a:pPr algn="ctr"/>
+            <a:r>
+              <a:rPr lang="pt-BR" sz="1800" dirty="0">
+                <a:solidFill>
+                  <a:srgbClr val="DBA1A1"/>
+                </a:solidFill>
+                <a:effectLst/>
+                <a:latin typeface="Agency FB" panose="020B0503020202020204" pitchFamily="34" charset="0"/>
+              </a:rPr>
+              <a:t>Mais detalhes a seguir...</a:t>
+            </a:r>
+          </a:p>
+        </p:txBody>
+      </p:sp>
+    </p:spTree>
+    <p:extLst>
+      <p:ext uri="{BB962C8B-B14F-4D97-AF65-F5344CB8AC3E}">
+        <p14:creationId xmlns:p14="http://schemas.microsoft.com/office/powerpoint/2010/main" val="2749028880"/>
+      </p:ext>
+    </p:extLst>
+  </p:cSld>
+  <p:clrMapOvr>
+    <a:masterClrMapping/>
+  </p:clrMapOvr>
+</p:sld>
+</file>
+
+<file path=ppt/slides/slide14.xml><?xml version="1.0" encoding="utf-8"?>
+<p:sld xmlns:a="http://schemas.openxmlformats.org/drawingml/2006/main" xmlns:r="http://schemas.openxmlformats.org/officeDocument/2006/relationships" xmlns:p="http://schemas.openxmlformats.org/presentationml/2006/main">
+  <p:cSld>
+    <p:bg>
+      <p:bgPr>
+        <a:solidFill>
+          <a:srgbClr val="5B616F"/>
+        </a:solidFill>
+        <a:effectLst/>
+      </p:bgPr>
+    </p:bg>
+    <p:spTree>
+      <p:nvGrpSpPr>
+        <p:cNvPr id="1" name=""/>
+        <p:cNvGrpSpPr/>
+        <p:nvPr/>
+      </p:nvGrpSpPr>
+      <p:grpSpPr>
+        <a:xfrm>
+          <a:off x="0" y="0"/>
+          <a:ext cx="0" cy="0"/>
+          <a:chOff x="0" y="0"/>
+          <a:chExt cx="0" cy="0"/>
+        </a:xfrm>
+      </p:grpSpPr>
+      <p:sp>
+        <p:nvSpPr>
+          <p:cNvPr id="2" name="Retângulo 1">
+            <a:extLst>
+              <a:ext uri="{FF2B5EF4-FFF2-40B4-BE49-F238E27FC236}">
+                <a16:creationId xmlns:a16="http://schemas.microsoft.com/office/drawing/2014/main" id="{2D5E4F3C-F307-4E72-AABB-63174CA4F729}"/>
+              </a:ext>
+            </a:extLst>
+          </p:cNvPr>
+          <p:cNvSpPr/>
+          <p:nvPr/>
+        </p:nvSpPr>
+        <p:spPr>
+          <a:xfrm>
+            <a:off x="2561379" y="2459504"/>
+            <a:ext cx="7069242" cy="1938992"/>
+          </a:xfrm>
+          <a:prstGeom prst="rect">
+            <a:avLst/>
+          </a:prstGeom>
+          <a:noFill/>
+        </p:spPr>
+        <p:txBody>
+          <a:bodyPr wrap="square" lIns="91440" tIns="45720" rIns="91440" bIns="45720">
+            <a:spAutoFit/>
+          </a:bodyPr>
+          <a:lstStyle/>
+          <a:p>
+            <a:pPr algn="ctr"/>
+            <a:r>
+              <a:rPr lang="pt-BR" sz="6000" dirty="0">
+                <a:solidFill>
+                  <a:srgbClr val="DBA1A1"/>
+                </a:solidFill>
+                <a:latin typeface="Agency FB" panose="020B0503020202020204" pitchFamily="34" charset="0"/>
+              </a:rPr>
+              <a:t>Que tal vermos como funciona?</a:t>
+            </a:r>
+          </a:p>
+        </p:txBody>
+      </p:sp>
+    </p:spTree>
+    <p:extLst>
+      <p:ext uri="{BB962C8B-B14F-4D97-AF65-F5344CB8AC3E}">
+        <p14:creationId xmlns:p14="http://schemas.microsoft.com/office/powerpoint/2010/main" val="1325833061"/>
+      </p:ext>
+    </p:extLst>
+  </p:cSld>
+  <p:clrMapOvr>
+    <a:masterClrMapping/>
+  </p:clrMapOvr>
+</p:sld>
+</file>
+
+<file path=ppt/slides/slide15.xml><?xml version="1.0" encoding="utf-8"?>
+<p:sld xmlns:a="http://schemas.openxmlformats.org/drawingml/2006/main" xmlns:r="http://schemas.openxmlformats.org/officeDocument/2006/relationships" xmlns:p="http://schemas.openxmlformats.org/presentationml/2006/main">
+  <p:cSld>
+    <p:bg>
+      <p:bgPr>
+        <a:solidFill>
+          <a:srgbClr val="5B616F"/>
+        </a:solidFill>
+        <a:effectLst/>
+      </p:bgPr>
+    </p:bg>
+    <p:spTree>
+      <p:nvGrpSpPr>
+        <p:cNvPr id="1" name=""/>
+        <p:cNvGrpSpPr/>
+        <p:nvPr/>
+      </p:nvGrpSpPr>
+      <p:grpSpPr>
+        <a:xfrm>
+          <a:off x="0" y="0"/>
+          <a:ext cx="0" cy="0"/>
+          <a:chOff x="0" y="0"/>
+          <a:chExt cx="0" cy="0"/>
+        </a:xfrm>
+      </p:grpSpPr>
+      <p:pic>
+        <p:nvPicPr>
+          <p:cNvPr id="3" name="Imagem 2" descr="Tela de celular com texto preto sobre fundo branco&#10;&#10;Descrição gerada automaticamente">
+            <a:extLst>
+              <a:ext uri="{FF2B5EF4-FFF2-40B4-BE49-F238E27FC236}">
+                <a16:creationId xmlns:a16="http://schemas.microsoft.com/office/drawing/2014/main" id="{C1DB64C6-D486-4A4C-B2E4-17DC023929CA}"/>
+              </a:ext>
+            </a:extLst>
+          </p:cNvPr>
+          <p:cNvPicPr>
+            <a:picLocks noChangeAspect="1"/>
+          </p:cNvPicPr>
+          <p:nvPr/>
+        </p:nvPicPr>
+        <p:blipFill>
+          <a:blip r:embed="rId2">
+            <a:extLst>
+              <a:ext uri="{28A0092B-C50C-407E-A947-70E740481C1C}">
+                <a14:useLocalDpi xmlns:a14="http://schemas.microsoft.com/office/drawing/2010/main" val="0"/>
+              </a:ext>
+            </a:extLst>
+          </a:blip>
+          <a:stretch>
+            <a:fillRect/>
+          </a:stretch>
+        </p:blipFill>
+        <p:spPr>
+          <a:xfrm>
+            <a:off x="0" y="1673"/>
+            <a:ext cx="12192000" cy="6854653"/>
+          </a:xfrm>
+          <a:prstGeom prst="rect">
+            <a:avLst/>
+          </a:prstGeom>
+        </p:spPr>
+      </p:pic>
+    </p:spTree>
+    <p:extLst>
+      <p:ext uri="{BB962C8B-B14F-4D97-AF65-F5344CB8AC3E}">
+        <p14:creationId xmlns:p14="http://schemas.microsoft.com/office/powerpoint/2010/main" val="4131136740"/>
+      </p:ext>
+    </p:extLst>
+  </p:cSld>
+  <p:clrMapOvr>
+    <a:masterClrMapping/>
+  </p:clrMapOvr>
+</p:sld>
+</file>
+
 <file path=ppt/slides/slide2.xml><?xml version="1.0" encoding="utf-8"?>
 <p:sld xmlns:a="http://schemas.openxmlformats.org/drawingml/2006/main" xmlns:r="http://schemas.openxmlformats.org/officeDocument/2006/relationships" xmlns:p="http://schemas.openxmlformats.org/presentationml/2006/main">
   <p:cSld>
@@ -4402,8 +5996,8 @@
         </p:nvSpPr>
         <p:spPr>
           <a:xfrm>
-            <a:off x="4381709" y="199512"/>
-            <a:ext cx="3428582" cy="707886"/>
+            <a:off x="2657841" y="225845"/>
+            <a:ext cx="6876317" cy="707886"/>
           </a:xfrm>
           <a:prstGeom prst="rect">
             <a:avLst/>
@@ -4424,7 +6018,7 @@
                 </a:solidFill>
                 <a:latin typeface="Agency FB" panose="020B0503020202020204" pitchFamily="34" charset="0"/>
               </a:rPr>
-              <a:t>Nutricionista</a:t>
+              <a:t>Funcionalidades: Nutricionista</a:t>
             </a:r>
           </a:p>
         </p:txBody>
@@ -4929,8 +6523,8 @@
         </p:nvSpPr>
         <p:spPr>
           <a:xfrm>
-            <a:off x="4381709" y="199512"/>
-            <a:ext cx="3428582" cy="707886"/>
+            <a:off x="2372616" y="226702"/>
+            <a:ext cx="7320933" cy="707886"/>
           </a:xfrm>
           <a:prstGeom prst="rect">
             <a:avLst/>
@@ -4951,7 +6545,7 @@
                 </a:solidFill>
                 <a:latin typeface="Agency FB" panose="020B0503020202020204" pitchFamily="34" charset="0"/>
               </a:rPr>
-              <a:t>Paciente</a:t>
+              <a:t>Funcionalidades: Paciente</a:t>
             </a:r>
           </a:p>
         </p:txBody>
@@ -5389,7 +6983,7 @@
           <p:cNvPr id="2" name="Retângulo 1">
             <a:extLst>
               <a:ext uri="{FF2B5EF4-FFF2-40B4-BE49-F238E27FC236}">
-                <a16:creationId xmlns:a16="http://schemas.microsoft.com/office/drawing/2014/main" id="{2D5E4F3C-F307-4E72-AABB-63174CA4F729}"/>
+                <a16:creationId xmlns:a16="http://schemas.microsoft.com/office/drawing/2014/main" id="{8C911EF0-0065-4173-87F6-89015AA6DCA1}"/>
               </a:ext>
             </a:extLst>
           </p:cNvPr>
@@ -5397,9 +6991,70 @@
           <p:nvPr/>
         </p:nvSpPr>
         <p:spPr>
+          <a:xfrm rot="5400000">
+            <a:off x="5542547" y="-5542545"/>
+            <a:ext cx="1106907" cy="12192000"/>
+          </a:xfrm>
+          <a:prstGeom prst="rect">
+            <a:avLst/>
+          </a:prstGeom>
+          <a:solidFill>
+            <a:srgbClr val="DBA1A1"/>
+          </a:solidFill>
+          <a:ln>
+            <a:noFill/>
+          </a:ln>
+        </p:spPr>
+        <p:style>
+          <a:lnRef idx="2">
+            <a:schemeClr val="accent1">
+              <a:shade val="50000"/>
+            </a:schemeClr>
+          </a:lnRef>
+          <a:fillRef idx="1">
+            <a:schemeClr val="accent1"/>
+          </a:fillRef>
+          <a:effectRef idx="0">
+            <a:schemeClr val="accent1"/>
+          </a:effectRef>
+          <a:fontRef idx="minor">
+            <a:schemeClr val="lt1"/>
+          </a:fontRef>
+        </p:style>
+        <p:txBody>
+          <a:bodyPr rtlCol="0" anchor="ctr"/>
+          <a:lstStyle/>
+          <a:p>
+            <a:pPr algn="ctr"/>
+            <a:endParaRPr lang="pt-BR" dirty="0">
+              <a:ln>
+                <a:solidFill>
+                  <a:srgbClr val="DBA1A1"/>
+                </a:solidFill>
+              </a:ln>
+              <a:solidFill>
+                <a:srgbClr val="DBA1A1"/>
+              </a:solidFill>
+            </a:endParaRPr>
+          </a:p>
+        </p:txBody>
+      </p:sp>
+      <p:sp>
+        <p:nvSpPr>
+          <p:cNvPr id="3" name="CaixaDeTexto 2">
+            <a:extLst>
+              <a:ext uri="{FF2B5EF4-FFF2-40B4-BE49-F238E27FC236}">
+                <a16:creationId xmlns:a16="http://schemas.microsoft.com/office/drawing/2014/main" id="{EA906822-E252-4415-BE2C-766952557E58}"/>
+              </a:ext>
+            </a:extLst>
+          </p:cNvPr>
+          <p:cNvSpPr txBox="1"/>
+          <p:nvPr/>
+        </p:nvSpPr>
+        <p:spPr>
           <a:xfrm>
-            <a:off x="2561379" y="2459504"/>
-            <a:ext cx="7069242" cy="1938992"/>
+            <a:off x="3517713" y="199512"/>
+            <a:ext cx="5156574" cy="707886"/>
           </a:xfrm>
           <a:prstGeom prst="rect">
             <a:avLst/>
@@ -5407,28 +7062,136 @@
           <a:noFill/>
         </p:spPr>
         <p:txBody>
-          <a:bodyPr wrap="square" lIns="91440" tIns="45720" rIns="91440" bIns="45720">
+          <a:bodyPr wrap="square" rtlCol="0">
             <a:spAutoFit/>
           </a:bodyPr>
           <a:lstStyle/>
           <a:p>
             <a:pPr algn="ctr"/>
             <a:r>
-              <a:rPr lang="pt-BR" sz="6000" dirty="0">
+              <a:rPr lang="pt-BR" sz="4000" dirty="0">
                 <a:solidFill>
-                  <a:srgbClr val="DBA1A1"/>
+                  <a:srgbClr val="5B616F"/>
                 </a:solidFill>
                 <a:latin typeface="Agency FB" panose="020B0503020202020204" pitchFamily="34" charset="0"/>
               </a:rPr>
-              <a:t>Que tal vermos como funciona?</a:t>
-            </a:r>
-          </a:p>
-        </p:txBody>
-      </p:sp>
+              <a:t>Propriedade do Sistema</a:t>
+            </a:r>
+          </a:p>
+        </p:txBody>
+      </p:sp>
+      <p:pic>
+        <p:nvPicPr>
+          <p:cNvPr id="8" name="Imagem 7" descr="Ícone&#10;&#10;Descrição gerada automaticamente">
+            <a:extLst>
+              <a:ext uri="{FF2B5EF4-FFF2-40B4-BE49-F238E27FC236}">
+                <a16:creationId xmlns:a16="http://schemas.microsoft.com/office/drawing/2014/main" id="{DCC6E5A6-AF5F-4C27-81F0-DF022A92AFF0}"/>
+              </a:ext>
+            </a:extLst>
+          </p:cNvPr>
+          <p:cNvPicPr>
+            <a:picLocks noChangeAspect="1"/>
+          </p:cNvPicPr>
+          <p:nvPr/>
+        </p:nvPicPr>
+        <p:blipFill>
+          <a:blip r:embed="rId2">
+            <a:extLst>
+              <a:ext uri="{28A0092B-C50C-407E-A947-70E740481C1C}">
+                <a14:useLocalDpi xmlns:a14="http://schemas.microsoft.com/office/drawing/2010/main" val="0"/>
+              </a:ext>
+            </a:extLst>
+          </a:blip>
+          <a:stretch>
+            <a:fillRect/>
+          </a:stretch>
+        </p:blipFill>
+        <p:spPr>
+          <a:xfrm>
+            <a:off x="1761993" y="1511022"/>
+            <a:ext cx="1618770" cy="1618770"/>
+          </a:xfrm>
+          <a:prstGeom prst="rect">
+            <a:avLst/>
+          </a:prstGeom>
+        </p:spPr>
+      </p:pic>
+      <p:pic>
+        <p:nvPicPr>
+          <p:cNvPr id="14" name="Imagem 13" descr="Forma&#10;&#10;Descrição gerada automaticamente">
+            <a:extLst>
+              <a:ext uri="{FF2B5EF4-FFF2-40B4-BE49-F238E27FC236}">
+                <a16:creationId xmlns:a16="http://schemas.microsoft.com/office/drawing/2014/main" id="{9AF21E9B-BA0D-4BD4-9926-EE7251706207}"/>
+              </a:ext>
+            </a:extLst>
+          </p:cNvPr>
+          <p:cNvPicPr>
+            <a:picLocks noChangeAspect="1"/>
+          </p:cNvPicPr>
+          <p:nvPr/>
+        </p:nvPicPr>
+        <p:blipFill>
+          <a:blip r:embed="rId3">
+            <a:extLst>
+              <a:ext uri="{28A0092B-C50C-407E-A947-70E740481C1C}">
+                <a14:useLocalDpi xmlns:a14="http://schemas.microsoft.com/office/drawing/2010/main" val="0"/>
+              </a:ext>
+            </a:extLst>
+          </a:blip>
+          <a:stretch>
+            <a:fillRect/>
+          </a:stretch>
+        </p:blipFill>
+        <p:spPr>
+          <a:xfrm>
+            <a:off x="9379199" y="5076343"/>
+            <a:ext cx="1266432" cy="1266432"/>
+          </a:xfrm>
+          <a:prstGeom prst="rect">
+            <a:avLst/>
+          </a:prstGeom>
+        </p:spPr>
+      </p:pic>
+      <p:pic>
+        <p:nvPicPr>
+          <p:cNvPr id="27" name="Imagem 26" descr="Logotipo, nome da empresa&#10;&#10;Descrição gerada automaticamente">
+            <a:extLst>
+              <a:ext uri="{FF2B5EF4-FFF2-40B4-BE49-F238E27FC236}">
+                <a16:creationId xmlns:a16="http://schemas.microsoft.com/office/drawing/2014/main" id="{C392A8F6-7630-41A0-ADEC-B713D9FE14CD}"/>
+              </a:ext>
+            </a:extLst>
+          </p:cNvPr>
+          <p:cNvPicPr>
+            <a:picLocks noChangeAspect="1"/>
+          </p:cNvPicPr>
+          <p:nvPr/>
+        </p:nvPicPr>
+        <p:blipFill>
+          <a:blip r:embed="rId4">
+            <a:extLst>
+              <a:ext uri="{28A0092B-C50C-407E-A947-70E740481C1C}">
+                <a14:useLocalDpi xmlns:a14="http://schemas.microsoft.com/office/drawing/2010/main" val="0"/>
+              </a:ext>
+            </a:extLst>
+          </a:blip>
+          <a:stretch>
+            <a:fillRect/>
+          </a:stretch>
+        </p:blipFill>
+        <p:spPr>
+          <a:xfrm>
+            <a:off x="4753817" y="2917272"/>
+            <a:ext cx="3238094" cy="1993650"/>
+          </a:xfrm>
+          <a:prstGeom prst="rect">
+            <a:avLst/>
+          </a:prstGeom>
+        </p:spPr>
+      </p:pic>
     </p:spTree>
     <p:extLst>
       <p:ext uri="{BB962C8B-B14F-4D97-AF65-F5344CB8AC3E}">
-        <p14:creationId xmlns:p14="http://schemas.microsoft.com/office/powerpoint/2010/main" val="1325833061"/>
+        <p14:creationId xmlns:p14="http://schemas.microsoft.com/office/powerpoint/2010/main" val="737724832"/>
       </p:ext>
     </p:extLst>
   </p:cSld>
@@ -5463,46 +7226,2472 @@
           <a:chExt cx="0" cy="0"/>
         </a:xfrm>
       </p:grpSpPr>
-      <p:pic>
-        <p:nvPicPr>
-          <p:cNvPr id="3" name="Imagem 2" descr="Tela de celular com texto preto sobre fundo branco&#10;&#10;Descrição gerada automaticamente">
-            <a:extLst>
-              <a:ext uri="{FF2B5EF4-FFF2-40B4-BE49-F238E27FC236}">
-                <a16:creationId xmlns:a16="http://schemas.microsoft.com/office/drawing/2014/main" id="{C1DB64C6-D486-4A4C-B2E4-17DC023929CA}"/>
-              </a:ext>
-            </a:extLst>
-          </p:cNvPr>
-          <p:cNvPicPr>
-            <a:picLocks noChangeAspect="1"/>
-          </p:cNvPicPr>
+      <p:sp>
+        <p:nvSpPr>
+          <p:cNvPr id="2" name="Retângulo 1">
+            <a:extLst>
+              <a:ext uri="{FF2B5EF4-FFF2-40B4-BE49-F238E27FC236}">
+                <a16:creationId xmlns:a16="http://schemas.microsoft.com/office/drawing/2014/main" id="{8C911EF0-0065-4173-87F6-89015AA6DCA1}"/>
+              </a:ext>
+            </a:extLst>
+          </p:cNvPr>
+          <p:cNvSpPr/>
           <p:nvPr/>
-        </p:nvPicPr>
-        <p:blipFill>
-          <a:blip r:embed="rId2">
-            <a:extLst>
-              <a:ext uri="{28A0092B-C50C-407E-A947-70E740481C1C}">
-                <a14:useLocalDpi xmlns:a14="http://schemas.microsoft.com/office/drawing/2010/main" val="0"/>
-              </a:ext>
-            </a:extLst>
-          </a:blip>
-          <a:stretch>
-            <a:fillRect/>
-          </a:stretch>
-        </p:blipFill>
+        </p:nvSpPr>
         <p:spPr>
-          <a:xfrm>
-            <a:off x="0" y="1673"/>
-            <a:ext cx="12192000" cy="6854653"/>
+          <a:xfrm rot="5400000">
+            <a:off x="5542547" y="-5542545"/>
+            <a:ext cx="1106907" cy="12192000"/>
           </a:xfrm>
           <a:prstGeom prst="rect">
             <a:avLst/>
           </a:prstGeom>
+          <a:solidFill>
+            <a:srgbClr val="DBA1A1"/>
+          </a:solidFill>
+          <a:ln>
+            <a:noFill/>
+          </a:ln>
         </p:spPr>
-      </p:pic>
+        <p:style>
+          <a:lnRef idx="2">
+            <a:schemeClr val="accent1">
+              <a:shade val="50000"/>
+            </a:schemeClr>
+          </a:lnRef>
+          <a:fillRef idx="1">
+            <a:schemeClr val="accent1"/>
+          </a:fillRef>
+          <a:effectRef idx="0">
+            <a:schemeClr val="accent1"/>
+          </a:effectRef>
+          <a:fontRef idx="minor">
+            <a:schemeClr val="lt1"/>
+          </a:fontRef>
+        </p:style>
+        <p:txBody>
+          <a:bodyPr rtlCol="0" anchor="ctr"/>
+          <a:lstStyle/>
+          <a:p>
+            <a:pPr algn="ctr"/>
+            <a:endParaRPr lang="pt-BR" dirty="0">
+              <a:ln>
+                <a:solidFill>
+                  <a:srgbClr val="DBA1A1"/>
+                </a:solidFill>
+              </a:ln>
+              <a:solidFill>
+                <a:srgbClr val="DBA1A1"/>
+              </a:solidFill>
+            </a:endParaRPr>
+          </a:p>
+        </p:txBody>
+      </p:sp>
+      <p:sp>
+        <p:nvSpPr>
+          <p:cNvPr id="3" name="CaixaDeTexto 2">
+            <a:extLst>
+              <a:ext uri="{FF2B5EF4-FFF2-40B4-BE49-F238E27FC236}">
+                <a16:creationId xmlns:a16="http://schemas.microsoft.com/office/drawing/2014/main" id="{EA906822-E252-4415-BE2C-766952557E58}"/>
+              </a:ext>
+            </a:extLst>
+          </p:cNvPr>
+          <p:cNvSpPr txBox="1"/>
+          <p:nvPr/>
+        </p:nvSpPr>
+        <p:spPr>
+          <a:xfrm>
+            <a:off x="3043797" y="199512"/>
+            <a:ext cx="6658133" cy="707886"/>
+          </a:xfrm>
+          <a:prstGeom prst="rect">
+            <a:avLst/>
+          </a:prstGeom>
+          <a:noFill/>
+        </p:spPr>
+        <p:txBody>
+          <a:bodyPr wrap="square" rtlCol="0">
+            <a:spAutoFit/>
+          </a:bodyPr>
+          <a:lstStyle/>
+          <a:p>
+            <a:pPr algn="ctr"/>
+            <a:r>
+              <a:rPr lang="pt-BR" sz="4000" dirty="0">
+                <a:solidFill>
+                  <a:srgbClr val="5B616F"/>
+                </a:solidFill>
+                <a:latin typeface="Agency FB" panose="020B0503020202020204" pitchFamily="34" charset="0"/>
+              </a:rPr>
+              <a:t>Requisitos Funcionais e Não Funcionais</a:t>
+            </a:r>
+          </a:p>
+        </p:txBody>
+      </p:sp>
+      <p:graphicFrame>
+        <p:nvGraphicFramePr>
+          <p:cNvPr id="4" name="Tabela 4">
+            <a:extLst>
+              <a:ext uri="{FF2B5EF4-FFF2-40B4-BE49-F238E27FC236}">
+                <a16:creationId xmlns:a16="http://schemas.microsoft.com/office/drawing/2014/main" id="{0D65BD39-23AE-4817-883A-7F07F263DD1C}"/>
+              </a:ext>
+            </a:extLst>
+          </p:cNvPr>
+          <p:cNvGraphicFramePr>
+            <a:graphicFrameLocks noGrp="1"/>
+          </p:cNvGraphicFramePr>
+          <p:nvPr>
+            <p:extLst>
+              <p:ext uri="{D42A27DB-BD31-4B8C-83A1-F6EECF244321}">
+                <p14:modId xmlns:p14="http://schemas.microsoft.com/office/powerpoint/2010/main" val="1318440127"/>
+              </p:ext>
+            </p:extLst>
+          </p:nvPr>
+        </p:nvGraphicFramePr>
+        <p:xfrm>
+          <a:off x="837206" y="1258448"/>
+          <a:ext cx="10853490" cy="5400040"/>
+        </p:xfrm>
+        <a:graphic>
+          <a:graphicData uri="http://schemas.openxmlformats.org/drawingml/2006/table">
+            <a:tbl>
+              <a:tblPr firstRow="1" bandRow="1">
+                <a:tableStyleId>{5C22544A-7EE6-4342-B048-85BDC9FD1C3A}</a:tableStyleId>
+              </a:tblPr>
+              <a:tblGrid>
+                <a:gridCol w="5426745">
+                  <a:extLst>
+                    <a:ext uri="{9D8B030D-6E8A-4147-A177-3AD203B41FA5}">
+                      <a16:colId xmlns:a16="http://schemas.microsoft.com/office/drawing/2014/main" val="2504239251"/>
+                    </a:ext>
+                  </a:extLst>
+                </a:gridCol>
+                <a:gridCol w="5426745">
+                  <a:extLst>
+                    <a:ext uri="{9D8B030D-6E8A-4147-A177-3AD203B41FA5}">
+                      <a16:colId xmlns:a16="http://schemas.microsoft.com/office/drawing/2014/main" val="354975263"/>
+                    </a:ext>
+                  </a:extLst>
+                </a:gridCol>
+              </a:tblGrid>
+              <a:tr h="370840">
+                <a:tc>
+                  <a:txBody>
+                    <a:bodyPr/>
+                    <a:lstStyle/>
+                    <a:p>
+                      <a:r>
+                        <a:rPr lang="pt-BR" dirty="0">
+                          <a:solidFill>
+                            <a:srgbClr val="DBA1A1"/>
+                          </a:solidFill>
+                          <a:latin typeface="Agency FB" panose="020B0503020202020204" pitchFamily="34" charset="0"/>
+                        </a:rPr>
+                        <a:t>Funcional</a:t>
+                      </a:r>
+                    </a:p>
+                  </a:txBody>
+                  <a:tcPr>
+                    <a:lnL w="12700" cap="flat" cmpd="sng" algn="ctr">
+                      <a:noFill/>
+                      <a:prstDash val="solid"/>
+                      <a:round/>
+                      <a:headEnd type="none" w="med" len="med"/>
+                      <a:tailEnd type="none" w="med" len="med"/>
+                    </a:lnL>
+                    <a:lnR w="12700" cap="flat" cmpd="sng" algn="ctr">
+                      <a:noFill/>
+                      <a:prstDash val="solid"/>
+                      <a:round/>
+                      <a:headEnd type="none" w="med" len="med"/>
+                      <a:tailEnd type="none" w="med" len="med"/>
+                    </a:lnR>
+                    <a:lnT w="12700" cap="flat" cmpd="sng" algn="ctr">
+                      <a:noFill/>
+                      <a:prstDash val="solid"/>
+                      <a:round/>
+                      <a:headEnd type="none" w="med" len="med"/>
+                      <a:tailEnd type="none" w="med" len="med"/>
+                    </a:lnT>
+                    <a:lnB w="12700" cap="flat" cmpd="sng" algn="ctr">
+                      <a:noFill/>
+                      <a:prstDash val="solid"/>
+                      <a:round/>
+                      <a:headEnd type="none" w="med" len="med"/>
+                      <a:tailEnd type="none" w="med" len="med"/>
+                    </a:lnB>
+                    <a:lnTlToBr w="12700" cmpd="sng">
+                      <a:noFill/>
+                      <a:prstDash val="solid"/>
+                    </a:lnTlToBr>
+                    <a:lnBlToTr w="12700" cmpd="sng">
+                      <a:noFill/>
+                      <a:prstDash val="solid"/>
+                    </a:lnBlToTr>
+                    <a:solidFill>
+                      <a:srgbClr val="5B616F"/>
+                    </a:solidFill>
+                  </a:tcPr>
+                </a:tc>
+                <a:tc>
+                  <a:txBody>
+                    <a:bodyPr/>
+                    <a:lstStyle/>
+                    <a:p>
+                      <a:r>
+                        <a:rPr lang="pt-BR" dirty="0">
+                          <a:solidFill>
+                            <a:srgbClr val="DBA1A1"/>
+                          </a:solidFill>
+                          <a:latin typeface="Agency FB" panose="020B0503020202020204" pitchFamily="34" charset="0"/>
+                        </a:rPr>
+                        <a:t>Não Funcional</a:t>
+                      </a:r>
+                    </a:p>
+                  </a:txBody>
+                  <a:tcPr>
+                    <a:lnL w="12700" cap="flat" cmpd="sng" algn="ctr">
+                      <a:noFill/>
+                      <a:prstDash val="solid"/>
+                      <a:round/>
+                      <a:headEnd type="none" w="med" len="med"/>
+                      <a:tailEnd type="none" w="med" len="med"/>
+                    </a:lnL>
+                    <a:lnR w="12700" cap="flat" cmpd="sng" algn="ctr">
+                      <a:noFill/>
+                      <a:prstDash val="solid"/>
+                      <a:round/>
+                      <a:headEnd type="none" w="med" len="med"/>
+                      <a:tailEnd type="none" w="med" len="med"/>
+                    </a:lnR>
+                    <a:lnT w="12700" cap="flat" cmpd="sng" algn="ctr">
+                      <a:noFill/>
+                      <a:prstDash val="solid"/>
+                      <a:round/>
+                      <a:headEnd type="none" w="med" len="med"/>
+                      <a:tailEnd type="none" w="med" len="med"/>
+                    </a:lnT>
+                    <a:lnB w="12700" cap="flat" cmpd="sng" algn="ctr">
+                      <a:noFill/>
+                      <a:prstDash val="solid"/>
+                      <a:round/>
+                      <a:headEnd type="none" w="med" len="med"/>
+                      <a:tailEnd type="none" w="med" len="med"/>
+                    </a:lnB>
+                    <a:lnTlToBr w="12700" cmpd="sng">
+                      <a:noFill/>
+                      <a:prstDash val="solid"/>
+                    </a:lnTlToBr>
+                    <a:lnBlToTr w="12700" cmpd="sng">
+                      <a:noFill/>
+                      <a:prstDash val="solid"/>
+                    </a:lnBlToTr>
+                    <a:solidFill>
+                      <a:srgbClr val="5B616F"/>
+                    </a:solidFill>
+                  </a:tcPr>
+                </a:tc>
+                <a:extLst>
+                  <a:ext uri="{0D108BD9-81ED-4DB2-BD59-A6C34878D82A}">
+                    <a16:rowId xmlns:a16="http://schemas.microsoft.com/office/drawing/2014/main" val="2395872218"/>
+                  </a:ext>
+                </a:extLst>
+              </a:tr>
+              <a:tr h="370840">
+                <a:tc rowSpan="4">
+                  <a:txBody>
+                    <a:bodyPr/>
+                    <a:lstStyle/>
+                    <a:p>
+                      <a:pPr algn="l"/>
+                      <a:r>
+                        <a:rPr lang="pt-BR" sz="1800" kern="1200" dirty="0">
+                          <a:solidFill>
+                            <a:srgbClr val="DBA1A1"/>
+                          </a:solidFill>
+                          <a:effectLst/>
+                          <a:latin typeface="Agency FB" panose="020B0503020202020204" pitchFamily="34" charset="0"/>
+                          <a:ea typeface="+mn-ea"/>
+                          <a:cs typeface="+mn-cs"/>
+                        </a:rPr>
+                        <a:t>Cadastrar -  O usuário deve ser capaz de inserir novas informações no bando de dados.</a:t>
+                      </a:r>
+                      <a:endParaRPr lang="pt-BR" dirty="0">
+                        <a:solidFill>
+                          <a:srgbClr val="DBA1A1"/>
+                        </a:solidFill>
+                        <a:latin typeface="Agency FB" panose="020B0503020202020204" pitchFamily="34" charset="0"/>
+                      </a:endParaRPr>
+                    </a:p>
+                  </a:txBody>
+                  <a:tcPr>
+                    <a:lnL w="12700" cap="flat" cmpd="sng" algn="ctr">
+                      <a:noFill/>
+                      <a:prstDash val="solid"/>
+                      <a:round/>
+                      <a:headEnd type="none" w="med" len="med"/>
+                      <a:tailEnd type="none" w="med" len="med"/>
+                    </a:lnL>
+                    <a:lnR w="12700" cap="flat" cmpd="sng" algn="ctr">
+                      <a:noFill/>
+                      <a:prstDash val="solid"/>
+                      <a:round/>
+                      <a:headEnd type="none" w="med" len="med"/>
+                      <a:tailEnd type="none" w="med" len="med"/>
+                    </a:lnR>
+                    <a:lnT w="12700" cap="flat" cmpd="sng" algn="ctr">
+                      <a:noFill/>
+                      <a:prstDash val="solid"/>
+                      <a:round/>
+                      <a:headEnd type="none" w="med" len="med"/>
+                      <a:tailEnd type="none" w="med" len="med"/>
+                    </a:lnT>
+                    <a:lnB w="12700" cap="flat" cmpd="sng" algn="ctr">
+                      <a:noFill/>
+                      <a:prstDash val="solid"/>
+                      <a:round/>
+                      <a:headEnd type="none" w="med" len="med"/>
+                      <a:tailEnd type="none" w="med" len="med"/>
+                    </a:lnB>
+                    <a:lnTlToBr w="12700" cmpd="sng">
+                      <a:noFill/>
+                      <a:prstDash val="solid"/>
+                    </a:lnTlToBr>
+                    <a:lnBlToTr w="12700" cmpd="sng">
+                      <a:noFill/>
+                      <a:prstDash val="solid"/>
+                    </a:lnBlToTr>
+                    <a:solidFill>
+                      <a:srgbClr val="5B616F"/>
+                    </a:solidFill>
+                  </a:tcPr>
+                </a:tc>
+                <a:tc>
+                  <a:txBody>
+                    <a:bodyPr/>
+                    <a:lstStyle/>
+                    <a:p>
+                      <a:pPr marL="0" marR="0" lvl="0" indent="0" algn="l" defTabSz="914400" rtl="0" eaLnBrk="1" fontAlgn="auto" latinLnBrk="0" hangingPunct="1">
+                        <a:lnSpc>
+                          <a:spcPct val="100000"/>
+                        </a:lnSpc>
+                        <a:spcBef>
+                          <a:spcPts val="0"/>
+                        </a:spcBef>
+                        <a:spcAft>
+                          <a:spcPts val="0"/>
+                        </a:spcAft>
+                        <a:buClrTx/>
+                        <a:buSzTx/>
+                        <a:buFontTx/>
+                        <a:buNone/>
+                        <a:tabLst/>
+                        <a:defRPr/>
+                      </a:pPr>
+                      <a:r>
+                        <a:rPr lang="pt-BR" sz="1800" kern="1200" dirty="0">
+                          <a:solidFill>
+                            <a:srgbClr val="DBA1A1"/>
+                          </a:solidFill>
+                          <a:effectLst/>
+                          <a:latin typeface="Agency FB" panose="020B0503020202020204" pitchFamily="34" charset="0"/>
+                          <a:ea typeface="+mn-ea"/>
+                          <a:cs typeface="+mn-cs"/>
+                        </a:rPr>
+                        <a:t>Cadastrar Paciente </a:t>
+                      </a:r>
+                    </a:p>
+                    <a:p>
+                      <a:r>
+                        <a:rPr lang="pt-BR" sz="1800" kern="1200" dirty="0">
+                          <a:solidFill>
+                            <a:srgbClr val="DBA1A1"/>
+                          </a:solidFill>
+                          <a:effectLst/>
+                          <a:latin typeface="Agency FB" panose="020B0503020202020204" pitchFamily="34" charset="0"/>
+                          <a:ea typeface="+mn-ea"/>
+                          <a:cs typeface="+mn-cs"/>
+                        </a:rPr>
+                        <a:t>- O paciente deve ser diferenciado do nutricionista.</a:t>
+                      </a:r>
+                    </a:p>
+                    <a:p>
+                      <a:r>
+                        <a:rPr lang="pt-BR" sz="1800" kern="1200" dirty="0">
+                          <a:solidFill>
+                            <a:srgbClr val="DBA1A1"/>
+                          </a:solidFill>
+                          <a:effectLst/>
+                          <a:latin typeface="Agency FB" panose="020B0503020202020204" pitchFamily="34" charset="0"/>
+                          <a:ea typeface="+mn-ea"/>
+                          <a:cs typeface="+mn-cs"/>
+                        </a:rPr>
+                        <a:t>	Implementação</a:t>
+                      </a:r>
+                    </a:p>
+                    <a:p>
+                      <a:r>
+                        <a:rPr lang="pt-BR" sz="1800" kern="1200" dirty="0">
+                          <a:solidFill>
+                            <a:srgbClr val="DBA1A1"/>
+                          </a:solidFill>
+                          <a:effectLst/>
+                          <a:latin typeface="Agency FB" panose="020B0503020202020204" pitchFamily="34" charset="0"/>
+                          <a:ea typeface="+mn-ea"/>
+                          <a:cs typeface="+mn-cs"/>
+                        </a:rPr>
+                        <a:t>	Obrigatório</a:t>
+                      </a:r>
+                    </a:p>
+                    <a:p>
+                      <a:endParaRPr lang="pt-BR" dirty="0">
+                        <a:solidFill>
+                          <a:srgbClr val="DBA1A1"/>
+                        </a:solidFill>
+                        <a:latin typeface="Agency FB" panose="020B0503020202020204" pitchFamily="34" charset="0"/>
+                      </a:endParaRPr>
+                    </a:p>
+                  </a:txBody>
+                  <a:tcPr>
+                    <a:lnL w="12700" cap="flat" cmpd="sng" algn="ctr">
+                      <a:noFill/>
+                      <a:prstDash val="solid"/>
+                      <a:round/>
+                      <a:headEnd type="none" w="med" len="med"/>
+                      <a:tailEnd type="none" w="med" len="med"/>
+                    </a:lnL>
+                    <a:lnR w="12700" cap="flat" cmpd="sng" algn="ctr">
+                      <a:noFill/>
+                      <a:prstDash val="solid"/>
+                      <a:round/>
+                      <a:headEnd type="none" w="med" len="med"/>
+                      <a:tailEnd type="none" w="med" len="med"/>
+                    </a:lnR>
+                    <a:lnT w="12700" cap="flat" cmpd="sng" algn="ctr">
+                      <a:noFill/>
+                      <a:prstDash val="solid"/>
+                      <a:round/>
+                      <a:headEnd type="none" w="med" len="med"/>
+                      <a:tailEnd type="none" w="med" len="med"/>
+                    </a:lnT>
+                    <a:lnB w="12700" cap="flat" cmpd="sng" algn="ctr">
+                      <a:noFill/>
+                      <a:prstDash val="solid"/>
+                      <a:round/>
+                      <a:headEnd type="none" w="med" len="med"/>
+                      <a:tailEnd type="none" w="med" len="med"/>
+                    </a:lnB>
+                    <a:lnTlToBr w="12700" cmpd="sng">
+                      <a:noFill/>
+                      <a:prstDash val="solid"/>
+                    </a:lnTlToBr>
+                    <a:lnBlToTr w="12700" cmpd="sng">
+                      <a:noFill/>
+                      <a:prstDash val="solid"/>
+                    </a:lnBlToTr>
+                    <a:solidFill>
+                      <a:srgbClr val="5B616F"/>
+                    </a:solidFill>
+                  </a:tcPr>
+                </a:tc>
+                <a:extLst>
+                  <a:ext uri="{0D108BD9-81ED-4DB2-BD59-A6C34878D82A}">
+                    <a16:rowId xmlns:a16="http://schemas.microsoft.com/office/drawing/2014/main" val="3034851657"/>
+                  </a:ext>
+                </a:extLst>
+              </a:tr>
+              <a:tr h="370840">
+                <a:tc vMerge="1">
+                  <a:txBody>
+                    <a:bodyPr/>
+                    <a:lstStyle/>
+                    <a:p>
+                      <a:endParaRPr lang="pt-BR" dirty="0"/>
+                    </a:p>
+                  </a:txBody>
+                  <a:tcPr/>
+                </a:tc>
+                <a:tc>
+                  <a:txBody>
+                    <a:bodyPr/>
+                    <a:lstStyle/>
+                    <a:p>
+                      <a:r>
+                        <a:rPr lang="pt-BR" sz="1800" kern="1200" dirty="0">
+                          <a:solidFill>
+                            <a:srgbClr val="DBA1A1"/>
+                          </a:solidFill>
+                          <a:effectLst/>
+                          <a:latin typeface="Agency FB" panose="020B0503020202020204" pitchFamily="34" charset="0"/>
+                          <a:ea typeface="+mn-ea"/>
+                          <a:cs typeface="+mn-cs"/>
+                        </a:rPr>
+                        <a:t>Cadastrar Refeições </a:t>
+                      </a:r>
+                    </a:p>
+                    <a:p>
+                      <a:r>
+                        <a:rPr lang="pt-BR" sz="1800" kern="1200" dirty="0">
+                          <a:solidFill>
+                            <a:srgbClr val="DBA1A1"/>
+                          </a:solidFill>
+                          <a:effectLst/>
+                          <a:latin typeface="Agency FB" panose="020B0503020202020204" pitchFamily="34" charset="0"/>
+                          <a:ea typeface="+mn-ea"/>
+                          <a:cs typeface="+mn-cs"/>
+                        </a:rPr>
+                        <a:t>- Nomes acima de 30 caracteres serão abreviados.</a:t>
+                      </a:r>
+                    </a:p>
+                    <a:p>
+                      <a:r>
+                        <a:rPr lang="pt-BR" sz="1800" kern="1200" dirty="0">
+                          <a:solidFill>
+                            <a:srgbClr val="DBA1A1"/>
+                          </a:solidFill>
+                          <a:effectLst/>
+                          <a:latin typeface="Agency FB" panose="020B0503020202020204" pitchFamily="34" charset="0"/>
+                          <a:ea typeface="+mn-ea"/>
+                          <a:cs typeface="+mn-cs"/>
+                        </a:rPr>
+                        <a:t>	Usabilidade</a:t>
+                      </a:r>
+                    </a:p>
+                    <a:p>
+                      <a:r>
+                        <a:rPr lang="pt-BR" sz="1800" kern="1200" dirty="0">
+                          <a:solidFill>
+                            <a:srgbClr val="DBA1A1"/>
+                          </a:solidFill>
+                          <a:effectLst/>
+                          <a:latin typeface="Agency FB" panose="020B0503020202020204" pitchFamily="34" charset="0"/>
+                          <a:ea typeface="+mn-ea"/>
+                          <a:cs typeface="+mn-cs"/>
+                        </a:rPr>
+                        <a:t>	Obrigatório</a:t>
+                      </a:r>
+                    </a:p>
+                    <a:p>
+                      <a:endParaRPr lang="pt-BR" dirty="0">
+                        <a:solidFill>
+                          <a:srgbClr val="DBA1A1"/>
+                        </a:solidFill>
+                        <a:latin typeface="Agency FB" panose="020B0503020202020204" pitchFamily="34" charset="0"/>
+                      </a:endParaRPr>
+                    </a:p>
+                  </a:txBody>
+                  <a:tcPr>
+                    <a:lnL w="12700" cap="flat" cmpd="sng" algn="ctr">
+                      <a:noFill/>
+                      <a:prstDash val="solid"/>
+                      <a:round/>
+                      <a:headEnd type="none" w="med" len="med"/>
+                      <a:tailEnd type="none" w="med" len="med"/>
+                    </a:lnL>
+                    <a:lnR w="12700" cap="flat" cmpd="sng" algn="ctr">
+                      <a:noFill/>
+                      <a:prstDash val="solid"/>
+                      <a:round/>
+                      <a:headEnd type="none" w="med" len="med"/>
+                      <a:tailEnd type="none" w="med" len="med"/>
+                    </a:lnR>
+                    <a:lnT w="12700" cap="flat" cmpd="sng" algn="ctr">
+                      <a:noFill/>
+                      <a:prstDash val="solid"/>
+                      <a:round/>
+                      <a:headEnd type="none" w="med" len="med"/>
+                      <a:tailEnd type="none" w="med" len="med"/>
+                    </a:lnT>
+                    <a:lnB w="12700" cap="flat" cmpd="sng" algn="ctr">
+                      <a:noFill/>
+                      <a:prstDash val="solid"/>
+                      <a:round/>
+                      <a:headEnd type="none" w="med" len="med"/>
+                      <a:tailEnd type="none" w="med" len="med"/>
+                    </a:lnB>
+                    <a:lnTlToBr w="12700" cmpd="sng">
+                      <a:noFill/>
+                      <a:prstDash val="solid"/>
+                    </a:lnTlToBr>
+                    <a:lnBlToTr w="12700" cmpd="sng">
+                      <a:noFill/>
+                      <a:prstDash val="solid"/>
+                    </a:lnBlToTr>
+                    <a:solidFill>
+                      <a:srgbClr val="5B616F"/>
+                    </a:solidFill>
+                  </a:tcPr>
+                </a:tc>
+                <a:extLst>
+                  <a:ext uri="{0D108BD9-81ED-4DB2-BD59-A6C34878D82A}">
+                    <a16:rowId xmlns:a16="http://schemas.microsoft.com/office/drawing/2014/main" val="2678225723"/>
+                  </a:ext>
+                </a:extLst>
+              </a:tr>
+              <a:tr h="370840">
+                <a:tc vMerge="1">
+                  <a:txBody>
+                    <a:bodyPr/>
+                    <a:lstStyle/>
+                    <a:p>
+                      <a:endParaRPr lang="pt-BR" dirty="0"/>
+                    </a:p>
+                  </a:txBody>
+                  <a:tcPr/>
+                </a:tc>
+                <a:tc>
+                  <a:txBody>
+                    <a:bodyPr/>
+                    <a:lstStyle/>
+                    <a:p>
+                      <a:r>
+                        <a:rPr lang="pt-BR" sz="1800" kern="1200" dirty="0">
+                          <a:solidFill>
+                            <a:srgbClr val="DBA1A1"/>
+                          </a:solidFill>
+                          <a:effectLst/>
+                          <a:latin typeface="Agency FB" panose="020B0503020202020204" pitchFamily="34" charset="0"/>
+                          <a:ea typeface="+mn-ea"/>
+                          <a:cs typeface="+mn-cs"/>
+                        </a:rPr>
+                        <a:t>Cadastrar Porções de Alimentos</a:t>
+                      </a:r>
+                    </a:p>
+                    <a:p>
+                      <a:r>
+                        <a:rPr lang="pt-BR" sz="1800" kern="1200" dirty="0">
+                          <a:solidFill>
+                            <a:srgbClr val="DBA1A1"/>
+                          </a:solidFill>
+                          <a:effectLst/>
+                          <a:latin typeface="Agency FB" panose="020B0503020202020204" pitchFamily="34" charset="0"/>
+                          <a:ea typeface="+mn-ea"/>
+                          <a:cs typeface="+mn-cs"/>
+                        </a:rPr>
+                        <a:t>- As especificações da porção ficaram no campo de observações.</a:t>
+                      </a:r>
+                    </a:p>
+                    <a:p>
+                      <a:r>
+                        <a:rPr lang="pt-BR" sz="1800" kern="1200" dirty="0">
+                          <a:solidFill>
+                            <a:srgbClr val="DBA1A1"/>
+                          </a:solidFill>
+                          <a:effectLst/>
+                          <a:latin typeface="Agency FB" panose="020B0503020202020204" pitchFamily="34" charset="0"/>
+                          <a:ea typeface="+mn-ea"/>
+                          <a:cs typeface="+mn-cs"/>
+                        </a:rPr>
+                        <a:t>	Usabilidade</a:t>
+                      </a:r>
+                    </a:p>
+                    <a:p>
+                      <a:r>
+                        <a:rPr lang="pt-BR" sz="1800" kern="1200" dirty="0">
+                          <a:solidFill>
+                            <a:srgbClr val="DBA1A1"/>
+                          </a:solidFill>
+                          <a:effectLst/>
+                          <a:latin typeface="Agency FB" panose="020B0503020202020204" pitchFamily="34" charset="0"/>
+                          <a:ea typeface="+mn-ea"/>
+                          <a:cs typeface="+mn-cs"/>
+                        </a:rPr>
+                        <a:t>	Obrigatório</a:t>
+                      </a:r>
+                    </a:p>
+                  </a:txBody>
+                  <a:tcPr>
+                    <a:lnL w="12700" cap="flat" cmpd="sng" algn="ctr">
+                      <a:noFill/>
+                      <a:prstDash val="solid"/>
+                      <a:round/>
+                      <a:headEnd type="none" w="med" len="med"/>
+                      <a:tailEnd type="none" w="med" len="med"/>
+                    </a:lnL>
+                    <a:lnR w="12700" cap="flat" cmpd="sng" algn="ctr">
+                      <a:noFill/>
+                      <a:prstDash val="solid"/>
+                      <a:round/>
+                      <a:headEnd type="none" w="med" len="med"/>
+                      <a:tailEnd type="none" w="med" len="med"/>
+                    </a:lnR>
+                    <a:lnT w="12700" cap="flat" cmpd="sng" algn="ctr">
+                      <a:noFill/>
+                      <a:prstDash val="solid"/>
+                      <a:round/>
+                      <a:headEnd type="none" w="med" len="med"/>
+                      <a:tailEnd type="none" w="med" len="med"/>
+                    </a:lnT>
+                    <a:lnB w="12700" cap="flat" cmpd="sng" algn="ctr">
+                      <a:noFill/>
+                      <a:prstDash val="solid"/>
+                      <a:round/>
+                      <a:headEnd type="none" w="med" len="med"/>
+                      <a:tailEnd type="none" w="med" len="med"/>
+                    </a:lnB>
+                    <a:lnTlToBr w="12700" cmpd="sng">
+                      <a:noFill/>
+                      <a:prstDash val="solid"/>
+                    </a:lnTlToBr>
+                    <a:lnBlToTr w="12700" cmpd="sng">
+                      <a:noFill/>
+                      <a:prstDash val="solid"/>
+                    </a:lnBlToTr>
+                    <a:solidFill>
+                      <a:srgbClr val="5B616F"/>
+                    </a:solidFill>
+                  </a:tcPr>
+                </a:tc>
+                <a:extLst>
+                  <a:ext uri="{0D108BD9-81ED-4DB2-BD59-A6C34878D82A}">
+                    <a16:rowId xmlns:a16="http://schemas.microsoft.com/office/drawing/2014/main" val="1646411524"/>
+                  </a:ext>
+                </a:extLst>
+              </a:tr>
+              <a:tr h="370840">
+                <a:tc vMerge="1">
+                  <a:txBody>
+                    <a:bodyPr/>
+                    <a:lstStyle/>
+                    <a:p>
+                      <a:endParaRPr lang="pt-BR" dirty="0"/>
+                    </a:p>
+                  </a:txBody>
+                  <a:tcPr/>
+                </a:tc>
+                <a:tc>
+                  <a:txBody>
+                    <a:bodyPr/>
+                    <a:lstStyle/>
+                    <a:p>
+                      <a:r>
+                        <a:rPr lang="pt-BR" sz="1800" kern="1200" dirty="0">
+                          <a:solidFill>
+                            <a:srgbClr val="DBA1A1"/>
+                          </a:solidFill>
+                          <a:effectLst/>
+                          <a:latin typeface="Agency FB" panose="020B0503020202020204" pitchFamily="34" charset="0"/>
+                          <a:ea typeface="+mn-ea"/>
+                          <a:cs typeface="+mn-cs"/>
+                        </a:rPr>
+                        <a:t>Cadastrar Dietas</a:t>
+                      </a:r>
+                    </a:p>
+                    <a:p>
+                      <a:r>
+                        <a:rPr lang="pt-BR" sz="1800" kern="1200" dirty="0">
+                          <a:solidFill>
+                            <a:srgbClr val="DBA1A1"/>
+                          </a:solidFill>
+                          <a:effectLst/>
+                          <a:latin typeface="Agency FB" panose="020B0503020202020204" pitchFamily="34" charset="0"/>
+                          <a:ea typeface="+mn-ea"/>
+                          <a:cs typeface="+mn-cs"/>
+                        </a:rPr>
+                        <a:t>	Implementação</a:t>
+                      </a:r>
+                    </a:p>
+                    <a:p>
+                      <a:r>
+                        <a:rPr lang="pt-BR" sz="1800" kern="1200" dirty="0">
+                          <a:solidFill>
+                            <a:srgbClr val="DBA1A1"/>
+                          </a:solidFill>
+                          <a:effectLst/>
+                          <a:latin typeface="Agency FB" panose="020B0503020202020204" pitchFamily="34" charset="0"/>
+                          <a:ea typeface="+mn-ea"/>
+                          <a:cs typeface="+mn-cs"/>
+                        </a:rPr>
+                        <a:t>	Obrigatório</a:t>
+                      </a:r>
+                      <a:endParaRPr lang="pt-BR" dirty="0">
+                        <a:solidFill>
+                          <a:srgbClr val="DBA1A1"/>
+                        </a:solidFill>
+                        <a:latin typeface="Agency FB" panose="020B0503020202020204" pitchFamily="34" charset="0"/>
+                      </a:endParaRPr>
+                    </a:p>
+                  </a:txBody>
+                  <a:tcPr>
+                    <a:lnL w="12700" cap="flat" cmpd="sng" algn="ctr">
+                      <a:noFill/>
+                      <a:prstDash val="solid"/>
+                      <a:round/>
+                      <a:headEnd type="none" w="med" len="med"/>
+                      <a:tailEnd type="none" w="med" len="med"/>
+                    </a:lnL>
+                    <a:lnR w="12700" cap="flat" cmpd="sng" algn="ctr">
+                      <a:noFill/>
+                      <a:prstDash val="solid"/>
+                      <a:round/>
+                      <a:headEnd type="none" w="med" len="med"/>
+                      <a:tailEnd type="none" w="med" len="med"/>
+                    </a:lnR>
+                    <a:lnT w="12700" cap="flat" cmpd="sng" algn="ctr">
+                      <a:noFill/>
+                      <a:prstDash val="solid"/>
+                      <a:round/>
+                      <a:headEnd type="none" w="med" len="med"/>
+                      <a:tailEnd type="none" w="med" len="med"/>
+                    </a:lnT>
+                    <a:lnB w="12700" cap="flat" cmpd="sng" algn="ctr">
+                      <a:noFill/>
+                      <a:prstDash val="solid"/>
+                      <a:round/>
+                      <a:headEnd type="none" w="med" len="med"/>
+                      <a:tailEnd type="none" w="med" len="med"/>
+                    </a:lnB>
+                    <a:lnTlToBr w="12700" cmpd="sng">
+                      <a:noFill/>
+                      <a:prstDash val="solid"/>
+                    </a:lnTlToBr>
+                    <a:lnBlToTr w="12700" cmpd="sng">
+                      <a:noFill/>
+                      <a:prstDash val="solid"/>
+                    </a:lnBlToTr>
+                    <a:solidFill>
+                      <a:srgbClr val="5B616F"/>
+                    </a:solidFill>
+                  </a:tcPr>
+                </a:tc>
+                <a:extLst>
+                  <a:ext uri="{0D108BD9-81ED-4DB2-BD59-A6C34878D82A}">
+                    <a16:rowId xmlns:a16="http://schemas.microsoft.com/office/drawing/2014/main" val="1030401757"/>
+                  </a:ext>
+                </a:extLst>
+              </a:tr>
+            </a:tbl>
+          </a:graphicData>
+        </a:graphic>
+      </p:graphicFrame>
     </p:spTree>
     <p:extLst>
       <p:ext uri="{BB962C8B-B14F-4D97-AF65-F5344CB8AC3E}">
-        <p14:creationId xmlns:p14="http://schemas.microsoft.com/office/powerpoint/2010/main" val="4131136740"/>
+        <p14:creationId xmlns:p14="http://schemas.microsoft.com/office/powerpoint/2010/main" val="1815053638"/>
+      </p:ext>
+    </p:extLst>
+  </p:cSld>
+  <p:clrMapOvr>
+    <a:masterClrMapping/>
+  </p:clrMapOvr>
+</p:sld>
+</file>
+
+<file path=ppt/slides/slide8.xml><?xml version="1.0" encoding="utf-8"?>
+<p:sld xmlns:a="http://schemas.openxmlformats.org/drawingml/2006/main" xmlns:r="http://schemas.openxmlformats.org/officeDocument/2006/relationships" xmlns:p="http://schemas.openxmlformats.org/presentationml/2006/main">
+  <p:cSld>
+    <p:bg>
+      <p:bgPr>
+        <a:solidFill>
+          <a:srgbClr val="5B616F"/>
+        </a:solidFill>
+        <a:effectLst/>
+      </p:bgPr>
+    </p:bg>
+    <p:spTree>
+      <p:nvGrpSpPr>
+        <p:cNvPr id="1" name=""/>
+        <p:cNvGrpSpPr/>
+        <p:nvPr/>
+      </p:nvGrpSpPr>
+      <p:grpSpPr>
+        <a:xfrm>
+          <a:off x="0" y="0"/>
+          <a:ext cx="0" cy="0"/>
+          <a:chOff x="0" y="0"/>
+          <a:chExt cx="0" cy="0"/>
+        </a:xfrm>
+      </p:grpSpPr>
+      <p:sp>
+        <p:nvSpPr>
+          <p:cNvPr id="2" name="Retângulo 1">
+            <a:extLst>
+              <a:ext uri="{FF2B5EF4-FFF2-40B4-BE49-F238E27FC236}">
+                <a16:creationId xmlns:a16="http://schemas.microsoft.com/office/drawing/2014/main" id="{8C911EF0-0065-4173-87F6-89015AA6DCA1}"/>
+              </a:ext>
+            </a:extLst>
+          </p:cNvPr>
+          <p:cNvSpPr/>
+          <p:nvPr/>
+        </p:nvSpPr>
+        <p:spPr>
+          <a:xfrm rot="5400000">
+            <a:off x="5542547" y="-5542545"/>
+            <a:ext cx="1106907" cy="12192000"/>
+          </a:xfrm>
+          <a:prstGeom prst="rect">
+            <a:avLst/>
+          </a:prstGeom>
+          <a:solidFill>
+            <a:srgbClr val="DBA1A1"/>
+          </a:solidFill>
+          <a:ln>
+            <a:noFill/>
+          </a:ln>
+        </p:spPr>
+        <p:style>
+          <a:lnRef idx="2">
+            <a:schemeClr val="accent1">
+              <a:shade val="50000"/>
+            </a:schemeClr>
+          </a:lnRef>
+          <a:fillRef idx="1">
+            <a:schemeClr val="accent1"/>
+          </a:fillRef>
+          <a:effectRef idx="0">
+            <a:schemeClr val="accent1"/>
+          </a:effectRef>
+          <a:fontRef idx="minor">
+            <a:schemeClr val="lt1"/>
+          </a:fontRef>
+        </p:style>
+        <p:txBody>
+          <a:bodyPr rtlCol="0" anchor="ctr"/>
+          <a:lstStyle/>
+          <a:p>
+            <a:pPr algn="ctr"/>
+            <a:endParaRPr lang="pt-BR" dirty="0">
+              <a:ln>
+                <a:solidFill>
+                  <a:srgbClr val="DBA1A1"/>
+                </a:solidFill>
+              </a:ln>
+              <a:solidFill>
+                <a:srgbClr val="DBA1A1"/>
+              </a:solidFill>
+            </a:endParaRPr>
+          </a:p>
+        </p:txBody>
+      </p:sp>
+      <p:sp>
+        <p:nvSpPr>
+          <p:cNvPr id="3" name="CaixaDeTexto 2">
+            <a:extLst>
+              <a:ext uri="{FF2B5EF4-FFF2-40B4-BE49-F238E27FC236}">
+                <a16:creationId xmlns:a16="http://schemas.microsoft.com/office/drawing/2014/main" id="{EA906822-E252-4415-BE2C-766952557E58}"/>
+              </a:ext>
+            </a:extLst>
+          </p:cNvPr>
+          <p:cNvSpPr txBox="1"/>
+          <p:nvPr/>
+        </p:nvSpPr>
+        <p:spPr>
+          <a:xfrm>
+            <a:off x="3043797" y="199512"/>
+            <a:ext cx="6658133" cy="707886"/>
+          </a:xfrm>
+          <a:prstGeom prst="rect">
+            <a:avLst/>
+          </a:prstGeom>
+          <a:noFill/>
+        </p:spPr>
+        <p:txBody>
+          <a:bodyPr wrap="square" rtlCol="0">
+            <a:spAutoFit/>
+          </a:bodyPr>
+          <a:lstStyle/>
+          <a:p>
+            <a:pPr algn="ctr"/>
+            <a:r>
+              <a:rPr lang="pt-BR" sz="4000" dirty="0">
+                <a:solidFill>
+                  <a:srgbClr val="5B616F"/>
+                </a:solidFill>
+                <a:latin typeface="Agency FB" panose="020B0503020202020204" pitchFamily="34" charset="0"/>
+              </a:rPr>
+              <a:t>Requisitos Funcionais e Não Funcionais</a:t>
+            </a:r>
+          </a:p>
+        </p:txBody>
+      </p:sp>
+      <p:graphicFrame>
+        <p:nvGraphicFramePr>
+          <p:cNvPr id="4" name="Tabela 4">
+            <a:extLst>
+              <a:ext uri="{FF2B5EF4-FFF2-40B4-BE49-F238E27FC236}">
+                <a16:creationId xmlns:a16="http://schemas.microsoft.com/office/drawing/2014/main" id="{0D65BD39-23AE-4817-883A-7F07F263DD1C}"/>
+              </a:ext>
+            </a:extLst>
+          </p:cNvPr>
+          <p:cNvGraphicFramePr>
+            <a:graphicFrameLocks noGrp="1"/>
+          </p:cNvGraphicFramePr>
+          <p:nvPr>
+            <p:extLst>
+              <p:ext uri="{D42A27DB-BD31-4B8C-83A1-F6EECF244321}">
+                <p14:modId xmlns:p14="http://schemas.microsoft.com/office/powerpoint/2010/main" val="2927639210"/>
+              </p:ext>
+            </p:extLst>
+          </p:nvPr>
+        </p:nvGraphicFramePr>
+        <p:xfrm>
+          <a:off x="846537" y="1106909"/>
+          <a:ext cx="10853490" cy="5674360"/>
+        </p:xfrm>
+        <a:graphic>
+          <a:graphicData uri="http://schemas.openxmlformats.org/drawingml/2006/table">
+            <a:tbl>
+              <a:tblPr firstRow="1" bandRow="1">
+                <a:tableStyleId>{5C22544A-7EE6-4342-B048-85BDC9FD1C3A}</a:tableStyleId>
+              </a:tblPr>
+              <a:tblGrid>
+                <a:gridCol w="5426745">
+                  <a:extLst>
+                    <a:ext uri="{9D8B030D-6E8A-4147-A177-3AD203B41FA5}">
+                      <a16:colId xmlns:a16="http://schemas.microsoft.com/office/drawing/2014/main" val="2504239251"/>
+                    </a:ext>
+                  </a:extLst>
+                </a:gridCol>
+                <a:gridCol w="5426745">
+                  <a:extLst>
+                    <a:ext uri="{9D8B030D-6E8A-4147-A177-3AD203B41FA5}">
+                      <a16:colId xmlns:a16="http://schemas.microsoft.com/office/drawing/2014/main" val="354975263"/>
+                    </a:ext>
+                  </a:extLst>
+                </a:gridCol>
+              </a:tblGrid>
+              <a:tr h="370840">
+                <a:tc>
+                  <a:txBody>
+                    <a:bodyPr/>
+                    <a:lstStyle/>
+                    <a:p>
+                      <a:r>
+                        <a:rPr lang="pt-BR" dirty="0">
+                          <a:solidFill>
+                            <a:srgbClr val="DBA1A1"/>
+                          </a:solidFill>
+                          <a:latin typeface="Agency FB" panose="020B0503020202020204" pitchFamily="34" charset="0"/>
+                        </a:rPr>
+                        <a:t>Funcional</a:t>
+                      </a:r>
+                    </a:p>
+                  </a:txBody>
+                  <a:tcPr>
+                    <a:lnL w="12700" cap="flat" cmpd="sng" algn="ctr">
+                      <a:noFill/>
+                      <a:prstDash val="solid"/>
+                      <a:round/>
+                      <a:headEnd type="none" w="med" len="med"/>
+                      <a:tailEnd type="none" w="med" len="med"/>
+                    </a:lnL>
+                    <a:lnR w="12700" cap="flat" cmpd="sng" algn="ctr">
+                      <a:noFill/>
+                      <a:prstDash val="solid"/>
+                      <a:round/>
+                      <a:headEnd type="none" w="med" len="med"/>
+                      <a:tailEnd type="none" w="med" len="med"/>
+                    </a:lnR>
+                    <a:lnT w="12700" cap="flat" cmpd="sng" algn="ctr">
+                      <a:noFill/>
+                      <a:prstDash val="solid"/>
+                      <a:round/>
+                      <a:headEnd type="none" w="med" len="med"/>
+                      <a:tailEnd type="none" w="med" len="med"/>
+                    </a:lnT>
+                    <a:lnB w="12700" cap="flat" cmpd="sng" algn="ctr">
+                      <a:noFill/>
+                      <a:prstDash val="solid"/>
+                      <a:round/>
+                      <a:headEnd type="none" w="med" len="med"/>
+                      <a:tailEnd type="none" w="med" len="med"/>
+                    </a:lnB>
+                    <a:lnTlToBr w="12700" cmpd="sng">
+                      <a:noFill/>
+                      <a:prstDash val="solid"/>
+                    </a:lnTlToBr>
+                    <a:lnBlToTr w="12700" cmpd="sng">
+                      <a:noFill/>
+                      <a:prstDash val="solid"/>
+                    </a:lnBlToTr>
+                    <a:solidFill>
+                      <a:srgbClr val="5B616F"/>
+                    </a:solidFill>
+                  </a:tcPr>
+                </a:tc>
+                <a:tc>
+                  <a:txBody>
+                    <a:bodyPr/>
+                    <a:lstStyle/>
+                    <a:p>
+                      <a:r>
+                        <a:rPr lang="pt-BR" dirty="0">
+                          <a:solidFill>
+                            <a:srgbClr val="DBA1A1"/>
+                          </a:solidFill>
+                          <a:latin typeface="Agency FB" panose="020B0503020202020204" pitchFamily="34" charset="0"/>
+                        </a:rPr>
+                        <a:t>Não Funcional</a:t>
+                      </a:r>
+                    </a:p>
+                  </a:txBody>
+                  <a:tcPr>
+                    <a:lnL w="12700" cap="flat" cmpd="sng" algn="ctr">
+                      <a:noFill/>
+                      <a:prstDash val="solid"/>
+                      <a:round/>
+                      <a:headEnd type="none" w="med" len="med"/>
+                      <a:tailEnd type="none" w="med" len="med"/>
+                    </a:lnL>
+                    <a:lnR w="12700" cap="flat" cmpd="sng" algn="ctr">
+                      <a:noFill/>
+                      <a:prstDash val="solid"/>
+                      <a:round/>
+                      <a:headEnd type="none" w="med" len="med"/>
+                      <a:tailEnd type="none" w="med" len="med"/>
+                    </a:lnR>
+                    <a:lnT w="12700" cap="flat" cmpd="sng" algn="ctr">
+                      <a:noFill/>
+                      <a:prstDash val="solid"/>
+                      <a:round/>
+                      <a:headEnd type="none" w="med" len="med"/>
+                      <a:tailEnd type="none" w="med" len="med"/>
+                    </a:lnT>
+                    <a:lnB w="12700" cap="flat" cmpd="sng" algn="ctr">
+                      <a:noFill/>
+                      <a:prstDash val="solid"/>
+                      <a:round/>
+                      <a:headEnd type="none" w="med" len="med"/>
+                      <a:tailEnd type="none" w="med" len="med"/>
+                    </a:lnB>
+                    <a:lnTlToBr w="12700" cmpd="sng">
+                      <a:noFill/>
+                      <a:prstDash val="solid"/>
+                    </a:lnTlToBr>
+                    <a:lnBlToTr w="12700" cmpd="sng">
+                      <a:noFill/>
+                      <a:prstDash val="solid"/>
+                    </a:lnBlToTr>
+                    <a:solidFill>
+                      <a:srgbClr val="5B616F"/>
+                    </a:solidFill>
+                  </a:tcPr>
+                </a:tc>
+                <a:extLst>
+                  <a:ext uri="{0D108BD9-81ED-4DB2-BD59-A6C34878D82A}">
+                    <a16:rowId xmlns:a16="http://schemas.microsoft.com/office/drawing/2014/main" val="2395872218"/>
+                  </a:ext>
+                </a:extLst>
+              </a:tr>
+              <a:tr h="370840">
+                <a:tc rowSpan="4">
+                  <a:txBody>
+                    <a:bodyPr/>
+                    <a:lstStyle/>
+                    <a:p>
+                      <a:pPr algn="l"/>
+                      <a:r>
+                        <a:rPr lang="pt-BR" sz="1800" kern="1200" dirty="0">
+                          <a:solidFill>
+                            <a:srgbClr val="DBA1A1"/>
+                          </a:solidFill>
+                          <a:effectLst/>
+                          <a:latin typeface="Agency FB" panose="020B0503020202020204" pitchFamily="34" charset="0"/>
+                          <a:ea typeface="+mn-ea"/>
+                          <a:cs typeface="+mn-cs"/>
+                        </a:rPr>
+                        <a:t>Editar -  O usuário poderá editar os itens que já estão incluídos no banco de dados.</a:t>
+                      </a:r>
+                      <a:endParaRPr lang="pt-BR" dirty="0">
+                        <a:solidFill>
+                          <a:srgbClr val="DBA1A1"/>
+                        </a:solidFill>
+                        <a:latin typeface="Agency FB" panose="020B0503020202020204" pitchFamily="34" charset="0"/>
+                      </a:endParaRPr>
+                    </a:p>
+                  </a:txBody>
+                  <a:tcPr>
+                    <a:lnL w="12700" cap="flat" cmpd="sng" algn="ctr">
+                      <a:noFill/>
+                      <a:prstDash val="solid"/>
+                      <a:round/>
+                      <a:headEnd type="none" w="med" len="med"/>
+                      <a:tailEnd type="none" w="med" len="med"/>
+                    </a:lnL>
+                    <a:lnR w="12700" cap="flat" cmpd="sng" algn="ctr">
+                      <a:noFill/>
+                      <a:prstDash val="solid"/>
+                      <a:round/>
+                      <a:headEnd type="none" w="med" len="med"/>
+                      <a:tailEnd type="none" w="med" len="med"/>
+                    </a:lnR>
+                    <a:lnT w="12700" cap="flat" cmpd="sng" algn="ctr">
+                      <a:noFill/>
+                      <a:prstDash val="solid"/>
+                      <a:round/>
+                      <a:headEnd type="none" w="med" len="med"/>
+                      <a:tailEnd type="none" w="med" len="med"/>
+                    </a:lnT>
+                    <a:lnB w="12700" cap="flat" cmpd="sng" algn="ctr">
+                      <a:noFill/>
+                      <a:prstDash val="solid"/>
+                      <a:round/>
+                      <a:headEnd type="none" w="med" len="med"/>
+                      <a:tailEnd type="none" w="med" len="med"/>
+                    </a:lnB>
+                    <a:lnTlToBr w="12700" cmpd="sng">
+                      <a:noFill/>
+                      <a:prstDash val="solid"/>
+                    </a:lnTlToBr>
+                    <a:lnBlToTr w="12700" cmpd="sng">
+                      <a:noFill/>
+                      <a:prstDash val="solid"/>
+                    </a:lnBlToTr>
+                    <a:solidFill>
+                      <a:srgbClr val="5B616F"/>
+                    </a:solidFill>
+                  </a:tcPr>
+                </a:tc>
+                <a:tc>
+                  <a:txBody>
+                    <a:bodyPr/>
+                    <a:lstStyle/>
+                    <a:p>
+                      <a:pPr marL="0" marR="0" lvl="0" indent="0" algn="l" defTabSz="914400" rtl="0" eaLnBrk="1" fontAlgn="auto" latinLnBrk="0" hangingPunct="1">
+                        <a:lnSpc>
+                          <a:spcPct val="100000"/>
+                        </a:lnSpc>
+                        <a:spcBef>
+                          <a:spcPts val="0"/>
+                        </a:spcBef>
+                        <a:spcAft>
+                          <a:spcPts val="0"/>
+                        </a:spcAft>
+                        <a:buClrTx/>
+                        <a:buSzTx/>
+                        <a:buFontTx/>
+                        <a:buNone/>
+                        <a:tabLst/>
+                        <a:defRPr/>
+                      </a:pPr>
+                      <a:r>
+                        <a:rPr lang="pt-BR" sz="1800" kern="1200" dirty="0">
+                          <a:solidFill>
+                            <a:srgbClr val="DBA1A1"/>
+                          </a:solidFill>
+                          <a:effectLst/>
+                          <a:latin typeface="Agency FB" panose="020B0503020202020204" pitchFamily="34" charset="0"/>
+                          <a:ea typeface="+mn-ea"/>
+                          <a:cs typeface="+mn-cs"/>
+                        </a:rPr>
+                        <a:t>Só deve ser editado um item por vez.</a:t>
+                      </a:r>
+                    </a:p>
+                    <a:p>
+                      <a:r>
+                        <a:rPr lang="pt-BR" sz="1800" kern="1200" dirty="0">
+                          <a:solidFill>
+                            <a:srgbClr val="DBA1A1"/>
+                          </a:solidFill>
+                          <a:effectLst/>
+                          <a:latin typeface="Agency FB" panose="020B0503020202020204" pitchFamily="34" charset="0"/>
+                          <a:ea typeface="+mn-ea"/>
+                          <a:cs typeface="+mn-cs"/>
+                        </a:rPr>
+                        <a:t>- O usuário não será permitido escolher dois itens ao mesmo tempo.	Usabilidade</a:t>
+                      </a:r>
+                    </a:p>
+                    <a:p>
+                      <a:r>
+                        <a:rPr lang="pt-BR" sz="1800" kern="1200" dirty="0">
+                          <a:solidFill>
+                            <a:srgbClr val="DBA1A1"/>
+                          </a:solidFill>
+                          <a:effectLst/>
+                          <a:latin typeface="Agency FB" panose="020B0503020202020204" pitchFamily="34" charset="0"/>
+                          <a:ea typeface="+mn-ea"/>
+                          <a:cs typeface="+mn-cs"/>
+                        </a:rPr>
+                        <a:t>	Obrigatório</a:t>
+                      </a:r>
+                    </a:p>
+                    <a:p>
+                      <a:endParaRPr lang="pt-BR" dirty="0">
+                        <a:solidFill>
+                          <a:srgbClr val="DBA1A1"/>
+                        </a:solidFill>
+                        <a:latin typeface="Agency FB" panose="020B0503020202020204" pitchFamily="34" charset="0"/>
+                      </a:endParaRPr>
+                    </a:p>
+                  </a:txBody>
+                  <a:tcPr>
+                    <a:lnL w="12700" cap="flat" cmpd="sng" algn="ctr">
+                      <a:noFill/>
+                      <a:prstDash val="solid"/>
+                      <a:round/>
+                      <a:headEnd type="none" w="med" len="med"/>
+                      <a:tailEnd type="none" w="med" len="med"/>
+                    </a:lnL>
+                    <a:lnR w="12700" cap="flat" cmpd="sng" algn="ctr">
+                      <a:noFill/>
+                      <a:prstDash val="solid"/>
+                      <a:round/>
+                      <a:headEnd type="none" w="med" len="med"/>
+                      <a:tailEnd type="none" w="med" len="med"/>
+                    </a:lnR>
+                    <a:lnT w="12700" cap="flat" cmpd="sng" algn="ctr">
+                      <a:noFill/>
+                      <a:prstDash val="solid"/>
+                      <a:round/>
+                      <a:headEnd type="none" w="med" len="med"/>
+                      <a:tailEnd type="none" w="med" len="med"/>
+                    </a:lnT>
+                    <a:lnB w="12700" cap="flat" cmpd="sng" algn="ctr">
+                      <a:noFill/>
+                      <a:prstDash val="solid"/>
+                      <a:round/>
+                      <a:headEnd type="none" w="med" len="med"/>
+                      <a:tailEnd type="none" w="med" len="med"/>
+                    </a:lnB>
+                    <a:lnTlToBr w="12700" cmpd="sng">
+                      <a:noFill/>
+                      <a:prstDash val="solid"/>
+                    </a:lnTlToBr>
+                    <a:lnBlToTr w="12700" cmpd="sng">
+                      <a:noFill/>
+                      <a:prstDash val="solid"/>
+                    </a:lnBlToTr>
+                    <a:solidFill>
+                      <a:srgbClr val="5B616F"/>
+                    </a:solidFill>
+                  </a:tcPr>
+                </a:tc>
+                <a:extLst>
+                  <a:ext uri="{0D108BD9-81ED-4DB2-BD59-A6C34878D82A}">
+                    <a16:rowId xmlns:a16="http://schemas.microsoft.com/office/drawing/2014/main" val="3034851657"/>
+                  </a:ext>
+                </a:extLst>
+              </a:tr>
+              <a:tr h="370840">
+                <a:tc vMerge="1">
+                  <a:txBody>
+                    <a:bodyPr/>
+                    <a:lstStyle/>
+                    <a:p>
+                      <a:endParaRPr lang="pt-BR" dirty="0"/>
+                    </a:p>
+                  </a:txBody>
+                  <a:tcPr/>
+                </a:tc>
+                <a:tc>
+                  <a:txBody>
+                    <a:bodyPr/>
+                    <a:lstStyle/>
+                    <a:p>
+                      <a:r>
+                        <a:rPr lang="pt-BR" sz="1800" kern="1200" dirty="0">
+                          <a:solidFill>
+                            <a:srgbClr val="DBA1A1"/>
+                          </a:solidFill>
+                          <a:effectLst/>
+                          <a:latin typeface="Agency FB" panose="020B0503020202020204" pitchFamily="34" charset="0"/>
+                          <a:ea typeface="+mn-ea"/>
+                          <a:cs typeface="+mn-cs"/>
+                        </a:rPr>
+                        <a:t>Ao final de cada edição o usuário precisa salvar a modificação</a:t>
+                      </a:r>
+                    </a:p>
+                    <a:p>
+                      <a:r>
+                        <a:rPr lang="pt-BR" sz="1800" kern="1200" dirty="0">
+                          <a:solidFill>
+                            <a:srgbClr val="DBA1A1"/>
+                          </a:solidFill>
+                          <a:effectLst/>
+                          <a:latin typeface="Agency FB" panose="020B0503020202020204" pitchFamily="34" charset="0"/>
+                          <a:ea typeface="+mn-ea"/>
+                          <a:cs typeface="+mn-cs"/>
+                        </a:rPr>
+                        <a:t>- O sistema não deve salvar automaticamente a modificação do usuário.	Usabilidade</a:t>
+                      </a:r>
+                    </a:p>
+                    <a:p>
+                      <a:r>
+                        <a:rPr lang="pt-BR" sz="1800" kern="1200" dirty="0">
+                          <a:solidFill>
+                            <a:srgbClr val="DBA1A1"/>
+                          </a:solidFill>
+                          <a:effectLst/>
+                          <a:latin typeface="Agency FB" panose="020B0503020202020204" pitchFamily="34" charset="0"/>
+                          <a:ea typeface="+mn-ea"/>
+                          <a:cs typeface="+mn-cs"/>
+                        </a:rPr>
+                        <a:t>	Obrigatório</a:t>
+                      </a:r>
+                    </a:p>
+                  </a:txBody>
+                  <a:tcPr>
+                    <a:lnL w="12700" cap="flat" cmpd="sng" algn="ctr">
+                      <a:noFill/>
+                      <a:prstDash val="solid"/>
+                      <a:round/>
+                      <a:headEnd type="none" w="med" len="med"/>
+                      <a:tailEnd type="none" w="med" len="med"/>
+                    </a:lnL>
+                    <a:lnR w="12700" cap="flat" cmpd="sng" algn="ctr">
+                      <a:noFill/>
+                      <a:prstDash val="solid"/>
+                      <a:round/>
+                      <a:headEnd type="none" w="med" len="med"/>
+                      <a:tailEnd type="none" w="med" len="med"/>
+                    </a:lnR>
+                    <a:lnT w="12700" cap="flat" cmpd="sng" algn="ctr">
+                      <a:noFill/>
+                      <a:prstDash val="solid"/>
+                      <a:round/>
+                      <a:headEnd type="none" w="med" len="med"/>
+                      <a:tailEnd type="none" w="med" len="med"/>
+                    </a:lnT>
+                    <a:lnB w="12700" cap="flat" cmpd="sng" algn="ctr">
+                      <a:noFill/>
+                      <a:prstDash val="solid"/>
+                      <a:round/>
+                      <a:headEnd type="none" w="med" len="med"/>
+                      <a:tailEnd type="none" w="med" len="med"/>
+                    </a:lnB>
+                    <a:lnTlToBr w="12700" cmpd="sng">
+                      <a:noFill/>
+                      <a:prstDash val="solid"/>
+                    </a:lnTlToBr>
+                    <a:lnBlToTr w="12700" cmpd="sng">
+                      <a:noFill/>
+                      <a:prstDash val="solid"/>
+                    </a:lnBlToTr>
+                    <a:solidFill>
+                      <a:srgbClr val="5B616F"/>
+                    </a:solidFill>
+                  </a:tcPr>
+                </a:tc>
+                <a:extLst>
+                  <a:ext uri="{0D108BD9-81ED-4DB2-BD59-A6C34878D82A}">
+                    <a16:rowId xmlns:a16="http://schemas.microsoft.com/office/drawing/2014/main" val="2678225723"/>
+                  </a:ext>
+                </a:extLst>
+              </a:tr>
+              <a:tr h="370840">
+                <a:tc vMerge="1">
+                  <a:txBody>
+                    <a:bodyPr/>
+                    <a:lstStyle/>
+                    <a:p>
+                      <a:endParaRPr lang="pt-BR" dirty="0"/>
+                    </a:p>
+                  </a:txBody>
+                  <a:tcPr/>
+                </a:tc>
+                <a:tc>
+                  <a:txBody>
+                    <a:bodyPr/>
+                    <a:lstStyle/>
+                    <a:p>
+                      <a:r>
+                        <a:rPr lang="pt-BR" sz="1800" kern="1200" dirty="0">
+                          <a:solidFill>
+                            <a:srgbClr val="DBA1A1"/>
+                          </a:solidFill>
+                          <a:effectLst/>
+                          <a:latin typeface="Agency FB" panose="020B0503020202020204" pitchFamily="34" charset="0"/>
+                          <a:ea typeface="+mn-ea"/>
+                          <a:cs typeface="+mn-cs"/>
+                        </a:rPr>
+                        <a:t>Deve ter um botão cancelar para a ação de edição.</a:t>
+                      </a:r>
+                    </a:p>
+                    <a:p>
+                      <a:r>
+                        <a:rPr lang="pt-BR" sz="1800" kern="1200" dirty="0">
+                          <a:solidFill>
+                            <a:srgbClr val="DBA1A1"/>
+                          </a:solidFill>
+                          <a:effectLst/>
+                          <a:latin typeface="Agency FB" panose="020B0503020202020204" pitchFamily="34" charset="0"/>
+                          <a:ea typeface="+mn-ea"/>
+                          <a:cs typeface="+mn-cs"/>
+                        </a:rPr>
+                        <a:t>- Ao clicar em cancelar a tela de edição deve ser encerrada. 	Usabilidade/Segurança</a:t>
+                      </a:r>
+                    </a:p>
+                    <a:p>
+                      <a:r>
+                        <a:rPr lang="pt-BR" sz="1800" kern="1200" dirty="0">
+                          <a:solidFill>
+                            <a:srgbClr val="DBA1A1"/>
+                          </a:solidFill>
+                          <a:effectLst/>
+                          <a:latin typeface="Agency FB" panose="020B0503020202020204" pitchFamily="34" charset="0"/>
+                          <a:ea typeface="+mn-ea"/>
+                          <a:cs typeface="+mn-cs"/>
+                        </a:rPr>
+                        <a:t>	Obrigatório</a:t>
+                      </a:r>
+                    </a:p>
+                  </a:txBody>
+                  <a:tcPr>
+                    <a:lnL w="12700" cap="flat" cmpd="sng" algn="ctr">
+                      <a:noFill/>
+                      <a:prstDash val="solid"/>
+                      <a:round/>
+                      <a:headEnd type="none" w="med" len="med"/>
+                      <a:tailEnd type="none" w="med" len="med"/>
+                    </a:lnL>
+                    <a:lnR w="12700" cap="flat" cmpd="sng" algn="ctr">
+                      <a:noFill/>
+                      <a:prstDash val="solid"/>
+                      <a:round/>
+                      <a:headEnd type="none" w="med" len="med"/>
+                      <a:tailEnd type="none" w="med" len="med"/>
+                    </a:lnR>
+                    <a:lnT w="12700" cap="flat" cmpd="sng" algn="ctr">
+                      <a:noFill/>
+                      <a:prstDash val="solid"/>
+                      <a:round/>
+                      <a:headEnd type="none" w="med" len="med"/>
+                      <a:tailEnd type="none" w="med" len="med"/>
+                    </a:lnT>
+                    <a:lnB w="12700" cap="flat" cmpd="sng" algn="ctr">
+                      <a:noFill/>
+                      <a:prstDash val="solid"/>
+                      <a:round/>
+                      <a:headEnd type="none" w="med" len="med"/>
+                      <a:tailEnd type="none" w="med" len="med"/>
+                    </a:lnB>
+                    <a:lnTlToBr w="12700" cmpd="sng">
+                      <a:noFill/>
+                      <a:prstDash val="solid"/>
+                    </a:lnTlToBr>
+                    <a:lnBlToTr w="12700" cmpd="sng">
+                      <a:noFill/>
+                      <a:prstDash val="solid"/>
+                    </a:lnBlToTr>
+                    <a:solidFill>
+                      <a:srgbClr val="5B616F"/>
+                    </a:solidFill>
+                  </a:tcPr>
+                </a:tc>
+                <a:extLst>
+                  <a:ext uri="{0D108BD9-81ED-4DB2-BD59-A6C34878D82A}">
+                    <a16:rowId xmlns:a16="http://schemas.microsoft.com/office/drawing/2014/main" val="1646411524"/>
+                  </a:ext>
+                </a:extLst>
+              </a:tr>
+              <a:tr h="370840">
+                <a:tc vMerge="1">
+                  <a:txBody>
+                    <a:bodyPr/>
+                    <a:lstStyle/>
+                    <a:p>
+                      <a:endParaRPr lang="pt-BR" dirty="0"/>
+                    </a:p>
+                  </a:txBody>
+                  <a:tcPr/>
+                </a:tc>
+                <a:tc>
+                  <a:txBody>
+                    <a:bodyPr/>
+                    <a:lstStyle/>
+                    <a:p>
+                      <a:r>
+                        <a:rPr lang="pt-BR" sz="1800" kern="1200" dirty="0">
+                          <a:solidFill>
+                            <a:srgbClr val="DBA1A1"/>
+                          </a:solidFill>
+                          <a:effectLst/>
+                          <a:latin typeface="Agency FB" panose="020B0503020202020204" pitchFamily="34" charset="0"/>
+                          <a:ea typeface="+mn-ea"/>
+                          <a:cs typeface="+mn-cs"/>
+                        </a:rPr>
+                        <a:t>O ID deve estar na tela de edição.</a:t>
+                      </a:r>
+                    </a:p>
+                    <a:p>
+                      <a:r>
+                        <a:rPr lang="pt-BR" sz="1800" kern="1200" dirty="0">
+                          <a:solidFill>
+                            <a:srgbClr val="DBA1A1"/>
+                          </a:solidFill>
+                          <a:effectLst/>
+                          <a:latin typeface="Agency FB" panose="020B0503020202020204" pitchFamily="34" charset="0"/>
+                          <a:ea typeface="+mn-ea"/>
+                          <a:cs typeface="+mn-cs"/>
+                        </a:rPr>
+                        <a:t>-Na tela de edição, o ID do item que está sendo modificado deve estar aparecendo.</a:t>
+                      </a:r>
+                    </a:p>
+                    <a:p>
+                      <a:r>
+                        <a:rPr lang="pt-BR" sz="1800" kern="1200" dirty="0">
+                          <a:solidFill>
+                            <a:srgbClr val="DBA1A1"/>
+                          </a:solidFill>
+                          <a:effectLst/>
+                          <a:latin typeface="Agency FB" panose="020B0503020202020204" pitchFamily="34" charset="0"/>
+                          <a:ea typeface="+mn-ea"/>
+                          <a:cs typeface="+mn-cs"/>
+                        </a:rPr>
+                        <a:t>	Sistema/Usabilidade</a:t>
+                      </a:r>
+                    </a:p>
+                    <a:p>
+                      <a:r>
+                        <a:rPr lang="pt-BR" sz="1800" kern="1200" dirty="0">
+                          <a:solidFill>
+                            <a:srgbClr val="DBA1A1"/>
+                          </a:solidFill>
+                          <a:effectLst/>
+                          <a:latin typeface="Agency FB" panose="020B0503020202020204" pitchFamily="34" charset="0"/>
+                          <a:ea typeface="+mn-ea"/>
+                          <a:cs typeface="+mn-cs"/>
+                        </a:rPr>
+                        <a:t>	Obrigatório</a:t>
+                      </a:r>
+                      <a:endParaRPr lang="pt-BR" dirty="0">
+                        <a:solidFill>
+                          <a:srgbClr val="DBA1A1"/>
+                        </a:solidFill>
+                        <a:latin typeface="Agency FB" panose="020B0503020202020204" pitchFamily="34" charset="0"/>
+                      </a:endParaRPr>
+                    </a:p>
+                  </a:txBody>
+                  <a:tcPr>
+                    <a:lnL w="12700" cap="flat" cmpd="sng" algn="ctr">
+                      <a:noFill/>
+                      <a:prstDash val="solid"/>
+                      <a:round/>
+                      <a:headEnd type="none" w="med" len="med"/>
+                      <a:tailEnd type="none" w="med" len="med"/>
+                    </a:lnL>
+                    <a:lnR w="12700" cap="flat" cmpd="sng" algn="ctr">
+                      <a:noFill/>
+                      <a:prstDash val="solid"/>
+                      <a:round/>
+                      <a:headEnd type="none" w="med" len="med"/>
+                      <a:tailEnd type="none" w="med" len="med"/>
+                    </a:lnR>
+                    <a:lnT w="12700" cap="flat" cmpd="sng" algn="ctr">
+                      <a:noFill/>
+                      <a:prstDash val="solid"/>
+                      <a:round/>
+                      <a:headEnd type="none" w="med" len="med"/>
+                      <a:tailEnd type="none" w="med" len="med"/>
+                    </a:lnT>
+                    <a:lnB w="12700" cap="flat" cmpd="sng" algn="ctr">
+                      <a:noFill/>
+                      <a:prstDash val="solid"/>
+                      <a:round/>
+                      <a:headEnd type="none" w="med" len="med"/>
+                      <a:tailEnd type="none" w="med" len="med"/>
+                    </a:lnB>
+                    <a:lnTlToBr w="12700" cmpd="sng">
+                      <a:noFill/>
+                      <a:prstDash val="solid"/>
+                    </a:lnTlToBr>
+                    <a:lnBlToTr w="12700" cmpd="sng">
+                      <a:noFill/>
+                      <a:prstDash val="solid"/>
+                    </a:lnBlToTr>
+                    <a:solidFill>
+                      <a:srgbClr val="5B616F"/>
+                    </a:solidFill>
+                  </a:tcPr>
+                </a:tc>
+                <a:extLst>
+                  <a:ext uri="{0D108BD9-81ED-4DB2-BD59-A6C34878D82A}">
+                    <a16:rowId xmlns:a16="http://schemas.microsoft.com/office/drawing/2014/main" val="1030401757"/>
+                  </a:ext>
+                </a:extLst>
+              </a:tr>
+            </a:tbl>
+          </a:graphicData>
+        </a:graphic>
+      </p:graphicFrame>
+    </p:spTree>
+    <p:extLst>
+      <p:ext uri="{BB962C8B-B14F-4D97-AF65-F5344CB8AC3E}">
+        <p14:creationId xmlns:p14="http://schemas.microsoft.com/office/powerpoint/2010/main" val="3432435199"/>
+      </p:ext>
+    </p:extLst>
+  </p:cSld>
+  <p:clrMapOvr>
+    <a:masterClrMapping/>
+  </p:clrMapOvr>
+</p:sld>
+</file>
+
+<file path=ppt/slides/slide9.xml><?xml version="1.0" encoding="utf-8"?>
+<p:sld xmlns:a="http://schemas.openxmlformats.org/drawingml/2006/main" xmlns:r="http://schemas.openxmlformats.org/officeDocument/2006/relationships" xmlns:p="http://schemas.openxmlformats.org/presentationml/2006/main">
+  <p:cSld>
+    <p:bg>
+      <p:bgPr>
+        <a:solidFill>
+          <a:srgbClr val="5B616F"/>
+        </a:solidFill>
+        <a:effectLst/>
+      </p:bgPr>
+    </p:bg>
+    <p:spTree>
+      <p:nvGrpSpPr>
+        <p:cNvPr id="1" name=""/>
+        <p:cNvGrpSpPr/>
+        <p:nvPr/>
+      </p:nvGrpSpPr>
+      <p:grpSpPr>
+        <a:xfrm>
+          <a:off x="0" y="0"/>
+          <a:ext cx="0" cy="0"/>
+          <a:chOff x="0" y="0"/>
+          <a:chExt cx="0" cy="0"/>
+        </a:xfrm>
+      </p:grpSpPr>
+      <p:sp>
+        <p:nvSpPr>
+          <p:cNvPr id="2" name="Retângulo 1">
+            <a:extLst>
+              <a:ext uri="{FF2B5EF4-FFF2-40B4-BE49-F238E27FC236}">
+                <a16:creationId xmlns:a16="http://schemas.microsoft.com/office/drawing/2014/main" id="{8C911EF0-0065-4173-87F6-89015AA6DCA1}"/>
+              </a:ext>
+            </a:extLst>
+          </p:cNvPr>
+          <p:cNvSpPr/>
+          <p:nvPr/>
+        </p:nvSpPr>
+        <p:spPr>
+          <a:xfrm rot="5400000">
+            <a:off x="5542547" y="-5542545"/>
+            <a:ext cx="1106907" cy="12192000"/>
+          </a:xfrm>
+          <a:prstGeom prst="rect">
+            <a:avLst/>
+          </a:prstGeom>
+          <a:solidFill>
+            <a:srgbClr val="DBA1A1"/>
+          </a:solidFill>
+          <a:ln>
+            <a:noFill/>
+          </a:ln>
+        </p:spPr>
+        <p:style>
+          <a:lnRef idx="2">
+            <a:schemeClr val="accent1">
+              <a:shade val="50000"/>
+            </a:schemeClr>
+          </a:lnRef>
+          <a:fillRef idx="1">
+            <a:schemeClr val="accent1"/>
+          </a:fillRef>
+          <a:effectRef idx="0">
+            <a:schemeClr val="accent1"/>
+          </a:effectRef>
+          <a:fontRef idx="minor">
+            <a:schemeClr val="lt1"/>
+          </a:fontRef>
+        </p:style>
+        <p:txBody>
+          <a:bodyPr rtlCol="0" anchor="ctr"/>
+          <a:lstStyle/>
+          <a:p>
+            <a:pPr algn="ctr"/>
+            <a:endParaRPr lang="pt-BR" dirty="0">
+              <a:ln>
+                <a:solidFill>
+                  <a:srgbClr val="DBA1A1"/>
+                </a:solidFill>
+              </a:ln>
+              <a:solidFill>
+                <a:srgbClr val="DBA1A1"/>
+              </a:solidFill>
+            </a:endParaRPr>
+          </a:p>
+        </p:txBody>
+      </p:sp>
+      <p:sp>
+        <p:nvSpPr>
+          <p:cNvPr id="3" name="CaixaDeTexto 2">
+            <a:extLst>
+              <a:ext uri="{FF2B5EF4-FFF2-40B4-BE49-F238E27FC236}">
+                <a16:creationId xmlns:a16="http://schemas.microsoft.com/office/drawing/2014/main" id="{EA906822-E252-4415-BE2C-766952557E58}"/>
+              </a:ext>
+            </a:extLst>
+          </p:cNvPr>
+          <p:cNvSpPr txBox="1"/>
+          <p:nvPr/>
+        </p:nvSpPr>
+        <p:spPr>
+          <a:xfrm>
+            <a:off x="3043797" y="199512"/>
+            <a:ext cx="6658133" cy="707886"/>
+          </a:xfrm>
+          <a:prstGeom prst="rect">
+            <a:avLst/>
+          </a:prstGeom>
+          <a:noFill/>
+        </p:spPr>
+        <p:txBody>
+          <a:bodyPr wrap="square" rtlCol="0">
+            <a:spAutoFit/>
+          </a:bodyPr>
+          <a:lstStyle/>
+          <a:p>
+            <a:pPr algn="ctr"/>
+            <a:r>
+              <a:rPr lang="pt-BR" sz="4000" dirty="0">
+                <a:solidFill>
+                  <a:srgbClr val="5B616F"/>
+                </a:solidFill>
+                <a:latin typeface="Agency FB" panose="020B0503020202020204" pitchFamily="34" charset="0"/>
+              </a:rPr>
+              <a:t>Requisitos Funcionais e Não Funcionais</a:t>
+            </a:r>
+          </a:p>
+        </p:txBody>
+      </p:sp>
+      <p:graphicFrame>
+        <p:nvGraphicFramePr>
+          <p:cNvPr id="4" name="Tabela 4">
+            <a:extLst>
+              <a:ext uri="{FF2B5EF4-FFF2-40B4-BE49-F238E27FC236}">
+                <a16:creationId xmlns:a16="http://schemas.microsoft.com/office/drawing/2014/main" id="{0D65BD39-23AE-4817-883A-7F07F263DD1C}"/>
+              </a:ext>
+            </a:extLst>
+          </p:cNvPr>
+          <p:cNvGraphicFramePr>
+            <a:graphicFrameLocks noGrp="1"/>
+          </p:cNvGraphicFramePr>
+          <p:nvPr>
+            <p:extLst>
+              <p:ext uri="{D42A27DB-BD31-4B8C-83A1-F6EECF244321}">
+                <p14:modId xmlns:p14="http://schemas.microsoft.com/office/powerpoint/2010/main" val="1312909266"/>
+              </p:ext>
+            </p:extLst>
+          </p:nvPr>
+        </p:nvGraphicFramePr>
+        <p:xfrm>
+          <a:off x="946118" y="1631673"/>
+          <a:ext cx="10853490" cy="4485640"/>
+        </p:xfrm>
+        <a:graphic>
+          <a:graphicData uri="http://schemas.openxmlformats.org/drawingml/2006/table">
+            <a:tbl>
+              <a:tblPr firstRow="1" bandRow="1">
+                <a:tableStyleId>{5C22544A-7EE6-4342-B048-85BDC9FD1C3A}</a:tableStyleId>
+              </a:tblPr>
+              <a:tblGrid>
+                <a:gridCol w="5426745">
+                  <a:extLst>
+                    <a:ext uri="{9D8B030D-6E8A-4147-A177-3AD203B41FA5}">
+                      <a16:colId xmlns:a16="http://schemas.microsoft.com/office/drawing/2014/main" val="2504239251"/>
+                    </a:ext>
+                  </a:extLst>
+                </a:gridCol>
+                <a:gridCol w="5426745">
+                  <a:extLst>
+                    <a:ext uri="{9D8B030D-6E8A-4147-A177-3AD203B41FA5}">
+                      <a16:colId xmlns:a16="http://schemas.microsoft.com/office/drawing/2014/main" val="354975263"/>
+                    </a:ext>
+                  </a:extLst>
+                </a:gridCol>
+              </a:tblGrid>
+              <a:tr h="370840">
+                <a:tc>
+                  <a:txBody>
+                    <a:bodyPr/>
+                    <a:lstStyle/>
+                    <a:p>
+                      <a:r>
+                        <a:rPr lang="pt-BR" dirty="0">
+                          <a:solidFill>
+                            <a:srgbClr val="DBA1A1"/>
+                          </a:solidFill>
+                          <a:latin typeface="Agency FB" panose="020B0503020202020204" pitchFamily="34" charset="0"/>
+                        </a:rPr>
+                        <a:t>Funcional</a:t>
+                      </a:r>
+                    </a:p>
+                  </a:txBody>
+                  <a:tcPr>
+                    <a:lnL w="12700" cap="flat" cmpd="sng" algn="ctr">
+                      <a:noFill/>
+                      <a:prstDash val="solid"/>
+                      <a:round/>
+                      <a:headEnd type="none" w="med" len="med"/>
+                      <a:tailEnd type="none" w="med" len="med"/>
+                    </a:lnL>
+                    <a:lnR w="12700" cap="flat" cmpd="sng" algn="ctr">
+                      <a:noFill/>
+                      <a:prstDash val="solid"/>
+                      <a:round/>
+                      <a:headEnd type="none" w="med" len="med"/>
+                      <a:tailEnd type="none" w="med" len="med"/>
+                    </a:lnR>
+                    <a:lnT w="12700" cap="flat" cmpd="sng" algn="ctr">
+                      <a:noFill/>
+                      <a:prstDash val="solid"/>
+                      <a:round/>
+                      <a:headEnd type="none" w="med" len="med"/>
+                      <a:tailEnd type="none" w="med" len="med"/>
+                    </a:lnT>
+                    <a:lnB w="12700" cap="flat" cmpd="sng" algn="ctr">
+                      <a:noFill/>
+                      <a:prstDash val="solid"/>
+                      <a:round/>
+                      <a:headEnd type="none" w="med" len="med"/>
+                      <a:tailEnd type="none" w="med" len="med"/>
+                    </a:lnB>
+                    <a:lnTlToBr w="12700" cmpd="sng">
+                      <a:noFill/>
+                      <a:prstDash val="solid"/>
+                    </a:lnTlToBr>
+                    <a:lnBlToTr w="12700" cmpd="sng">
+                      <a:noFill/>
+                      <a:prstDash val="solid"/>
+                    </a:lnBlToTr>
+                    <a:solidFill>
+                      <a:srgbClr val="5B616F"/>
+                    </a:solidFill>
+                  </a:tcPr>
+                </a:tc>
+                <a:tc>
+                  <a:txBody>
+                    <a:bodyPr/>
+                    <a:lstStyle/>
+                    <a:p>
+                      <a:r>
+                        <a:rPr lang="pt-BR" dirty="0">
+                          <a:solidFill>
+                            <a:srgbClr val="DBA1A1"/>
+                          </a:solidFill>
+                          <a:latin typeface="Agency FB" panose="020B0503020202020204" pitchFamily="34" charset="0"/>
+                        </a:rPr>
+                        <a:t>Não Funcional</a:t>
+                      </a:r>
+                    </a:p>
+                  </a:txBody>
+                  <a:tcPr>
+                    <a:lnL w="12700" cap="flat" cmpd="sng" algn="ctr">
+                      <a:noFill/>
+                      <a:prstDash val="solid"/>
+                      <a:round/>
+                      <a:headEnd type="none" w="med" len="med"/>
+                      <a:tailEnd type="none" w="med" len="med"/>
+                    </a:lnL>
+                    <a:lnR w="12700" cap="flat" cmpd="sng" algn="ctr">
+                      <a:noFill/>
+                      <a:prstDash val="solid"/>
+                      <a:round/>
+                      <a:headEnd type="none" w="med" len="med"/>
+                      <a:tailEnd type="none" w="med" len="med"/>
+                    </a:lnR>
+                    <a:lnT w="12700" cap="flat" cmpd="sng" algn="ctr">
+                      <a:noFill/>
+                      <a:prstDash val="solid"/>
+                      <a:round/>
+                      <a:headEnd type="none" w="med" len="med"/>
+                      <a:tailEnd type="none" w="med" len="med"/>
+                    </a:lnT>
+                    <a:lnB w="12700" cap="flat" cmpd="sng" algn="ctr">
+                      <a:noFill/>
+                      <a:prstDash val="solid"/>
+                      <a:round/>
+                      <a:headEnd type="none" w="med" len="med"/>
+                      <a:tailEnd type="none" w="med" len="med"/>
+                    </a:lnB>
+                    <a:lnTlToBr w="12700" cmpd="sng">
+                      <a:noFill/>
+                      <a:prstDash val="solid"/>
+                    </a:lnTlToBr>
+                    <a:lnBlToTr w="12700" cmpd="sng">
+                      <a:noFill/>
+                      <a:prstDash val="solid"/>
+                    </a:lnBlToTr>
+                    <a:solidFill>
+                      <a:srgbClr val="5B616F"/>
+                    </a:solidFill>
+                  </a:tcPr>
+                </a:tc>
+                <a:extLst>
+                  <a:ext uri="{0D108BD9-81ED-4DB2-BD59-A6C34878D82A}">
+                    <a16:rowId xmlns:a16="http://schemas.microsoft.com/office/drawing/2014/main" val="2395872218"/>
+                  </a:ext>
+                </a:extLst>
+              </a:tr>
+              <a:tr h="370840">
+                <a:tc rowSpan="3">
+                  <a:txBody>
+                    <a:bodyPr/>
+                    <a:lstStyle/>
+                    <a:p>
+                      <a:pPr algn="l"/>
+                      <a:r>
+                        <a:rPr lang="pt-BR" sz="1800" kern="1200" dirty="0">
+                          <a:solidFill>
+                            <a:srgbClr val="DBA1A1"/>
+                          </a:solidFill>
+                          <a:effectLst/>
+                          <a:latin typeface="Agency FB" panose="020B0503020202020204" pitchFamily="34" charset="0"/>
+                          <a:ea typeface="+mn-ea"/>
+                          <a:cs typeface="+mn-cs"/>
+                        </a:rPr>
+                        <a:t>Excluir -  O usuário poderá excluir os registros.</a:t>
+                      </a:r>
+                      <a:endParaRPr lang="pt-BR" dirty="0">
+                        <a:solidFill>
+                          <a:srgbClr val="DBA1A1"/>
+                        </a:solidFill>
+                        <a:latin typeface="Agency FB" panose="020B0503020202020204" pitchFamily="34" charset="0"/>
+                      </a:endParaRPr>
+                    </a:p>
+                  </a:txBody>
+                  <a:tcPr>
+                    <a:lnL w="12700" cap="flat" cmpd="sng" algn="ctr">
+                      <a:noFill/>
+                      <a:prstDash val="solid"/>
+                      <a:round/>
+                      <a:headEnd type="none" w="med" len="med"/>
+                      <a:tailEnd type="none" w="med" len="med"/>
+                    </a:lnL>
+                    <a:lnR w="12700" cap="flat" cmpd="sng" algn="ctr">
+                      <a:noFill/>
+                      <a:prstDash val="solid"/>
+                      <a:round/>
+                      <a:headEnd type="none" w="med" len="med"/>
+                      <a:tailEnd type="none" w="med" len="med"/>
+                    </a:lnR>
+                    <a:lnT w="12700" cap="flat" cmpd="sng" algn="ctr">
+                      <a:noFill/>
+                      <a:prstDash val="solid"/>
+                      <a:round/>
+                      <a:headEnd type="none" w="med" len="med"/>
+                      <a:tailEnd type="none" w="med" len="med"/>
+                    </a:lnT>
+                    <a:lnB w="12700" cap="flat" cmpd="sng" algn="ctr">
+                      <a:noFill/>
+                      <a:prstDash val="solid"/>
+                      <a:round/>
+                      <a:headEnd type="none" w="med" len="med"/>
+                      <a:tailEnd type="none" w="med" len="med"/>
+                    </a:lnB>
+                    <a:lnTlToBr w="12700" cmpd="sng">
+                      <a:noFill/>
+                      <a:prstDash val="solid"/>
+                    </a:lnTlToBr>
+                    <a:lnBlToTr w="12700" cmpd="sng">
+                      <a:noFill/>
+                      <a:prstDash val="solid"/>
+                    </a:lnBlToTr>
+                    <a:solidFill>
+                      <a:srgbClr val="5B616F"/>
+                    </a:solidFill>
+                  </a:tcPr>
+                </a:tc>
+                <a:tc>
+                  <a:txBody>
+                    <a:bodyPr/>
+                    <a:lstStyle/>
+                    <a:p>
+                      <a:pPr marL="0" marR="0" lvl="0" indent="0" algn="l" defTabSz="914400" rtl="0" eaLnBrk="1" fontAlgn="auto" latinLnBrk="0" hangingPunct="1">
+                        <a:lnSpc>
+                          <a:spcPct val="100000"/>
+                        </a:lnSpc>
+                        <a:spcBef>
+                          <a:spcPts val="0"/>
+                        </a:spcBef>
+                        <a:spcAft>
+                          <a:spcPts val="0"/>
+                        </a:spcAft>
+                        <a:buClrTx/>
+                        <a:buSzTx/>
+                        <a:buFontTx/>
+                        <a:buNone/>
+                        <a:tabLst/>
+                        <a:defRPr/>
+                      </a:pPr>
+                      <a:r>
+                        <a:rPr lang="pt-BR" sz="1800" kern="1200" dirty="0">
+                          <a:solidFill>
+                            <a:srgbClr val="DBA1A1"/>
+                          </a:solidFill>
+                          <a:effectLst/>
+                          <a:latin typeface="Agency FB" panose="020B0503020202020204" pitchFamily="34" charset="0"/>
+                          <a:ea typeface="+mn-ea"/>
+                          <a:cs typeface="+mn-cs"/>
+                        </a:rPr>
+                        <a:t>Deve haver um botão com a função de excluir o item selecionado na tela de pesquisa.</a:t>
+                      </a:r>
+                    </a:p>
+                    <a:p>
+                      <a:pPr marL="285750" marR="0" lvl="0" indent="-285750" algn="l" defTabSz="914400" rtl="0" eaLnBrk="1" fontAlgn="auto" latinLnBrk="0" hangingPunct="1">
+                        <a:lnSpc>
+                          <a:spcPct val="100000"/>
+                        </a:lnSpc>
+                        <a:spcBef>
+                          <a:spcPts val="0"/>
+                        </a:spcBef>
+                        <a:spcAft>
+                          <a:spcPts val="0"/>
+                        </a:spcAft>
+                        <a:buClrTx/>
+                        <a:buSzTx/>
+                        <a:buFontTx/>
+                        <a:buChar char="-"/>
+                        <a:tabLst/>
+                        <a:defRPr/>
+                      </a:pPr>
+                      <a:r>
+                        <a:rPr lang="pt-BR" sz="1800" kern="1200" dirty="0">
+                          <a:solidFill>
+                            <a:srgbClr val="DBA1A1"/>
+                          </a:solidFill>
+                          <a:effectLst/>
+                          <a:latin typeface="Agency FB" panose="020B0503020202020204" pitchFamily="34" charset="0"/>
+                          <a:ea typeface="+mn-ea"/>
+                          <a:cs typeface="+mn-cs"/>
+                        </a:rPr>
+                        <a:t>Somente para o(a) nutricionista.</a:t>
+                      </a:r>
+                    </a:p>
+                    <a:p>
+                      <a:pPr marL="0" marR="0" lvl="0" indent="0" algn="l" defTabSz="914400" rtl="0" eaLnBrk="1" fontAlgn="auto" latinLnBrk="0" hangingPunct="1">
+                        <a:lnSpc>
+                          <a:spcPct val="100000"/>
+                        </a:lnSpc>
+                        <a:spcBef>
+                          <a:spcPts val="0"/>
+                        </a:spcBef>
+                        <a:spcAft>
+                          <a:spcPts val="0"/>
+                        </a:spcAft>
+                        <a:buClrTx/>
+                        <a:buSzTx/>
+                        <a:buFontTx/>
+                        <a:buNone/>
+                        <a:tabLst/>
+                        <a:defRPr/>
+                      </a:pPr>
+                      <a:r>
+                        <a:rPr lang="pt-BR" sz="1800" kern="1200" dirty="0">
+                          <a:solidFill>
+                            <a:srgbClr val="DBA1A1"/>
+                          </a:solidFill>
+                          <a:effectLst/>
+                          <a:latin typeface="Agency FB" panose="020B0503020202020204" pitchFamily="34" charset="0"/>
+                          <a:ea typeface="+mn-ea"/>
+                          <a:cs typeface="+mn-cs"/>
+                        </a:rPr>
+                        <a:t>	Usabilidade/Segurança</a:t>
+                      </a:r>
+                    </a:p>
+                    <a:p>
+                      <a:r>
+                        <a:rPr lang="pt-BR" sz="1800" kern="1200" dirty="0">
+                          <a:solidFill>
+                            <a:srgbClr val="DBA1A1"/>
+                          </a:solidFill>
+                          <a:effectLst/>
+                          <a:latin typeface="Agency FB" panose="020B0503020202020204" pitchFamily="34" charset="0"/>
+                          <a:ea typeface="+mn-ea"/>
+                          <a:cs typeface="+mn-cs"/>
+                        </a:rPr>
+                        <a:t>	Obrigatório</a:t>
+                      </a:r>
+                    </a:p>
+                    <a:p>
+                      <a:endParaRPr lang="pt-BR" dirty="0">
+                        <a:solidFill>
+                          <a:srgbClr val="DBA1A1"/>
+                        </a:solidFill>
+                        <a:latin typeface="Agency FB" panose="020B0503020202020204" pitchFamily="34" charset="0"/>
+                      </a:endParaRPr>
+                    </a:p>
+                  </a:txBody>
+                  <a:tcPr>
+                    <a:lnL w="12700" cap="flat" cmpd="sng" algn="ctr">
+                      <a:noFill/>
+                      <a:prstDash val="solid"/>
+                      <a:round/>
+                      <a:headEnd type="none" w="med" len="med"/>
+                      <a:tailEnd type="none" w="med" len="med"/>
+                    </a:lnL>
+                    <a:lnR w="12700" cap="flat" cmpd="sng" algn="ctr">
+                      <a:noFill/>
+                      <a:prstDash val="solid"/>
+                      <a:round/>
+                      <a:headEnd type="none" w="med" len="med"/>
+                      <a:tailEnd type="none" w="med" len="med"/>
+                    </a:lnR>
+                    <a:lnT w="12700" cap="flat" cmpd="sng" algn="ctr">
+                      <a:noFill/>
+                      <a:prstDash val="solid"/>
+                      <a:round/>
+                      <a:headEnd type="none" w="med" len="med"/>
+                      <a:tailEnd type="none" w="med" len="med"/>
+                    </a:lnT>
+                    <a:lnB w="12700" cap="flat" cmpd="sng" algn="ctr">
+                      <a:noFill/>
+                      <a:prstDash val="solid"/>
+                      <a:round/>
+                      <a:headEnd type="none" w="med" len="med"/>
+                      <a:tailEnd type="none" w="med" len="med"/>
+                    </a:lnB>
+                    <a:lnTlToBr w="12700" cmpd="sng">
+                      <a:noFill/>
+                      <a:prstDash val="solid"/>
+                    </a:lnTlToBr>
+                    <a:lnBlToTr w="12700" cmpd="sng">
+                      <a:noFill/>
+                      <a:prstDash val="solid"/>
+                    </a:lnBlToTr>
+                    <a:solidFill>
+                      <a:srgbClr val="5B616F"/>
+                    </a:solidFill>
+                  </a:tcPr>
+                </a:tc>
+                <a:extLst>
+                  <a:ext uri="{0D108BD9-81ED-4DB2-BD59-A6C34878D82A}">
+                    <a16:rowId xmlns:a16="http://schemas.microsoft.com/office/drawing/2014/main" val="3034851657"/>
+                  </a:ext>
+                </a:extLst>
+              </a:tr>
+              <a:tr h="370840">
+                <a:tc vMerge="1">
+                  <a:txBody>
+                    <a:bodyPr/>
+                    <a:lstStyle/>
+                    <a:p>
+                      <a:endParaRPr lang="pt-BR" dirty="0"/>
+                    </a:p>
+                  </a:txBody>
+                  <a:tcPr/>
+                </a:tc>
+                <a:tc>
+                  <a:txBody>
+                    <a:bodyPr/>
+                    <a:lstStyle/>
+                    <a:p>
+                      <a:r>
+                        <a:rPr lang="pt-BR" sz="1800" kern="1200" dirty="0">
+                          <a:solidFill>
+                            <a:srgbClr val="DBA1A1"/>
+                          </a:solidFill>
+                          <a:effectLst/>
+                          <a:latin typeface="Agency FB" panose="020B0503020202020204" pitchFamily="34" charset="0"/>
+                          <a:ea typeface="+mn-ea"/>
+                          <a:cs typeface="+mn-cs"/>
+                        </a:rPr>
+                        <a:t>A cor do botão deve se destacar.</a:t>
+                      </a:r>
+                    </a:p>
+                    <a:p>
+                      <a:r>
+                        <a:rPr lang="pt-BR" sz="1800" kern="1200" dirty="0">
+                          <a:solidFill>
+                            <a:srgbClr val="DBA1A1"/>
+                          </a:solidFill>
+                          <a:effectLst/>
+                          <a:latin typeface="Agency FB" panose="020B0503020202020204" pitchFamily="34" charset="0"/>
+                          <a:ea typeface="+mn-ea"/>
+                          <a:cs typeface="+mn-cs"/>
+                        </a:rPr>
+                        <a:t>- O texto do botão deve ser legível. </a:t>
+                      </a:r>
+                    </a:p>
+                    <a:p>
+                      <a:r>
+                        <a:rPr lang="pt-BR" sz="1800" kern="1200" dirty="0">
+                          <a:solidFill>
+                            <a:srgbClr val="DBA1A1"/>
+                          </a:solidFill>
+                          <a:effectLst/>
+                          <a:latin typeface="Agency FB" panose="020B0503020202020204" pitchFamily="34" charset="0"/>
+                          <a:ea typeface="+mn-ea"/>
+                          <a:cs typeface="+mn-cs"/>
+                        </a:rPr>
+                        <a:t>	Usabilidade</a:t>
+                      </a:r>
+                    </a:p>
+                    <a:p>
+                      <a:r>
+                        <a:rPr lang="pt-BR" sz="1800" kern="1200" dirty="0">
+                          <a:solidFill>
+                            <a:srgbClr val="DBA1A1"/>
+                          </a:solidFill>
+                          <a:effectLst/>
+                          <a:latin typeface="Agency FB" panose="020B0503020202020204" pitchFamily="34" charset="0"/>
+                          <a:ea typeface="+mn-ea"/>
+                          <a:cs typeface="+mn-cs"/>
+                        </a:rPr>
+                        <a:t>	Desejável</a:t>
+                      </a:r>
+                    </a:p>
+                    <a:p>
+                      <a:endParaRPr lang="pt-BR" dirty="0">
+                        <a:solidFill>
+                          <a:srgbClr val="DBA1A1"/>
+                        </a:solidFill>
+                        <a:latin typeface="Agency FB" panose="020B0503020202020204" pitchFamily="34" charset="0"/>
+                      </a:endParaRPr>
+                    </a:p>
+                  </a:txBody>
+                  <a:tcPr>
+                    <a:lnL w="12700" cap="flat" cmpd="sng" algn="ctr">
+                      <a:noFill/>
+                      <a:prstDash val="solid"/>
+                      <a:round/>
+                      <a:headEnd type="none" w="med" len="med"/>
+                      <a:tailEnd type="none" w="med" len="med"/>
+                    </a:lnL>
+                    <a:lnR w="12700" cap="flat" cmpd="sng" algn="ctr">
+                      <a:noFill/>
+                      <a:prstDash val="solid"/>
+                      <a:round/>
+                      <a:headEnd type="none" w="med" len="med"/>
+                      <a:tailEnd type="none" w="med" len="med"/>
+                    </a:lnR>
+                    <a:lnT w="12700" cap="flat" cmpd="sng" algn="ctr">
+                      <a:noFill/>
+                      <a:prstDash val="solid"/>
+                      <a:round/>
+                      <a:headEnd type="none" w="med" len="med"/>
+                      <a:tailEnd type="none" w="med" len="med"/>
+                    </a:lnT>
+                    <a:lnB w="12700" cap="flat" cmpd="sng" algn="ctr">
+                      <a:noFill/>
+                      <a:prstDash val="solid"/>
+                      <a:round/>
+                      <a:headEnd type="none" w="med" len="med"/>
+                      <a:tailEnd type="none" w="med" len="med"/>
+                    </a:lnB>
+                    <a:lnTlToBr w="12700" cmpd="sng">
+                      <a:noFill/>
+                      <a:prstDash val="solid"/>
+                    </a:lnTlToBr>
+                    <a:lnBlToTr w="12700" cmpd="sng">
+                      <a:noFill/>
+                      <a:prstDash val="solid"/>
+                    </a:lnBlToTr>
+                    <a:solidFill>
+                      <a:srgbClr val="5B616F"/>
+                    </a:solidFill>
+                  </a:tcPr>
+                </a:tc>
+                <a:extLst>
+                  <a:ext uri="{0D108BD9-81ED-4DB2-BD59-A6C34878D82A}">
+                    <a16:rowId xmlns:a16="http://schemas.microsoft.com/office/drawing/2014/main" val="2678225723"/>
+                  </a:ext>
+                </a:extLst>
+              </a:tr>
+              <a:tr h="370840">
+                <a:tc vMerge="1">
+                  <a:txBody>
+                    <a:bodyPr/>
+                    <a:lstStyle/>
+                    <a:p>
+                      <a:endParaRPr lang="pt-BR" dirty="0"/>
+                    </a:p>
+                  </a:txBody>
+                  <a:tcPr/>
+                </a:tc>
+                <a:tc>
+                  <a:txBody>
+                    <a:bodyPr/>
+                    <a:lstStyle/>
+                    <a:p>
+                      <a:r>
+                        <a:rPr lang="pt-BR" sz="1800" kern="1200" dirty="0">
+                          <a:solidFill>
+                            <a:srgbClr val="DBA1A1"/>
+                          </a:solidFill>
+                          <a:effectLst/>
+                          <a:latin typeface="Agency FB" panose="020B0503020202020204" pitchFamily="34" charset="0"/>
+                          <a:ea typeface="+mn-ea"/>
+                          <a:cs typeface="+mn-cs"/>
+                        </a:rPr>
+                        <a:t>O item apagado não deve aparecer na página. </a:t>
+                      </a:r>
+                    </a:p>
+                    <a:p>
+                      <a:r>
+                        <a:rPr lang="pt-BR" sz="1800" kern="1200" dirty="0">
+                          <a:solidFill>
+                            <a:srgbClr val="DBA1A1"/>
+                          </a:solidFill>
+                          <a:effectLst/>
+                          <a:latin typeface="Agency FB" panose="020B0503020202020204" pitchFamily="34" charset="0"/>
+                          <a:ea typeface="+mn-ea"/>
+                          <a:cs typeface="+mn-cs"/>
+                        </a:rPr>
+                        <a:t>	Sistema</a:t>
+                      </a:r>
+                    </a:p>
+                    <a:p>
+                      <a:r>
+                        <a:rPr lang="pt-BR" sz="1800" kern="1200" dirty="0">
+                          <a:solidFill>
+                            <a:srgbClr val="DBA1A1"/>
+                          </a:solidFill>
+                          <a:effectLst/>
+                          <a:latin typeface="Agency FB" panose="020B0503020202020204" pitchFamily="34" charset="0"/>
+                          <a:ea typeface="+mn-ea"/>
+                          <a:cs typeface="+mn-cs"/>
+                        </a:rPr>
+                        <a:t>	Obrigatório</a:t>
+                      </a:r>
+                    </a:p>
+                  </a:txBody>
+                  <a:tcPr>
+                    <a:lnL w="12700" cap="flat" cmpd="sng" algn="ctr">
+                      <a:noFill/>
+                      <a:prstDash val="solid"/>
+                      <a:round/>
+                      <a:headEnd type="none" w="med" len="med"/>
+                      <a:tailEnd type="none" w="med" len="med"/>
+                    </a:lnL>
+                    <a:lnR w="12700" cap="flat" cmpd="sng" algn="ctr">
+                      <a:noFill/>
+                      <a:prstDash val="solid"/>
+                      <a:round/>
+                      <a:headEnd type="none" w="med" len="med"/>
+                      <a:tailEnd type="none" w="med" len="med"/>
+                    </a:lnR>
+                    <a:lnT w="12700" cap="flat" cmpd="sng" algn="ctr">
+                      <a:noFill/>
+                      <a:prstDash val="solid"/>
+                      <a:round/>
+                      <a:headEnd type="none" w="med" len="med"/>
+                      <a:tailEnd type="none" w="med" len="med"/>
+                    </a:lnT>
+                    <a:lnB w="12700" cap="flat" cmpd="sng" algn="ctr">
+                      <a:noFill/>
+                      <a:prstDash val="solid"/>
+                      <a:round/>
+                      <a:headEnd type="none" w="med" len="med"/>
+                      <a:tailEnd type="none" w="med" len="med"/>
+                    </a:lnB>
+                    <a:lnTlToBr w="12700" cmpd="sng">
+                      <a:noFill/>
+                      <a:prstDash val="solid"/>
+                    </a:lnTlToBr>
+                    <a:lnBlToTr w="12700" cmpd="sng">
+                      <a:noFill/>
+                      <a:prstDash val="solid"/>
+                    </a:lnBlToTr>
+                    <a:solidFill>
+                      <a:srgbClr val="5B616F"/>
+                    </a:solidFill>
+                  </a:tcPr>
+                </a:tc>
+                <a:extLst>
+                  <a:ext uri="{0D108BD9-81ED-4DB2-BD59-A6C34878D82A}">
+                    <a16:rowId xmlns:a16="http://schemas.microsoft.com/office/drawing/2014/main" val="1646411524"/>
+                  </a:ext>
+                </a:extLst>
+              </a:tr>
+            </a:tbl>
+          </a:graphicData>
+        </a:graphic>
+      </p:graphicFrame>
+    </p:spTree>
+    <p:extLst>
+      <p:ext uri="{BB962C8B-B14F-4D97-AF65-F5344CB8AC3E}">
+        <p14:creationId xmlns:p14="http://schemas.microsoft.com/office/powerpoint/2010/main" val="608110467"/>
       </p:ext>
     </p:extLst>
   </p:cSld>

</xml_diff>

<commit_message>
Alteração no ppt e Exportação PDF V3
Corrigido os requisitos funcionais, não funcionais e de domínio.
</commit_message>
<xml_diff>
--- a/doc/IFSP/Diet-csharp.pptx
+++ b/doc/IFSP/Diet-csharp.pptx
@@ -12,14 +12,13 @@
     <p:sldId id="263" r:id="rId6"/>
     <p:sldId id="264" r:id="rId7"/>
     <p:sldId id="267" r:id="rId8"/>
-    <p:sldId id="268" r:id="rId9"/>
-    <p:sldId id="269" r:id="rId10"/>
-    <p:sldId id="270" r:id="rId11"/>
-    <p:sldId id="266" r:id="rId12"/>
-    <p:sldId id="265" r:id="rId13"/>
-    <p:sldId id="271" r:id="rId14"/>
-    <p:sldId id="261" r:id="rId15"/>
-    <p:sldId id="262" r:id="rId16"/>
+    <p:sldId id="273" r:id="rId9"/>
+    <p:sldId id="274" r:id="rId10"/>
+    <p:sldId id="266" r:id="rId11"/>
+    <p:sldId id="265" r:id="rId12"/>
+    <p:sldId id="271" r:id="rId13"/>
+    <p:sldId id="261" r:id="rId14"/>
+    <p:sldId id="262" r:id="rId15"/>
   </p:sldIdLst>
   <p:sldSz cx="12192000" cy="6858000"/>
   <p:notesSz cx="6858000" cy="9144000"/>
@@ -124,6 +123,18 @@
     </p:ext>
   </p:extLst>
 </p:presentation>
+</file>
+
+<file path=ppt/commentAuthors.xml><?xml version="1.0" encoding="utf-8"?>
+<p:cmAuthorLst xmlns:a="http://schemas.openxmlformats.org/drawingml/2006/main" xmlns:r="http://schemas.openxmlformats.org/officeDocument/2006/relationships" xmlns:p="http://schemas.openxmlformats.org/presentationml/2006/main">
+  <p:cmAuthor id="1" name="Gabriele Leonel" initials="GL" lastIdx="1" clrIdx="0">
+    <p:extLst>
+      <p:ext uri="{19B8F6BF-5375-455C-9EA6-DF929625EA0E}">
+        <p15:presenceInfo xmlns:p15="http://schemas.microsoft.com/office/powerpoint/2012/main" userId="604ddd1ae7a59beb" providerId="Windows Live"/>
+      </p:ext>
+    </p:extLst>
+  </p:cmAuthor>
+</p:cmAuthorLst>
 </file>
 
 <file path=ppt/slideLayouts/slideLayout1.xml><?xml version="1.0" encoding="utf-8"?>
@@ -3639,8 +3650,8 @@
         </p:nvSpPr>
         <p:spPr>
           <a:xfrm>
-            <a:off x="3043797" y="199512"/>
-            <a:ext cx="6658133" cy="707886"/>
+            <a:off x="4381709" y="199512"/>
+            <a:ext cx="3428582" cy="707886"/>
           </a:xfrm>
           <a:prstGeom prst="rect">
             <a:avLst/>
@@ -3661,572 +3672,44 @@
                 </a:solidFill>
                 <a:latin typeface="Agency FB" panose="020B0503020202020204" pitchFamily="34" charset="0"/>
               </a:rPr>
-              <a:t>Requisitos Funcionais e Não Funcionais</a:t>
-            </a:r>
-          </a:p>
-        </p:txBody>
-      </p:sp>
-      <p:graphicFrame>
-        <p:nvGraphicFramePr>
-          <p:cNvPr id="4" name="Tabela 4">
-            <a:extLst>
-              <a:ext uri="{FF2B5EF4-FFF2-40B4-BE49-F238E27FC236}">
-                <a16:creationId xmlns:a16="http://schemas.microsoft.com/office/drawing/2014/main" id="{0D65BD39-23AE-4817-883A-7F07F263DD1C}"/>
-              </a:ext>
-            </a:extLst>
-          </p:cNvPr>
-          <p:cNvGraphicFramePr>
-            <a:graphicFrameLocks noGrp="1"/>
-          </p:cNvGraphicFramePr>
-          <p:nvPr>
-            <p:extLst>
-              <p:ext uri="{D42A27DB-BD31-4B8C-83A1-F6EECF244321}">
-                <p14:modId xmlns:p14="http://schemas.microsoft.com/office/powerpoint/2010/main" val="3968153120"/>
-              </p:ext>
-            </p:extLst>
-          </p:nvPr>
-        </p:nvGraphicFramePr>
-        <p:xfrm>
-          <a:off x="818545" y="2471427"/>
-          <a:ext cx="10853490" cy="3022600"/>
-        </p:xfrm>
-        <a:graphic>
-          <a:graphicData uri="http://schemas.openxmlformats.org/drawingml/2006/table">
-            <a:tbl>
-              <a:tblPr firstRow="1" bandRow="1">
-                <a:tableStyleId>{5C22544A-7EE6-4342-B048-85BDC9FD1C3A}</a:tableStyleId>
-              </a:tblPr>
-              <a:tblGrid>
-                <a:gridCol w="5426745">
-                  <a:extLst>
-                    <a:ext uri="{9D8B030D-6E8A-4147-A177-3AD203B41FA5}">
-                      <a16:colId xmlns:a16="http://schemas.microsoft.com/office/drawing/2014/main" val="2504239251"/>
-                    </a:ext>
-                  </a:extLst>
-                </a:gridCol>
-                <a:gridCol w="5426745">
-                  <a:extLst>
-                    <a:ext uri="{9D8B030D-6E8A-4147-A177-3AD203B41FA5}">
-                      <a16:colId xmlns:a16="http://schemas.microsoft.com/office/drawing/2014/main" val="354975263"/>
-                    </a:ext>
-                  </a:extLst>
-                </a:gridCol>
-              </a:tblGrid>
-              <a:tr h="370840">
-                <a:tc>
-                  <a:txBody>
-                    <a:bodyPr/>
-                    <a:lstStyle/>
-                    <a:p>
-                      <a:r>
-                        <a:rPr lang="pt-BR" dirty="0">
-                          <a:solidFill>
-                            <a:srgbClr val="DBA1A1"/>
-                          </a:solidFill>
-                          <a:latin typeface="Agency FB" panose="020B0503020202020204" pitchFamily="34" charset="0"/>
-                        </a:rPr>
-                        <a:t>Funcional</a:t>
-                      </a:r>
-                    </a:p>
-                  </a:txBody>
-                  <a:tcPr>
-                    <a:lnL w="12700" cap="flat" cmpd="sng" algn="ctr">
-                      <a:noFill/>
-                      <a:prstDash val="solid"/>
-                      <a:round/>
-                      <a:headEnd type="none" w="med" len="med"/>
-                      <a:tailEnd type="none" w="med" len="med"/>
-                    </a:lnL>
-                    <a:lnR w="12700" cap="flat" cmpd="sng" algn="ctr">
-                      <a:noFill/>
-                      <a:prstDash val="solid"/>
-                      <a:round/>
-                      <a:headEnd type="none" w="med" len="med"/>
-                      <a:tailEnd type="none" w="med" len="med"/>
-                    </a:lnR>
-                    <a:lnT w="12700" cap="flat" cmpd="sng" algn="ctr">
-                      <a:noFill/>
-                      <a:prstDash val="solid"/>
-                      <a:round/>
-                      <a:headEnd type="none" w="med" len="med"/>
-                      <a:tailEnd type="none" w="med" len="med"/>
-                    </a:lnT>
-                    <a:lnB w="12700" cap="flat" cmpd="sng" algn="ctr">
-                      <a:noFill/>
-                      <a:prstDash val="solid"/>
-                      <a:round/>
-                      <a:headEnd type="none" w="med" len="med"/>
-                      <a:tailEnd type="none" w="med" len="med"/>
-                    </a:lnB>
-                    <a:lnTlToBr w="12700" cmpd="sng">
-                      <a:noFill/>
-                      <a:prstDash val="solid"/>
-                    </a:lnTlToBr>
-                    <a:lnBlToTr w="12700" cmpd="sng">
-                      <a:noFill/>
-                      <a:prstDash val="solid"/>
-                    </a:lnBlToTr>
-                    <a:solidFill>
-                      <a:srgbClr val="5B616F"/>
-                    </a:solidFill>
-                  </a:tcPr>
-                </a:tc>
-                <a:tc>
-                  <a:txBody>
-                    <a:bodyPr/>
-                    <a:lstStyle/>
-                    <a:p>
-                      <a:r>
-                        <a:rPr lang="pt-BR" dirty="0">
-                          <a:solidFill>
-                            <a:srgbClr val="DBA1A1"/>
-                          </a:solidFill>
-                          <a:latin typeface="Agency FB" panose="020B0503020202020204" pitchFamily="34" charset="0"/>
-                        </a:rPr>
-                        <a:t>Não Funcional</a:t>
-                      </a:r>
-                    </a:p>
-                  </a:txBody>
-                  <a:tcPr>
-                    <a:lnL w="12700" cap="flat" cmpd="sng" algn="ctr">
-                      <a:noFill/>
-                      <a:prstDash val="solid"/>
-                      <a:round/>
-                      <a:headEnd type="none" w="med" len="med"/>
-                      <a:tailEnd type="none" w="med" len="med"/>
-                    </a:lnL>
-                    <a:lnR w="12700" cap="flat" cmpd="sng" algn="ctr">
-                      <a:noFill/>
-                      <a:prstDash val="solid"/>
-                      <a:round/>
-                      <a:headEnd type="none" w="med" len="med"/>
-                      <a:tailEnd type="none" w="med" len="med"/>
-                    </a:lnR>
-                    <a:lnT w="12700" cap="flat" cmpd="sng" algn="ctr">
-                      <a:noFill/>
-                      <a:prstDash val="solid"/>
-                      <a:round/>
-                      <a:headEnd type="none" w="med" len="med"/>
-                      <a:tailEnd type="none" w="med" len="med"/>
-                    </a:lnT>
-                    <a:lnB w="12700" cap="flat" cmpd="sng" algn="ctr">
-                      <a:noFill/>
-                      <a:prstDash val="solid"/>
-                      <a:round/>
-                      <a:headEnd type="none" w="med" len="med"/>
-                      <a:tailEnd type="none" w="med" len="med"/>
-                    </a:lnB>
-                    <a:lnTlToBr w="12700" cmpd="sng">
-                      <a:noFill/>
-                      <a:prstDash val="solid"/>
-                    </a:lnTlToBr>
-                    <a:lnBlToTr w="12700" cmpd="sng">
-                      <a:noFill/>
-                      <a:prstDash val="solid"/>
-                    </a:lnBlToTr>
-                    <a:solidFill>
-                      <a:srgbClr val="5B616F"/>
-                    </a:solidFill>
-                  </a:tcPr>
-                </a:tc>
-                <a:extLst>
-                  <a:ext uri="{0D108BD9-81ED-4DB2-BD59-A6C34878D82A}">
-                    <a16:rowId xmlns:a16="http://schemas.microsoft.com/office/drawing/2014/main" val="2395872218"/>
-                  </a:ext>
-                </a:extLst>
-              </a:tr>
-              <a:tr h="370840">
-                <a:tc rowSpan="2">
-                  <a:txBody>
-                    <a:bodyPr/>
-                    <a:lstStyle/>
-                    <a:p>
-                      <a:pPr algn="l"/>
-                      <a:r>
-                        <a:rPr lang="pt-BR" sz="1800" kern="1200" dirty="0">
-                          <a:solidFill>
-                            <a:srgbClr val="DBA1A1"/>
-                          </a:solidFill>
-                          <a:effectLst/>
-                          <a:latin typeface="Agency FB" panose="020B0503020202020204" pitchFamily="34" charset="0"/>
-                          <a:ea typeface="+mn-ea"/>
-                          <a:cs typeface="+mn-cs"/>
-                        </a:rPr>
-                        <a:t>Login -  O usuário deve efetuar um login para que possa usar o programa.</a:t>
-                      </a:r>
-                      <a:endParaRPr lang="pt-BR" dirty="0">
-                        <a:solidFill>
-                          <a:srgbClr val="DBA1A1"/>
-                        </a:solidFill>
-                        <a:latin typeface="Agency FB" panose="020B0503020202020204" pitchFamily="34" charset="0"/>
-                      </a:endParaRPr>
-                    </a:p>
-                  </a:txBody>
-                  <a:tcPr>
-                    <a:lnL w="12700" cap="flat" cmpd="sng" algn="ctr">
-                      <a:noFill/>
-                      <a:prstDash val="solid"/>
-                      <a:round/>
-                      <a:headEnd type="none" w="med" len="med"/>
-                      <a:tailEnd type="none" w="med" len="med"/>
-                    </a:lnL>
-                    <a:lnR w="12700" cap="flat" cmpd="sng" algn="ctr">
-                      <a:noFill/>
-                      <a:prstDash val="solid"/>
-                      <a:round/>
-                      <a:headEnd type="none" w="med" len="med"/>
-                      <a:tailEnd type="none" w="med" len="med"/>
-                    </a:lnR>
-                    <a:lnT w="12700" cap="flat" cmpd="sng" algn="ctr">
-                      <a:noFill/>
-                      <a:prstDash val="solid"/>
-                      <a:round/>
-                      <a:headEnd type="none" w="med" len="med"/>
-                      <a:tailEnd type="none" w="med" len="med"/>
-                    </a:lnT>
-                    <a:lnB w="12700" cap="flat" cmpd="sng" algn="ctr">
-                      <a:noFill/>
-                      <a:prstDash val="solid"/>
-                      <a:round/>
-                      <a:headEnd type="none" w="med" len="med"/>
-                      <a:tailEnd type="none" w="med" len="med"/>
-                    </a:lnB>
-                    <a:lnTlToBr w="12700" cmpd="sng">
-                      <a:noFill/>
-                      <a:prstDash val="solid"/>
-                    </a:lnTlToBr>
-                    <a:lnBlToTr w="12700" cmpd="sng">
-                      <a:noFill/>
-                      <a:prstDash val="solid"/>
-                    </a:lnBlToTr>
-                    <a:solidFill>
-                      <a:srgbClr val="5B616F"/>
-                    </a:solidFill>
-                  </a:tcPr>
-                </a:tc>
-                <a:tc>
-                  <a:txBody>
-                    <a:bodyPr/>
-                    <a:lstStyle/>
-                    <a:p>
-                      <a:pPr marL="0" marR="0" lvl="0" indent="0" algn="l" defTabSz="914400" rtl="0" eaLnBrk="1" fontAlgn="auto" latinLnBrk="0" hangingPunct="1">
-                        <a:lnSpc>
-                          <a:spcPct val="100000"/>
-                        </a:lnSpc>
-                        <a:spcBef>
-                          <a:spcPts val="0"/>
-                        </a:spcBef>
-                        <a:spcAft>
-                          <a:spcPts val="0"/>
-                        </a:spcAft>
-                        <a:buClrTx/>
-                        <a:buSzTx/>
-                        <a:buFontTx/>
-                        <a:buNone/>
-                        <a:tabLst/>
-                        <a:defRPr/>
-                      </a:pPr>
-                      <a:r>
-                        <a:rPr lang="pt-BR" sz="1800" kern="1200" dirty="0">
-                          <a:solidFill>
-                            <a:srgbClr val="DBA1A1"/>
-                          </a:solidFill>
-                          <a:effectLst/>
-                          <a:latin typeface="Agency FB" panose="020B0503020202020204" pitchFamily="34" charset="0"/>
-                          <a:ea typeface="+mn-ea"/>
-                          <a:cs typeface="+mn-cs"/>
-                        </a:rPr>
-                        <a:t>Ocultar a senha</a:t>
-                      </a:r>
-                    </a:p>
-                    <a:p>
-                      <a:pPr marL="0" marR="0" lvl="0" indent="0" algn="l" defTabSz="914400" rtl="0" eaLnBrk="1" fontAlgn="auto" latinLnBrk="0" hangingPunct="1">
-                        <a:lnSpc>
-                          <a:spcPct val="100000"/>
-                        </a:lnSpc>
-                        <a:spcBef>
-                          <a:spcPts val="0"/>
-                        </a:spcBef>
-                        <a:spcAft>
-                          <a:spcPts val="0"/>
-                        </a:spcAft>
-                        <a:buClrTx/>
-                        <a:buSzTx/>
-                        <a:buFontTx/>
-                        <a:buNone/>
-                        <a:tabLst/>
-                        <a:defRPr/>
-                      </a:pPr>
-                      <a:r>
-                        <a:rPr lang="pt-BR" sz="1800" kern="1200" dirty="0">
-                          <a:solidFill>
-                            <a:srgbClr val="DBA1A1"/>
-                          </a:solidFill>
-                          <a:effectLst/>
-                          <a:latin typeface="Agency FB" panose="020B0503020202020204" pitchFamily="34" charset="0"/>
-                          <a:ea typeface="+mn-ea"/>
-                          <a:cs typeface="+mn-cs"/>
-                        </a:rPr>
-                        <a:t>- Enquanto digita a senha devem aparecer * no lugar do que é digitado.	Segurança</a:t>
-                      </a:r>
-                    </a:p>
-                    <a:p>
-                      <a:r>
-                        <a:rPr lang="pt-BR" sz="1800" kern="1200" dirty="0">
-                          <a:solidFill>
-                            <a:srgbClr val="DBA1A1"/>
-                          </a:solidFill>
-                          <a:effectLst/>
-                          <a:latin typeface="Agency FB" panose="020B0503020202020204" pitchFamily="34" charset="0"/>
-                          <a:ea typeface="+mn-ea"/>
-                          <a:cs typeface="+mn-cs"/>
-                        </a:rPr>
-                        <a:t>	Obrigatório</a:t>
-                      </a:r>
-                    </a:p>
-                  </a:txBody>
-                  <a:tcPr>
-                    <a:lnL w="12700" cap="flat" cmpd="sng" algn="ctr">
-                      <a:noFill/>
-                      <a:prstDash val="solid"/>
-                      <a:round/>
-                      <a:headEnd type="none" w="med" len="med"/>
-                      <a:tailEnd type="none" w="med" len="med"/>
-                    </a:lnL>
-                    <a:lnR w="12700" cap="flat" cmpd="sng" algn="ctr">
-                      <a:noFill/>
-                      <a:prstDash val="solid"/>
-                      <a:round/>
-                      <a:headEnd type="none" w="med" len="med"/>
-                      <a:tailEnd type="none" w="med" len="med"/>
-                    </a:lnR>
-                    <a:lnT w="12700" cap="flat" cmpd="sng" algn="ctr">
-                      <a:noFill/>
-                      <a:prstDash val="solid"/>
-                      <a:round/>
-                      <a:headEnd type="none" w="med" len="med"/>
-                      <a:tailEnd type="none" w="med" len="med"/>
-                    </a:lnT>
-                    <a:lnB w="12700" cap="flat" cmpd="sng" algn="ctr">
-                      <a:noFill/>
-                      <a:prstDash val="solid"/>
-                      <a:round/>
-                      <a:headEnd type="none" w="med" len="med"/>
-                      <a:tailEnd type="none" w="med" len="med"/>
-                    </a:lnB>
-                    <a:lnTlToBr w="12700" cmpd="sng">
-                      <a:noFill/>
-                      <a:prstDash val="solid"/>
-                    </a:lnTlToBr>
-                    <a:lnBlToTr w="12700" cmpd="sng">
-                      <a:noFill/>
-                      <a:prstDash val="solid"/>
-                    </a:lnBlToTr>
-                    <a:solidFill>
-                      <a:srgbClr val="5B616F"/>
-                    </a:solidFill>
-                  </a:tcPr>
-                </a:tc>
-                <a:extLst>
-                  <a:ext uri="{0D108BD9-81ED-4DB2-BD59-A6C34878D82A}">
-                    <a16:rowId xmlns:a16="http://schemas.microsoft.com/office/drawing/2014/main" val="3034851657"/>
-                  </a:ext>
-                </a:extLst>
-              </a:tr>
-              <a:tr h="370840">
-                <a:tc vMerge="1">
-                  <a:txBody>
-                    <a:bodyPr/>
-                    <a:lstStyle/>
-                    <a:p>
-                      <a:pPr algn="l"/>
-                      <a:endParaRPr lang="pt-BR" dirty="0">
-                        <a:solidFill>
-                          <a:srgbClr val="DBA1A1"/>
-                        </a:solidFill>
-                        <a:latin typeface="Agency FB" panose="020B0503020202020204" pitchFamily="34" charset="0"/>
-                      </a:endParaRPr>
-                    </a:p>
-                  </a:txBody>
-                  <a:tcPr>
-                    <a:lnL w="12700" cap="flat" cmpd="sng" algn="ctr">
-                      <a:noFill/>
-                      <a:prstDash val="solid"/>
-                      <a:round/>
-                      <a:headEnd type="none" w="med" len="med"/>
-                      <a:tailEnd type="none" w="med" len="med"/>
-                    </a:lnL>
-                    <a:lnR w="12700" cap="flat" cmpd="sng" algn="ctr">
-                      <a:noFill/>
-                      <a:prstDash val="solid"/>
-                      <a:round/>
-                      <a:headEnd type="none" w="med" len="med"/>
-                      <a:tailEnd type="none" w="med" len="med"/>
-                    </a:lnR>
-                    <a:lnT w="12700" cap="flat" cmpd="sng" algn="ctr">
-                      <a:noFill/>
-                      <a:prstDash val="solid"/>
-                      <a:round/>
-                      <a:headEnd type="none" w="med" len="med"/>
-                      <a:tailEnd type="none" w="med" len="med"/>
-                    </a:lnT>
-                    <a:lnB w="12700" cap="flat" cmpd="sng" algn="ctr">
-                      <a:noFill/>
-                      <a:prstDash val="solid"/>
-                      <a:round/>
-                      <a:headEnd type="none" w="med" len="med"/>
-                      <a:tailEnd type="none" w="med" len="med"/>
-                    </a:lnB>
-                    <a:lnTlToBr w="12700" cmpd="sng">
-                      <a:noFill/>
-                      <a:prstDash val="solid"/>
-                    </a:lnTlToBr>
-                    <a:lnBlToTr w="12700" cmpd="sng">
-                      <a:noFill/>
-                      <a:prstDash val="solid"/>
-                    </a:lnBlToTr>
-                    <a:solidFill>
-                      <a:srgbClr val="5B616F"/>
-                    </a:solidFill>
-                  </a:tcPr>
-                </a:tc>
-                <a:tc>
-                  <a:txBody>
-                    <a:bodyPr/>
-                    <a:lstStyle/>
-                    <a:p>
-                      <a:pPr marL="0" marR="0" lvl="0" indent="0" algn="l" defTabSz="914400" rtl="0" eaLnBrk="1" fontAlgn="auto" latinLnBrk="0" hangingPunct="1">
-                        <a:lnSpc>
-                          <a:spcPct val="100000"/>
-                        </a:lnSpc>
-                        <a:spcBef>
-                          <a:spcPts val="0"/>
-                        </a:spcBef>
-                        <a:spcAft>
-                          <a:spcPts val="0"/>
-                        </a:spcAft>
-                        <a:buClrTx/>
-                        <a:buSzTx/>
-                        <a:buFontTx/>
-                        <a:buNone/>
-                        <a:tabLst/>
-                        <a:defRPr/>
-                      </a:pPr>
-                      <a:r>
-                        <a:rPr lang="pt-BR" sz="1800" kern="1200" dirty="0">
-                          <a:solidFill>
-                            <a:srgbClr val="DBA1A1"/>
-                          </a:solidFill>
-                          <a:effectLst/>
-                          <a:latin typeface="Agency FB" panose="020B0503020202020204" pitchFamily="34" charset="0"/>
-                          <a:ea typeface="+mn-ea"/>
-                          <a:cs typeface="+mn-cs"/>
-                        </a:rPr>
-                        <a:t>Separar o tipo de usuário.</a:t>
-                      </a:r>
-                    </a:p>
-                    <a:p>
-                      <a:pPr marL="0" marR="0" lvl="0" indent="0" algn="l" defTabSz="914400" rtl="0" eaLnBrk="1" fontAlgn="auto" latinLnBrk="0" hangingPunct="1">
-                        <a:lnSpc>
-                          <a:spcPct val="100000"/>
-                        </a:lnSpc>
-                        <a:spcBef>
-                          <a:spcPts val="0"/>
-                        </a:spcBef>
-                        <a:spcAft>
-                          <a:spcPts val="0"/>
-                        </a:spcAft>
-                        <a:buClrTx/>
-                        <a:buSzTx/>
-                        <a:buFontTx/>
-                        <a:buNone/>
-                        <a:tabLst/>
-                        <a:defRPr/>
-                      </a:pPr>
-                      <a:r>
-                        <a:rPr lang="pt-BR" sz="1800" kern="1200" dirty="0">
-                          <a:solidFill>
-                            <a:srgbClr val="DBA1A1"/>
-                          </a:solidFill>
-                          <a:effectLst/>
-                          <a:latin typeface="Agency FB" panose="020B0503020202020204" pitchFamily="34" charset="0"/>
-                          <a:ea typeface="+mn-ea"/>
-                          <a:cs typeface="+mn-cs"/>
-                        </a:rPr>
-                        <a:t>- O login deve conter a função de levar o usuário a sua tela correta, o nutricionista para seu menu e o paciente para o dele..	Usabilidade/Segurança</a:t>
-                      </a:r>
-                    </a:p>
-                    <a:p>
-                      <a:r>
-                        <a:rPr lang="pt-BR" sz="1800" kern="1200" dirty="0">
-                          <a:solidFill>
-                            <a:srgbClr val="DBA1A1"/>
-                          </a:solidFill>
-                          <a:effectLst/>
-                          <a:latin typeface="Agency FB" panose="020B0503020202020204" pitchFamily="34" charset="0"/>
-                          <a:ea typeface="+mn-ea"/>
-                          <a:cs typeface="+mn-cs"/>
-                        </a:rPr>
-                        <a:t>	Obrigatório</a:t>
-                      </a:r>
-                    </a:p>
-                  </a:txBody>
-                  <a:tcPr>
-                    <a:lnL w="12700" cap="flat" cmpd="sng" algn="ctr">
-                      <a:noFill/>
-                      <a:prstDash val="solid"/>
-                      <a:round/>
-                      <a:headEnd type="none" w="med" len="med"/>
-                      <a:tailEnd type="none" w="med" len="med"/>
-                    </a:lnL>
-                    <a:lnR w="12700" cap="flat" cmpd="sng" algn="ctr">
-                      <a:noFill/>
-                      <a:prstDash val="solid"/>
-                      <a:round/>
-                      <a:headEnd type="none" w="med" len="med"/>
-                      <a:tailEnd type="none" w="med" len="med"/>
-                    </a:lnR>
-                    <a:lnT w="12700" cap="flat" cmpd="sng" algn="ctr">
-                      <a:noFill/>
-                      <a:prstDash val="solid"/>
-                      <a:round/>
-                      <a:headEnd type="none" w="med" len="med"/>
-                      <a:tailEnd type="none" w="med" len="med"/>
-                    </a:lnT>
-                    <a:lnB w="12700" cap="flat" cmpd="sng" algn="ctr">
-                      <a:noFill/>
-                      <a:prstDash val="solid"/>
-                      <a:round/>
-                      <a:headEnd type="none" w="med" len="med"/>
-                      <a:tailEnd type="none" w="med" len="med"/>
-                    </a:lnB>
-                    <a:lnTlToBr w="12700" cmpd="sng">
-                      <a:noFill/>
-                      <a:prstDash val="solid"/>
-                    </a:lnTlToBr>
-                    <a:lnBlToTr w="12700" cmpd="sng">
-                      <a:noFill/>
-                      <a:prstDash val="solid"/>
-                    </a:lnBlToTr>
-                    <a:solidFill>
-                      <a:srgbClr val="5B616F"/>
-                    </a:solidFill>
-                  </a:tcPr>
-                </a:tc>
-                <a:extLst>
-                  <a:ext uri="{0D108BD9-81ED-4DB2-BD59-A6C34878D82A}">
-                    <a16:rowId xmlns:a16="http://schemas.microsoft.com/office/drawing/2014/main" val="1001868768"/>
-                  </a:ext>
-                </a:extLst>
-              </a:tr>
-            </a:tbl>
-          </a:graphicData>
-        </a:graphic>
-      </p:graphicFrame>
+              <a:t>Caso de Uso</a:t>
+            </a:r>
+          </a:p>
+        </p:txBody>
+      </p:sp>
+      <p:pic>
+        <p:nvPicPr>
+          <p:cNvPr id="19" name="Imagem 18">
+            <a:extLst>
+              <a:ext uri="{FF2B5EF4-FFF2-40B4-BE49-F238E27FC236}">
+                <a16:creationId xmlns:a16="http://schemas.microsoft.com/office/drawing/2014/main" id="{68F9BA98-58CA-4DC5-A29B-F8F546FD2A49}"/>
+              </a:ext>
+            </a:extLst>
+          </p:cNvPr>
+          <p:cNvPicPr>
+            <a:picLocks noChangeAspect="1"/>
+          </p:cNvPicPr>
+          <p:nvPr/>
+        </p:nvPicPr>
+        <p:blipFill rotWithShape="1">
+          <a:blip r:embed="rId2"/>
+          <a:srcRect l="9467" t="16139" r="5863" b="4465"/>
+          <a:stretch/>
+        </p:blipFill>
+        <p:spPr>
+          <a:xfrm>
+            <a:off x="2223082" y="1306420"/>
+            <a:ext cx="8212822" cy="5444894"/>
+          </a:xfrm>
+          <a:prstGeom prst="rect">
+            <a:avLst/>
+          </a:prstGeom>
+        </p:spPr>
+      </p:pic>
     </p:spTree>
     <p:extLst>
       <p:ext uri="{BB962C8B-B14F-4D97-AF65-F5344CB8AC3E}">
-        <p14:creationId xmlns:p14="http://schemas.microsoft.com/office/powerpoint/2010/main" val="1348566746"/>
+        <p14:creationId xmlns:p14="http://schemas.microsoft.com/office/powerpoint/2010/main" val="1888800592"/>
       </p:ext>
     </p:extLst>
   </p:cSld>
@@ -4275,7 +3758,7 @@
         </p:nvSpPr>
         <p:spPr>
           <a:xfrm rot="5400000">
-            <a:off x="5542547" y="-5542545"/>
+            <a:off x="5542547" y="-5607860"/>
             <a:ext cx="1106907" cy="12192000"/>
           </a:xfrm>
           <a:prstGeom prst="rect">
@@ -4336,8 +3819,8 @@
         </p:nvSpPr>
         <p:spPr>
           <a:xfrm>
-            <a:off x="4381709" y="199512"/>
-            <a:ext cx="3428582" cy="707886"/>
+            <a:off x="3692483" y="199512"/>
+            <a:ext cx="5274019" cy="707886"/>
           </a:xfrm>
           <a:prstGeom prst="rect">
             <a:avLst/>
@@ -4358,44 +3841,171 @@
                 </a:solidFill>
                 <a:latin typeface="Agency FB" panose="020B0503020202020204" pitchFamily="34" charset="0"/>
               </a:rPr>
-              <a:t>Caso de Uso</a:t>
+              <a:t>Protótipo</a:t>
             </a:r>
           </a:p>
         </p:txBody>
       </p:sp>
       <p:pic>
         <p:nvPicPr>
-          <p:cNvPr id="19" name="Imagem 18">
-            <a:extLst>
-              <a:ext uri="{FF2B5EF4-FFF2-40B4-BE49-F238E27FC236}">
-                <a16:creationId xmlns:a16="http://schemas.microsoft.com/office/drawing/2014/main" id="{68F9BA98-58CA-4DC5-A29B-F8F546FD2A49}"/>
-              </a:ext>
-            </a:extLst>
-          </p:cNvPr>
-          <p:cNvPicPr>
-            <a:picLocks noChangeAspect="1"/>
-          </p:cNvPicPr>
+          <p:cNvPr id="5" name="Imagem 4">
+            <a:extLst>
+              <a:ext uri="{FF2B5EF4-FFF2-40B4-BE49-F238E27FC236}">
+                <a16:creationId xmlns:a16="http://schemas.microsoft.com/office/drawing/2014/main" id="{5DAE12E0-2F84-4A09-97AE-5C807B276D6B}"/>
+              </a:ext>
+            </a:extLst>
+          </p:cNvPr>
+          <p:cNvPicPr/>
           <p:nvPr/>
         </p:nvPicPr>
-        <p:blipFill rotWithShape="1">
-          <a:blip r:embed="rId2"/>
-          <a:srcRect l="9467" t="16139" r="5863" b="4465"/>
-          <a:stretch/>
+        <p:blipFill>
+          <a:blip r:embed="rId2">
+            <a:extLst>
+              <a:ext uri="{28A0092B-C50C-407E-A947-70E740481C1C}">
+                <a14:useLocalDpi xmlns:a14="http://schemas.microsoft.com/office/drawing/2010/main" val="0"/>
+              </a:ext>
+            </a:extLst>
+          </a:blip>
+          <a:srcRect/>
+          <a:stretch>
+            <a:fillRect/>
+          </a:stretch>
         </p:blipFill>
-        <p:spPr>
+        <p:spPr bwMode="auto">
           <a:xfrm>
-            <a:off x="2223082" y="1306420"/>
-            <a:ext cx="8212822" cy="5444894"/>
+            <a:off x="767345" y="1380347"/>
+            <a:ext cx="2371725" cy="2343150"/>
           </a:xfrm>
           <a:prstGeom prst="rect">
             <a:avLst/>
           </a:prstGeom>
+          <a:noFill/>
+          <a:ln>
+            <a:noFill/>
+          </a:ln>
+        </p:spPr>
+      </p:pic>
+      <p:pic>
+        <p:nvPicPr>
+          <p:cNvPr id="6" name="Imagem 5">
+            <a:extLst>
+              <a:ext uri="{FF2B5EF4-FFF2-40B4-BE49-F238E27FC236}">
+                <a16:creationId xmlns:a16="http://schemas.microsoft.com/office/drawing/2014/main" id="{7CEC0A35-1AAC-46B5-8F1E-3BF3BDA89204}"/>
+              </a:ext>
+            </a:extLst>
+          </p:cNvPr>
+          <p:cNvPicPr/>
+          <p:nvPr/>
+        </p:nvPicPr>
+        <p:blipFill>
+          <a:blip r:embed="rId3">
+            <a:extLst>
+              <a:ext uri="{28A0092B-C50C-407E-A947-70E740481C1C}">
+                <a14:useLocalDpi xmlns:a14="http://schemas.microsoft.com/office/drawing/2010/main" val="0"/>
+              </a:ext>
+            </a:extLst>
+          </a:blip>
+          <a:srcRect/>
+          <a:stretch>
+            <a:fillRect/>
+          </a:stretch>
+        </p:blipFill>
+        <p:spPr bwMode="auto">
+          <a:xfrm>
+            <a:off x="3954935" y="1380347"/>
+            <a:ext cx="3440495" cy="2343150"/>
+          </a:xfrm>
+          <a:prstGeom prst="rect">
+            <a:avLst/>
+          </a:prstGeom>
+          <a:noFill/>
+          <a:ln>
+            <a:noFill/>
+          </a:ln>
+        </p:spPr>
+      </p:pic>
+      <p:pic>
+        <p:nvPicPr>
+          <p:cNvPr id="7" name="Imagem 6">
+            <a:extLst>
+              <a:ext uri="{FF2B5EF4-FFF2-40B4-BE49-F238E27FC236}">
+                <a16:creationId xmlns:a16="http://schemas.microsoft.com/office/drawing/2014/main" id="{FFE61159-FC01-417E-9947-B7DCECA452E9}"/>
+              </a:ext>
+            </a:extLst>
+          </p:cNvPr>
+          <p:cNvPicPr/>
+          <p:nvPr/>
+        </p:nvPicPr>
+        <p:blipFill>
+          <a:blip r:embed="rId4">
+            <a:extLst>
+              <a:ext uri="{28A0092B-C50C-407E-A947-70E740481C1C}">
+                <a14:useLocalDpi xmlns:a14="http://schemas.microsoft.com/office/drawing/2010/main" val="0"/>
+              </a:ext>
+            </a:extLst>
+          </a:blip>
+          <a:srcRect/>
+          <a:stretch>
+            <a:fillRect/>
+          </a:stretch>
+        </p:blipFill>
+        <p:spPr bwMode="auto">
+          <a:xfrm>
+            <a:off x="7929296" y="1306420"/>
+            <a:ext cx="3704590" cy="2512060"/>
+          </a:xfrm>
+          <a:prstGeom prst="rect">
+            <a:avLst/>
+          </a:prstGeom>
+          <a:noFill/>
+          <a:ln>
+            <a:noFill/>
+          </a:ln>
+        </p:spPr>
+      </p:pic>
+      <p:pic>
+        <p:nvPicPr>
+          <p:cNvPr id="8" name="Imagem 7">
+            <a:extLst>
+              <a:ext uri="{FF2B5EF4-FFF2-40B4-BE49-F238E27FC236}">
+                <a16:creationId xmlns:a16="http://schemas.microsoft.com/office/drawing/2014/main" id="{AE23833B-6330-4441-A999-95A7945F3E49}"/>
+              </a:ext>
+            </a:extLst>
+          </p:cNvPr>
+          <p:cNvPicPr/>
+          <p:nvPr/>
+        </p:nvPicPr>
+        <p:blipFill>
+          <a:blip r:embed="rId5">
+            <a:extLst>
+              <a:ext uri="{28A0092B-C50C-407E-A947-70E740481C1C}">
+                <a14:useLocalDpi xmlns:a14="http://schemas.microsoft.com/office/drawing/2010/main" val="0"/>
+              </a:ext>
+            </a:extLst>
+          </a:blip>
+          <a:srcRect/>
+          <a:stretch>
+            <a:fillRect/>
+          </a:stretch>
+        </p:blipFill>
+        <p:spPr bwMode="auto">
+          <a:xfrm>
+            <a:off x="767345" y="3862738"/>
+            <a:ext cx="3327549" cy="2795750"/>
+          </a:xfrm>
+          <a:prstGeom prst="rect">
+            <a:avLst/>
+          </a:prstGeom>
+          <a:noFill/>
+          <a:ln>
+            <a:noFill/>
+          </a:ln>
         </p:spPr>
       </p:pic>
     </p:spTree>
     <p:extLst>
       <p:ext uri="{BB962C8B-B14F-4D97-AF65-F5344CB8AC3E}">
-        <p14:creationId xmlns:p14="http://schemas.microsoft.com/office/powerpoint/2010/main" val="1888800592"/>
+        <p14:creationId xmlns:p14="http://schemas.microsoft.com/office/powerpoint/2010/main" val="221351180"/>
       </p:ext>
     </p:extLst>
   </p:cSld>
@@ -4527,171 +4137,146 @@
                 </a:solidFill>
                 <a:latin typeface="Agency FB" panose="020B0503020202020204" pitchFamily="34" charset="0"/>
               </a:rPr>
-              <a:t>Protótipo</a:t>
+              <a:t>Versão Final</a:t>
             </a:r>
           </a:p>
         </p:txBody>
       </p:sp>
       <p:pic>
         <p:nvPicPr>
-          <p:cNvPr id="5" name="Imagem 4">
-            <a:extLst>
-              <a:ext uri="{FF2B5EF4-FFF2-40B4-BE49-F238E27FC236}">
-                <a16:creationId xmlns:a16="http://schemas.microsoft.com/office/drawing/2014/main" id="{5DAE12E0-2F84-4A09-97AE-5C807B276D6B}"/>
-              </a:ext>
-            </a:extLst>
-          </p:cNvPr>
-          <p:cNvPicPr/>
+          <p:cNvPr id="9" name="Imagem 8">
+            <a:extLst>
+              <a:ext uri="{FF2B5EF4-FFF2-40B4-BE49-F238E27FC236}">
+                <a16:creationId xmlns:a16="http://schemas.microsoft.com/office/drawing/2014/main" id="{EC67E932-6630-42C1-8CD9-3498DE5DDF86}"/>
+              </a:ext>
+            </a:extLst>
+          </p:cNvPr>
+          <p:cNvPicPr>
+            <a:picLocks noChangeAspect="1"/>
+          </p:cNvPicPr>
           <p:nvPr/>
         </p:nvPicPr>
         <p:blipFill>
-          <a:blip r:embed="rId2">
-            <a:extLst>
-              <a:ext uri="{28A0092B-C50C-407E-A947-70E740481C1C}">
-                <a14:useLocalDpi xmlns:a14="http://schemas.microsoft.com/office/drawing/2010/main" val="0"/>
-              </a:ext>
-            </a:extLst>
-          </a:blip>
-          <a:srcRect/>
+          <a:blip r:embed="rId2"/>
           <a:stretch>
             <a:fillRect/>
           </a:stretch>
         </p:blipFill>
-        <p:spPr bwMode="auto">
+        <p:spPr>
           <a:xfrm>
-            <a:off x="767345" y="1380347"/>
-            <a:ext cx="2371725" cy="2343150"/>
+            <a:off x="269502" y="1162895"/>
+            <a:ext cx="3098849" cy="2608154"/>
+          </a:xfrm>
+          <a:prstGeom prst="rect">
+            <a:avLst/>
+          </a:prstGeom>
+        </p:spPr>
+      </p:pic>
+      <p:pic>
+        <p:nvPicPr>
+          <p:cNvPr id="11" name="Imagem 10">
+            <a:extLst>
+              <a:ext uri="{FF2B5EF4-FFF2-40B4-BE49-F238E27FC236}">
+                <a16:creationId xmlns:a16="http://schemas.microsoft.com/office/drawing/2014/main" id="{9BEAA337-BD5F-4769-B6D8-E90E99E5A574}"/>
+              </a:ext>
+            </a:extLst>
+          </p:cNvPr>
+          <p:cNvPicPr>
+            <a:picLocks noChangeAspect="1"/>
+          </p:cNvPicPr>
+          <p:nvPr/>
+        </p:nvPicPr>
+        <p:blipFill rotWithShape="1">
+          <a:blip r:embed="rId3"/>
+          <a:srcRect l="1681" t="2761" r="1654" b="-39"/>
+          <a:stretch/>
+        </p:blipFill>
+        <p:spPr>
+          <a:xfrm>
+            <a:off x="3900196" y="2157155"/>
+            <a:ext cx="3816221" cy="2543689"/>
+          </a:xfrm>
+          <a:prstGeom prst="rect">
+            <a:avLst/>
+          </a:prstGeom>
+        </p:spPr>
+      </p:pic>
+      <p:pic>
+        <p:nvPicPr>
+          <p:cNvPr id="13" name="Imagem 12">
+            <a:extLst>
+              <a:ext uri="{FF2B5EF4-FFF2-40B4-BE49-F238E27FC236}">
+                <a16:creationId xmlns:a16="http://schemas.microsoft.com/office/drawing/2014/main" id="{18D6C8A8-EDFB-4C3E-B7E5-AD061E98047D}"/>
+              </a:ext>
+            </a:extLst>
+          </p:cNvPr>
+          <p:cNvPicPr>
+            <a:picLocks noChangeAspect="1"/>
+          </p:cNvPicPr>
+          <p:nvPr/>
+        </p:nvPicPr>
+        <p:blipFill>
+          <a:blip r:embed="rId4"/>
+          <a:stretch>
+            <a:fillRect/>
+          </a:stretch>
+        </p:blipFill>
+        <p:spPr>
+          <a:xfrm>
+            <a:off x="7977674" y="3110272"/>
+            <a:ext cx="4047461" cy="3548216"/>
+          </a:xfrm>
+          <a:prstGeom prst="rect">
+            <a:avLst/>
+          </a:prstGeom>
+        </p:spPr>
+      </p:pic>
+      <p:sp>
+        <p:nvSpPr>
+          <p:cNvPr id="15" name="CaixaDeTexto 14">
+            <a:extLst>
+              <a:ext uri="{FF2B5EF4-FFF2-40B4-BE49-F238E27FC236}">
+                <a16:creationId xmlns:a16="http://schemas.microsoft.com/office/drawing/2014/main" id="{9E0E3EA9-383E-49FA-8A4B-AA18433E4160}"/>
+              </a:ext>
+            </a:extLst>
+          </p:cNvPr>
+          <p:cNvSpPr txBox="1"/>
+          <p:nvPr/>
+        </p:nvSpPr>
+        <p:spPr>
+          <a:xfrm>
+            <a:off x="166865" y="6289156"/>
+            <a:ext cx="2212441" cy="369332"/>
           </a:xfrm>
           <a:prstGeom prst="rect">
             <a:avLst/>
           </a:prstGeom>
           <a:noFill/>
-          <a:ln>
-            <a:noFill/>
-          </a:ln>
         </p:spPr>
-      </p:pic>
-      <p:pic>
-        <p:nvPicPr>
-          <p:cNvPr id="6" name="Imagem 5">
-            <a:extLst>
-              <a:ext uri="{FF2B5EF4-FFF2-40B4-BE49-F238E27FC236}">
-                <a16:creationId xmlns:a16="http://schemas.microsoft.com/office/drawing/2014/main" id="{7CEC0A35-1AAC-46B5-8F1E-3BF3BDA89204}"/>
-              </a:ext>
-            </a:extLst>
-          </p:cNvPr>
-          <p:cNvPicPr/>
-          <p:nvPr/>
-        </p:nvPicPr>
-        <p:blipFill>
-          <a:blip r:embed="rId3">
-            <a:extLst>
-              <a:ext uri="{28A0092B-C50C-407E-A947-70E740481C1C}">
-                <a14:useLocalDpi xmlns:a14="http://schemas.microsoft.com/office/drawing/2010/main" val="0"/>
-              </a:ext>
-            </a:extLst>
-          </a:blip>
-          <a:srcRect/>
-          <a:stretch>
-            <a:fillRect/>
-          </a:stretch>
-        </p:blipFill>
-        <p:spPr bwMode="auto">
-          <a:xfrm>
-            <a:off x="3954935" y="1380347"/>
-            <a:ext cx="3440495" cy="2343150"/>
-          </a:xfrm>
-          <a:prstGeom prst="rect">
-            <a:avLst/>
-          </a:prstGeom>
-          <a:noFill/>
-          <a:ln>
-            <a:noFill/>
-          </a:ln>
-        </p:spPr>
-      </p:pic>
-      <p:pic>
-        <p:nvPicPr>
-          <p:cNvPr id="7" name="Imagem 6">
-            <a:extLst>
-              <a:ext uri="{FF2B5EF4-FFF2-40B4-BE49-F238E27FC236}">
-                <a16:creationId xmlns:a16="http://schemas.microsoft.com/office/drawing/2014/main" id="{FFE61159-FC01-417E-9947-B7DCECA452E9}"/>
-              </a:ext>
-            </a:extLst>
-          </p:cNvPr>
-          <p:cNvPicPr/>
-          <p:nvPr/>
-        </p:nvPicPr>
-        <p:blipFill>
-          <a:blip r:embed="rId4">
-            <a:extLst>
-              <a:ext uri="{28A0092B-C50C-407E-A947-70E740481C1C}">
-                <a14:useLocalDpi xmlns:a14="http://schemas.microsoft.com/office/drawing/2010/main" val="0"/>
-              </a:ext>
-            </a:extLst>
-          </a:blip>
-          <a:srcRect/>
-          <a:stretch>
-            <a:fillRect/>
-          </a:stretch>
-        </p:blipFill>
-        <p:spPr bwMode="auto">
-          <a:xfrm>
-            <a:off x="7929296" y="1306420"/>
-            <a:ext cx="3704590" cy="2512060"/>
-          </a:xfrm>
-          <a:prstGeom prst="rect">
-            <a:avLst/>
-          </a:prstGeom>
-          <a:noFill/>
-          <a:ln>
-            <a:noFill/>
-          </a:ln>
-        </p:spPr>
-      </p:pic>
-      <p:pic>
-        <p:nvPicPr>
-          <p:cNvPr id="8" name="Imagem 7">
-            <a:extLst>
-              <a:ext uri="{FF2B5EF4-FFF2-40B4-BE49-F238E27FC236}">
-                <a16:creationId xmlns:a16="http://schemas.microsoft.com/office/drawing/2014/main" id="{AE23833B-6330-4441-A999-95A7945F3E49}"/>
-              </a:ext>
-            </a:extLst>
-          </p:cNvPr>
-          <p:cNvPicPr/>
-          <p:nvPr/>
-        </p:nvPicPr>
-        <p:blipFill>
-          <a:blip r:embed="rId5">
-            <a:extLst>
-              <a:ext uri="{28A0092B-C50C-407E-A947-70E740481C1C}">
-                <a14:useLocalDpi xmlns:a14="http://schemas.microsoft.com/office/drawing/2010/main" val="0"/>
-              </a:ext>
-            </a:extLst>
-          </a:blip>
-          <a:srcRect/>
-          <a:stretch>
-            <a:fillRect/>
-          </a:stretch>
-        </p:blipFill>
-        <p:spPr bwMode="auto">
-          <a:xfrm>
-            <a:off x="767345" y="3862738"/>
-            <a:ext cx="3327549" cy="2795750"/>
-          </a:xfrm>
-          <a:prstGeom prst="rect">
-            <a:avLst/>
-          </a:prstGeom>
-          <a:noFill/>
-          <a:ln>
-            <a:noFill/>
-          </a:ln>
-        </p:spPr>
-      </p:pic>
+        <p:txBody>
+          <a:bodyPr wrap="square">
+            <a:spAutoFit/>
+          </a:bodyPr>
+          <a:lstStyle/>
+          <a:p>
+            <a:pPr algn="ctr"/>
+            <a:r>
+              <a:rPr lang="pt-BR" sz="1800" dirty="0">
+                <a:solidFill>
+                  <a:srgbClr val="DBA1A1"/>
+                </a:solidFill>
+                <a:effectLst/>
+                <a:latin typeface="Agency FB" panose="020B0503020202020204" pitchFamily="34" charset="0"/>
+              </a:rPr>
+              <a:t>Mais detalhes a seguir...</a:t>
+            </a:r>
+          </a:p>
+        </p:txBody>
+      </p:sp>
     </p:spTree>
     <p:extLst>
       <p:ext uri="{BB962C8B-B14F-4D97-AF65-F5344CB8AC3E}">
-        <p14:creationId xmlns:p14="http://schemas.microsoft.com/office/powerpoint/2010/main" val="221351180"/>
+        <p14:creationId xmlns:p14="http://schemas.microsoft.com/office/powerpoint/2010/main" val="2749028880"/>
       </p:ext>
     </p:extLst>
   </p:cSld>
@@ -4731,277 +4316,6 @@
           <p:cNvPr id="2" name="Retângulo 1">
             <a:extLst>
               <a:ext uri="{FF2B5EF4-FFF2-40B4-BE49-F238E27FC236}">
-                <a16:creationId xmlns:a16="http://schemas.microsoft.com/office/drawing/2014/main" id="{8C911EF0-0065-4173-87F6-89015AA6DCA1}"/>
-              </a:ext>
-            </a:extLst>
-          </p:cNvPr>
-          <p:cNvSpPr/>
-          <p:nvPr/>
-        </p:nvSpPr>
-        <p:spPr>
-          <a:xfrm rot="5400000">
-            <a:off x="5542547" y="-5607860"/>
-            <a:ext cx="1106907" cy="12192000"/>
-          </a:xfrm>
-          <a:prstGeom prst="rect">
-            <a:avLst/>
-          </a:prstGeom>
-          <a:solidFill>
-            <a:srgbClr val="DBA1A1"/>
-          </a:solidFill>
-          <a:ln>
-            <a:noFill/>
-          </a:ln>
-        </p:spPr>
-        <p:style>
-          <a:lnRef idx="2">
-            <a:schemeClr val="accent1">
-              <a:shade val="50000"/>
-            </a:schemeClr>
-          </a:lnRef>
-          <a:fillRef idx="1">
-            <a:schemeClr val="accent1"/>
-          </a:fillRef>
-          <a:effectRef idx="0">
-            <a:schemeClr val="accent1"/>
-          </a:effectRef>
-          <a:fontRef idx="minor">
-            <a:schemeClr val="lt1"/>
-          </a:fontRef>
-        </p:style>
-        <p:txBody>
-          <a:bodyPr rtlCol="0" anchor="ctr"/>
-          <a:lstStyle/>
-          <a:p>
-            <a:pPr algn="ctr"/>
-            <a:endParaRPr lang="pt-BR" dirty="0">
-              <a:ln>
-                <a:solidFill>
-                  <a:srgbClr val="DBA1A1"/>
-                </a:solidFill>
-              </a:ln>
-              <a:solidFill>
-                <a:srgbClr val="DBA1A1"/>
-              </a:solidFill>
-            </a:endParaRPr>
-          </a:p>
-        </p:txBody>
-      </p:sp>
-      <p:sp>
-        <p:nvSpPr>
-          <p:cNvPr id="3" name="CaixaDeTexto 2">
-            <a:extLst>
-              <a:ext uri="{FF2B5EF4-FFF2-40B4-BE49-F238E27FC236}">
-                <a16:creationId xmlns:a16="http://schemas.microsoft.com/office/drawing/2014/main" id="{EA906822-E252-4415-BE2C-766952557E58}"/>
-              </a:ext>
-            </a:extLst>
-          </p:cNvPr>
-          <p:cNvSpPr txBox="1"/>
-          <p:nvPr/>
-        </p:nvSpPr>
-        <p:spPr>
-          <a:xfrm>
-            <a:off x="3692483" y="199512"/>
-            <a:ext cx="5274019" cy="707886"/>
-          </a:xfrm>
-          <a:prstGeom prst="rect">
-            <a:avLst/>
-          </a:prstGeom>
-          <a:noFill/>
-        </p:spPr>
-        <p:txBody>
-          <a:bodyPr wrap="square" rtlCol="0">
-            <a:spAutoFit/>
-          </a:bodyPr>
-          <a:lstStyle/>
-          <a:p>
-            <a:pPr algn="ctr"/>
-            <a:r>
-              <a:rPr lang="pt-BR" sz="4000" dirty="0">
-                <a:solidFill>
-                  <a:srgbClr val="5B616F"/>
-                </a:solidFill>
-                <a:latin typeface="Agency FB" panose="020B0503020202020204" pitchFamily="34" charset="0"/>
-              </a:rPr>
-              <a:t>Versão Final</a:t>
-            </a:r>
-          </a:p>
-        </p:txBody>
-      </p:sp>
-      <p:pic>
-        <p:nvPicPr>
-          <p:cNvPr id="9" name="Imagem 8">
-            <a:extLst>
-              <a:ext uri="{FF2B5EF4-FFF2-40B4-BE49-F238E27FC236}">
-                <a16:creationId xmlns:a16="http://schemas.microsoft.com/office/drawing/2014/main" id="{EC67E932-6630-42C1-8CD9-3498DE5DDF86}"/>
-              </a:ext>
-            </a:extLst>
-          </p:cNvPr>
-          <p:cNvPicPr>
-            <a:picLocks noChangeAspect="1"/>
-          </p:cNvPicPr>
-          <p:nvPr/>
-        </p:nvPicPr>
-        <p:blipFill>
-          <a:blip r:embed="rId2"/>
-          <a:stretch>
-            <a:fillRect/>
-          </a:stretch>
-        </p:blipFill>
-        <p:spPr>
-          <a:xfrm>
-            <a:off x="269502" y="1162895"/>
-            <a:ext cx="3098849" cy="2608154"/>
-          </a:xfrm>
-          <a:prstGeom prst="rect">
-            <a:avLst/>
-          </a:prstGeom>
-        </p:spPr>
-      </p:pic>
-      <p:pic>
-        <p:nvPicPr>
-          <p:cNvPr id="11" name="Imagem 10">
-            <a:extLst>
-              <a:ext uri="{FF2B5EF4-FFF2-40B4-BE49-F238E27FC236}">
-                <a16:creationId xmlns:a16="http://schemas.microsoft.com/office/drawing/2014/main" id="{9BEAA337-BD5F-4769-B6D8-E90E99E5A574}"/>
-              </a:ext>
-            </a:extLst>
-          </p:cNvPr>
-          <p:cNvPicPr>
-            <a:picLocks noChangeAspect="1"/>
-          </p:cNvPicPr>
-          <p:nvPr/>
-        </p:nvPicPr>
-        <p:blipFill rotWithShape="1">
-          <a:blip r:embed="rId3"/>
-          <a:srcRect l="1681" t="2761" r="1654" b="-39"/>
-          <a:stretch/>
-        </p:blipFill>
-        <p:spPr>
-          <a:xfrm>
-            <a:off x="3900196" y="2157155"/>
-            <a:ext cx="3816221" cy="2543689"/>
-          </a:xfrm>
-          <a:prstGeom prst="rect">
-            <a:avLst/>
-          </a:prstGeom>
-        </p:spPr>
-      </p:pic>
-      <p:pic>
-        <p:nvPicPr>
-          <p:cNvPr id="13" name="Imagem 12">
-            <a:extLst>
-              <a:ext uri="{FF2B5EF4-FFF2-40B4-BE49-F238E27FC236}">
-                <a16:creationId xmlns:a16="http://schemas.microsoft.com/office/drawing/2014/main" id="{18D6C8A8-EDFB-4C3E-B7E5-AD061E98047D}"/>
-              </a:ext>
-            </a:extLst>
-          </p:cNvPr>
-          <p:cNvPicPr>
-            <a:picLocks noChangeAspect="1"/>
-          </p:cNvPicPr>
-          <p:nvPr/>
-        </p:nvPicPr>
-        <p:blipFill>
-          <a:blip r:embed="rId4"/>
-          <a:stretch>
-            <a:fillRect/>
-          </a:stretch>
-        </p:blipFill>
-        <p:spPr>
-          <a:xfrm>
-            <a:off x="7977674" y="3110272"/>
-            <a:ext cx="4047461" cy="3548216"/>
-          </a:xfrm>
-          <a:prstGeom prst="rect">
-            <a:avLst/>
-          </a:prstGeom>
-        </p:spPr>
-      </p:pic>
-      <p:sp>
-        <p:nvSpPr>
-          <p:cNvPr id="15" name="CaixaDeTexto 14">
-            <a:extLst>
-              <a:ext uri="{FF2B5EF4-FFF2-40B4-BE49-F238E27FC236}">
-                <a16:creationId xmlns:a16="http://schemas.microsoft.com/office/drawing/2014/main" id="{9E0E3EA9-383E-49FA-8A4B-AA18433E4160}"/>
-              </a:ext>
-            </a:extLst>
-          </p:cNvPr>
-          <p:cNvSpPr txBox="1"/>
-          <p:nvPr/>
-        </p:nvSpPr>
-        <p:spPr>
-          <a:xfrm>
-            <a:off x="166865" y="6289156"/>
-            <a:ext cx="2212441" cy="369332"/>
-          </a:xfrm>
-          <a:prstGeom prst="rect">
-            <a:avLst/>
-          </a:prstGeom>
-          <a:noFill/>
-        </p:spPr>
-        <p:txBody>
-          <a:bodyPr wrap="square">
-            <a:spAutoFit/>
-          </a:bodyPr>
-          <a:lstStyle/>
-          <a:p>
-            <a:pPr algn="ctr"/>
-            <a:r>
-              <a:rPr lang="pt-BR" sz="1800" dirty="0">
-                <a:solidFill>
-                  <a:srgbClr val="DBA1A1"/>
-                </a:solidFill>
-                <a:effectLst/>
-                <a:latin typeface="Agency FB" panose="020B0503020202020204" pitchFamily="34" charset="0"/>
-              </a:rPr>
-              <a:t>Mais detalhes a seguir...</a:t>
-            </a:r>
-          </a:p>
-        </p:txBody>
-      </p:sp>
-    </p:spTree>
-    <p:extLst>
-      <p:ext uri="{BB962C8B-B14F-4D97-AF65-F5344CB8AC3E}">
-        <p14:creationId xmlns:p14="http://schemas.microsoft.com/office/powerpoint/2010/main" val="2749028880"/>
-      </p:ext>
-    </p:extLst>
-  </p:cSld>
-  <p:clrMapOvr>
-    <a:masterClrMapping/>
-  </p:clrMapOvr>
-</p:sld>
-</file>
-
-<file path=ppt/slides/slide14.xml><?xml version="1.0" encoding="utf-8"?>
-<p:sld xmlns:a="http://schemas.openxmlformats.org/drawingml/2006/main" xmlns:r="http://schemas.openxmlformats.org/officeDocument/2006/relationships" xmlns:p="http://schemas.openxmlformats.org/presentationml/2006/main">
-  <p:cSld>
-    <p:bg>
-      <p:bgPr>
-        <a:solidFill>
-          <a:srgbClr val="5B616F"/>
-        </a:solidFill>
-        <a:effectLst/>
-      </p:bgPr>
-    </p:bg>
-    <p:spTree>
-      <p:nvGrpSpPr>
-        <p:cNvPr id="1" name=""/>
-        <p:cNvGrpSpPr/>
-        <p:nvPr/>
-      </p:nvGrpSpPr>
-      <p:grpSpPr>
-        <a:xfrm>
-          <a:off x="0" y="0"/>
-          <a:ext cx="0" cy="0"/>
-          <a:chOff x="0" y="0"/>
-          <a:chExt cx="0" cy="0"/>
-        </a:xfrm>
-      </p:grpSpPr>
-      <p:sp>
-        <p:nvSpPr>
-          <p:cNvPr id="2" name="Retângulo 1">
-            <a:extLst>
-              <a:ext uri="{FF2B5EF4-FFF2-40B4-BE49-F238E27FC236}">
                 <a16:creationId xmlns:a16="http://schemas.microsoft.com/office/drawing/2014/main" id="{2D5E4F3C-F307-4E72-AABB-63174CA4F729}"/>
               </a:ext>
             </a:extLst>
@@ -5051,7 +4365,7 @@
 </p:sld>
 </file>
 
-<file path=ppt/slides/slide15.xml><?xml version="1.0" encoding="utf-8"?>
+<file path=ppt/slides/slide14.xml><?xml version="1.0" encoding="utf-8"?>
 <p:sld xmlns:a="http://schemas.openxmlformats.org/drawingml/2006/main" xmlns:r="http://schemas.openxmlformats.org/officeDocument/2006/relationships" xmlns:p="http://schemas.openxmlformats.org/presentationml/2006/main">
   <p:cSld>
     <p:bg>
@@ -7323,7 +6637,7 @@
                 </a:solidFill>
                 <a:latin typeface="Agency FB" panose="020B0503020202020204" pitchFamily="34" charset="0"/>
               </a:rPr>
-              <a:t>Requisitos Funcionais e Não Funcionais</a:t>
+              <a:t>Requisitos Funcionais</a:t>
             </a:r>
           </a:p>
         </p:txBody>
@@ -7343,14 +6657,14 @@
           <p:nvPr>
             <p:extLst>
               <p:ext uri="{D42A27DB-BD31-4B8C-83A1-F6EECF244321}">
-                <p14:modId xmlns:p14="http://schemas.microsoft.com/office/powerpoint/2010/main" val="1318440127"/>
+                <p14:modId xmlns:p14="http://schemas.microsoft.com/office/powerpoint/2010/main" val="1007113098"/>
               </p:ext>
             </p:extLst>
           </p:nvPr>
         </p:nvGraphicFramePr>
         <p:xfrm>
-          <a:off x="837206" y="1258448"/>
-          <a:ext cx="10853490" cy="5400040"/>
+          <a:off x="394282" y="1771788"/>
+          <a:ext cx="11274804" cy="4231242"/>
         </p:xfrm>
         <a:graphic>
           <a:graphicData uri="http://schemas.openxmlformats.org/drawingml/2006/table">
@@ -7359,93 +6673,44 @@
                 <a:tableStyleId>{5C22544A-7EE6-4342-B048-85BDC9FD1C3A}</a:tableStyleId>
               </a:tblPr>
               <a:tblGrid>
-                <a:gridCol w="5426745">
+                <a:gridCol w="11274804">
                   <a:extLst>
                     <a:ext uri="{9D8B030D-6E8A-4147-A177-3AD203B41FA5}">
                       <a16:colId xmlns:a16="http://schemas.microsoft.com/office/drawing/2014/main" val="2504239251"/>
                     </a:ext>
                   </a:extLst>
                 </a:gridCol>
-                <a:gridCol w="5426745">
-                  <a:extLst>
-                    <a:ext uri="{9D8B030D-6E8A-4147-A177-3AD203B41FA5}">
-                      <a16:colId xmlns:a16="http://schemas.microsoft.com/office/drawing/2014/main" val="354975263"/>
-                    </a:ext>
-                  </a:extLst>
-                </a:gridCol>
               </a:tblGrid>
-              <a:tr h="370840">
+              <a:tr h="375793">
                 <a:tc>
                   <a:txBody>
                     <a:bodyPr/>
                     <a:lstStyle/>
                     <a:p>
+                      <a:pPr algn="just"/>
                       <a:r>
-                        <a:rPr lang="pt-BR" dirty="0">
+                        <a:rPr lang="pt-BR" sz="1800" b="1" kern="1200" dirty="0">
+                          <a:solidFill>
+                            <a:srgbClr val="9BD4BA"/>
+                          </a:solidFill>
+                          <a:effectLst/>
+                          <a:latin typeface="Agency FB" panose="020B0503020202020204" pitchFamily="34" charset="0"/>
+                          <a:ea typeface="+mn-ea"/>
+                          <a:cs typeface="+mn-cs"/>
+                        </a:rPr>
+                        <a:t>RF001 Prescrever Dietas -  </a:t>
+                      </a:r>
+                      <a:r>
+                        <a:rPr lang="pt-BR" sz="1800" b="0" kern="1200" dirty="0">
                           <a:solidFill>
                             <a:srgbClr val="DBA1A1"/>
                           </a:solidFill>
+                          <a:effectLst/>
                           <a:latin typeface="Agency FB" panose="020B0503020202020204" pitchFamily="34" charset="0"/>
+                          <a:ea typeface="+mn-ea"/>
+                          <a:cs typeface="+mn-cs"/>
                         </a:rPr>
-                        <a:t>Funcional</a:t>
-                      </a:r>
-                    </a:p>
-                  </a:txBody>
-                  <a:tcPr>
-                    <a:lnL w="12700" cap="flat" cmpd="sng" algn="ctr">
-                      <a:noFill/>
-                      <a:prstDash val="solid"/>
-                      <a:round/>
-                      <a:headEnd type="none" w="med" len="med"/>
-                      <a:tailEnd type="none" w="med" len="med"/>
-                    </a:lnL>
-                    <a:lnR w="12700" cap="flat" cmpd="sng" algn="ctr">
-                      <a:noFill/>
-                      <a:prstDash val="solid"/>
-                      <a:round/>
-                      <a:headEnd type="none" w="med" len="med"/>
-                      <a:tailEnd type="none" w="med" len="med"/>
-                    </a:lnR>
-                    <a:lnT w="12700" cap="flat" cmpd="sng" algn="ctr">
-                      <a:noFill/>
-                      <a:prstDash val="solid"/>
-                      <a:round/>
-                      <a:headEnd type="none" w="med" len="med"/>
-                      <a:tailEnd type="none" w="med" len="med"/>
-                    </a:lnT>
-                    <a:lnB w="12700" cap="flat" cmpd="sng" algn="ctr">
-                      <a:noFill/>
-                      <a:prstDash val="solid"/>
-                      <a:round/>
-                      <a:headEnd type="none" w="med" len="med"/>
-                      <a:tailEnd type="none" w="med" len="med"/>
-                    </a:lnB>
-                    <a:lnTlToBr w="12700" cmpd="sng">
-                      <a:noFill/>
-                      <a:prstDash val="solid"/>
-                    </a:lnTlToBr>
-                    <a:lnBlToTr w="12700" cmpd="sng">
-                      <a:noFill/>
-                      <a:prstDash val="solid"/>
-                    </a:lnBlToTr>
-                    <a:solidFill>
-                      <a:srgbClr val="5B616F"/>
-                    </a:solidFill>
-                  </a:tcPr>
-                </a:tc>
-                <a:tc>
-                  <a:txBody>
-                    <a:bodyPr/>
-                    <a:lstStyle/>
-                    <a:p>
-                      <a:r>
-                        <a:rPr lang="pt-BR" dirty="0">
-                          <a:solidFill>
-                            <a:srgbClr val="DBA1A1"/>
-                          </a:solidFill>
-                          <a:latin typeface="Agency FB" panose="020B0503020202020204" pitchFamily="34" charset="0"/>
-                        </a:rPr>
-                        <a:t>Não Funcional</a:t>
+                        <a:t>O perfil Nutricionista deve conseguir prescrever dietas para os pacientes.</a:t>
                       </a:r>
                     </a:p>
                   </a:txBody>
@@ -7493,19 +6758,31 @@
                 </a:tc>
                 <a:extLst>
                   <a:ext uri="{0D108BD9-81ED-4DB2-BD59-A6C34878D82A}">
-                    <a16:rowId xmlns:a16="http://schemas.microsoft.com/office/drawing/2014/main" val="2395872218"/>
+                    <a16:rowId xmlns:a16="http://schemas.microsoft.com/office/drawing/2014/main" val="3034851657"/>
                   </a:ext>
                 </a:extLst>
               </a:tr>
-              <a:tr h="370840">
-                <a:tc rowSpan="4">
+              <a:tr h="293615">
+                <a:tc>
                   <a:txBody>
                     <a:bodyPr/>
                     <a:lstStyle/>
                     <a:p>
-                      <a:pPr algn="l"/>
+                      <a:pPr algn="just"/>
                       <a:r>
-                        <a:rPr lang="pt-BR" sz="1800" kern="1200" dirty="0">
+                        <a:rPr lang="pt-BR" sz="1800" b="1" kern="1200" dirty="0">
+                          <a:solidFill>
+                            <a:srgbClr val="9BD4BA"/>
+                          </a:solidFill>
+                          <a:effectLst/>
+                          <a:latin typeface="Agency FB" panose="020B0503020202020204" pitchFamily="34" charset="0"/>
+                          <a:ea typeface="+mn-ea"/>
+                          <a:cs typeface="+mn-cs"/>
+                        </a:rPr>
+                        <a:t>RF002 Cadastrar Porções de alimento -  </a:t>
+                      </a:r>
+                      <a:r>
+                        <a:rPr lang="pt-BR" sz="1800" b="0" kern="1200" dirty="0">
                           <a:solidFill>
                             <a:srgbClr val="DBA1A1"/>
                           </a:solidFill>
@@ -7514,14 +6791,8 @@
                           <a:ea typeface="+mn-ea"/>
                           <a:cs typeface="+mn-cs"/>
                         </a:rPr>
-                        <a:t>Cadastrar -  O usuário deve ser capaz de inserir novas informações no bando de dados.</a:t>
+                        <a:t>O perfil Nutricionista deve conseguir cadastrar porção de alimento</a:t>
                       </a:r>
-                      <a:endParaRPr lang="pt-BR" dirty="0">
-                        <a:solidFill>
-                          <a:srgbClr val="DBA1A1"/>
-                        </a:solidFill>
-                        <a:latin typeface="Agency FB" panose="020B0503020202020204" pitchFamily="34" charset="0"/>
-                      </a:endParaRPr>
                     </a:p>
                   </a:txBody>
                   <a:tcPr>
@@ -7566,12 +6837,586 @@
                     </a:solidFill>
                   </a:tcPr>
                 </a:tc>
+                <a:extLst>
+                  <a:ext uri="{0D108BD9-81ED-4DB2-BD59-A6C34878D82A}">
+                    <a16:rowId xmlns:a16="http://schemas.microsoft.com/office/drawing/2014/main" val="205031358"/>
+                  </a:ext>
+                </a:extLst>
+              </a:tr>
+              <a:tr h="407087">
                 <a:tc>
                   <a:txBody>
                     <a:bodyPr/>
                     <a:lstStyle/>
                     <a:p>
-                      <a:pPr marL="0" marR="0" lvl="0" indent="0" algn="l" defTabSz="914400" rtl="0" eaLnBrk="1" fontAlgn="auto" latinLnBrk="0" hangingPunct="1">
+                      <a:pPr algn="just"/>
+                      <a:r>
+                        <a:rPr lang="pt-BR" sz="1800" b="1" kern="1200" dirty="0">
+                          <a:solidFill>
+                            <a:srgbClr val="9BD4BA"/>
+                          </a:solidFill>
+                          <a:effectLst/>
+                          <a:latin typeface="Agency FB" panose="020B0503020202020204" pitchFamily="34" charset="0"/>
+                          <a:ea typeface="+mn-ea"/>
+                          <a:cs typeface="+mn-cs"/>
+                        </a:rPr>
+                        <a:t>RF003 Cadastrar Dietas -  </a:t>
+                      </a:r>
+                      <a:r>
+                        <a:rPr lang="pt-BR" sz="1800" b="0" kern="1200" dirty="0">
+                          <a:solidFill>
+                            <a:srgbClr val="DBA1A1"/>
+                          </a:solidFill>
+                          <a:effectLst/>
+                          <a:latin typeface="Agency FB" panose="020B0503020202020204" pitchFamily="34" charset="0"/>
+                          <a:ea typeface="+mn-ea"/>
+                          <a:cs typeface="+mn-cs"/>
+                        </a:rPr>
+                        <a:t>O perfil Nutricionista deve conseguir cadastrar dietas.</a:t>
+                      </a:r>
+                    </a:p>
+                  </a:txBody>
+                  <a:tcPr>
+                    <a:lnL w="12700" cap="flat" cmpd="sng" algn="ctr">
+                      <a:noFill/>
+                      <a:prstDash val="solid"/>
+                      <a:round/>
+                      <a:headEnd type="none" w="med" len="med"/>
+                      <a:tailEnd type="none" w="med" len="med"/>
+                    </a:lnL>
+                    <a:lnR w="12700" cap="flat" cmpd="sng" algn="ctr">
+                      <a:noFill/>
+                      <a:prstDash val="solid"/>
+                      <a:round/>
+                      <a:headEnd type="none" w="med" len="med"/>
+                      <a:tailEnd type="none" w="med" len="med"/>
+                    </a:lnR>
+                    <a:lnT w="12700" cap="flat" cmpd="sng" algn="ctr">
+                      <a:noFill/>
+                      <a:prstDash val="solid"/>
+                      <a:round/>
+                      <a:headEnd type="none" w="med" len="med"/>
+                      <a:tailEnd type="none" w="med" len="med"/>
+                    </a:lnT>
+                    <a:lnB w="12700" cap="flat" cmpd="sng" algn="ctr">
+                      <a:noFill/>
+                      <a:prstDash val="solid"/>
+                      <a:round/>
+                      <a:headEnd type="none" w="med" len="med"/>
+                      <a:tailEnd type="none" w="med" len="med"/>
+                    </a:lnB>
+                    <a:lnTlToBr w="12700" cmpd="sng">
+                      <a:noFill/>
+                      <a:prstDash val="solid"/>
+                    </a:lnTlToBr>
+                    <a:lnBlToTr w="12700" cmpd="sng">
+                      <a:noFill/>
+                      <a:prstDash val="solid"/>
+                    </a:lnBlToTr>
+                    <a:solidFill>
+                      <a:srgbClr val="5B616F"/>
+                    </a:solidFill>
+                  </a:tcPr>
+                </a:tc>
+                <a:extLst>
+                  <a:ext uri="{0D108BD9-81ED-4DB2-BD59-A6C34878D82A}">
+                    <a16:rowId xmlns:a16="http://schemas.microsoft.com/office/drawing/2014/main" val="884950376"/>
+                  </a:ext>
+                </a:extLst>
+              </a:tr>
+              <a:tr h="407087">
+                <a:tc>
+                  <a:txBody>
+                    <a:bodyPr/>
+                    <a:lstStyle/>
+                    <a:p>
+                      <a:pPr algn="just"/>
+                      <a:r>
+                        <a:rPr lang="pt-BR" sz="1800" b="1" kern="1200" dirty="0">
+                          <a:solidFill>
+                            <a:srgbClr val="9BD4BA"/>
+                          </a:solidFill>
+                          <a:effectLst/>
+                          <a:latin typeface="Agency FB" panose="020B0503020202020204" pitchFamily="34" charset="0"/>
+                          <a:ea typeface="+mn-ea"/>
+                          <a:cs typeface="+mn-cs"/>
+                        </a:rPr>
+                        <a:t>RF004 Cadastrar Pacientes -  </a:t>
+                      </a:r>
+                      <a:r>
+                        <a:rPr lang="pt-BR" sz="1800" b="0" kern="1200" dirty="0">
+                          <a:solidFill>
+                            <a:srgbClr val="DBA1A1"/>
+                          </a:solidFill>
+                          <a:effectLst/>
+                          <a:latin typeface="Agency FB" panose="020B0503020202020204" pitchFamily="34" charset="0"/>
+                          <a:ea typeface="+mn-ea"/>
+                          <a:cs typeface="+mn-cs"/>
+                        </a:rPr>
+                        <a:t>O perfil Nutricionista deve conseguir cadastrar pacientes.</a:t>
+                      </a:r>
+                    </a:p>
+                  </a:txBody>
+                  <a:tcPr>
+                    <a:lnL w="12700" cap="flat" cmpd="sng" algn="ctr">
+                      <a:noFill/>
+                      <a:prstDash val="solid"/>
+                      <a:round/>
+                      <a:headEnd type="none" w="med" len="med"/>
+                      <a:tailEnd type="none" w="med" len="med"/>
+                    </a:lnL>
+                    <a:lnR w="12700" cap="flat" cmpd="sng" algn="ctr">
+                      <a:noFill/>
+                      <a:prstDash val="solid"/>
+                      <a:round/>
+                      <a:headEnd type="none" w="med" len="med"/>
+                      <a:tailEnd type="none" w="med" len="med"/>
+                    </a:lnR>
+                    <a:lnT w="12700" cap="flat" cmpd="sng" algn="ctr">
+                      <a:noFill/>
+                      <a:prstDash val="solid"/>
+                      <a:round/>
+                      <a:headEnd type="none" w="med" len="med"/>
+                      <a:tailEnd type="none" w="med" len="med"/>
+                    </a:lnT>
+                    <a:lnB w="12700" cap="flat" cmpd="sng" algn="ctr">
+                      <a:noFill/>
+                      <a:prstDash val="solid"/>
+                      <a:round/>
+                      <a:headEnd type="none" w="med" len="med"/>
+                      <a:tailEnd type="none" w="med" len="med"/>
+                    </a:lnB>
+                    <a:lnTlToBr w="12700" cmpd="sng">
+                      <a:noFill/>
+                      <a:prstDash val="solid"/>
+                    </a:lnTlToBr>
+                    <a:lnBlToTr w="12700" cmpd="sng">
+                      <a:noFill/>
+                      <a:prstDash val="solid"/>
+                    </a:lnBlToTr>
+                    <a:solidFill>
+                      <a:srgbClr val="5B616F"/>
+                    </a:solidFill>
+                  </a:tcPr>
+                </a:tc>
+                <a:extLst>
+                  <a:ext uri="{0D108BD9-81ED-4DB2-BD59-A6C34878D82A}">
+                    <a16:rowId xmlns:a16="http://schemas.microsoft.com/office/drawing/2014/main" val="3317817360"/>
+                  </a:ext>
+                </a:extLst>
+              </a:tr>
+              <a:tr h="407087">
+                <a:tc>
+                  <a:txBody>
+                    <a:bodyPr/>
+                    <a:lstStyle/>
+                    <a:p>
+                      <a:pPr algn="just"/>
+                      <a:r>
+                        <a:rPr lang="pt-BR" sz="1800" b="1" kern="1200" dirty="0">
+                          <a:solidFill>
+                            <a:srgbClr val="9BD4BA"/>
+                          </a:solidFill>
+                          <a:effectLst/>
+                          <a:latin typeface="Agency FB" panose="020B0503020202020204" pitchFamily="34" charset="0"/>
+                          <a:ea typeface="+mn-ea"/>
+                          <a:cs typeface="+mn-cs"/>
+                        </a:rPr>
+                        <a:t>RF005 Consultar Dashboard de relatórios -  </a:t>
+                      </a:r>
+                      <a:r>
+                        <a:rPr lang="pt-BR" sz="1800" b="0" kern="1200" dirty="0">
+                          <a:solidFill>
+                            <a:srgbClr val="DBA1A1"/>
+                          </a:solidFill>
+                          <a:effectLst/>
+                          <a:latin typeface="Agency FB" panose="020B0503020202020204" pitchFamily="34" charset="0"/>
+                          <a:ea typeface="+mn-ea"/>
+                          <a:cs typeface="+mn-cs"/>
+                        </a:rPr>
+                        <a:t>O perfil Nutricionista deve conseguir consultar relatórios do consumo diário de alimento.</a:t>
+                      </a:r>
+                    </a:p>
+                  </a:txBody>
+                  <a:tcPr>
+                    <a:lnL w="12700" cap="flat" cmpd="sng" algn="ctr">
+                      <a:noFill/>
+                      <a:prstDash val="solid"/>
+                      <a:round/>
+                      <a:headEnd type="none" w="med" len="med"/>
+                      <a:tailEnd type="none" w="med" len="med"/>
+                    </a:lnL>
+                    <a:lnR w="12700" cap="flat" cmpd="sng" algn="ctr">
+                      <a:noFill/>
+                      <a:prstDash val="solid"/>
+                      <a:round/>
+                      <a:headEnd type="none" w="med" len="med"/>
+                      <a:tailEnd type="none" w="med" len="med"/>
+                    </a:lnR>
+                    <a:lnT w="12700" cap="flat" cmpd="sng" algn="ctr">
+                      <a:noFill/>
+                      <a:prstDash val="solid"/>
+                      <a:round/>
+                      <a:headEnd type="none" w="med" len="med"/>
+                      <a:tailEnd type="none" w="med" len="med"/>
+                    </a:lnT>
+                    <a:lnB w="12700" cap="flat" cmpd="sng" algn="ctr">
+                      <a:noFill/>
+                      <a:prstDash val="solid"/>
+                      <a:round/>
+                      <a:headEnd type="none" w="med" len="med"/>
+                      <a:tailEnd type="none" w="med" len="med"/>
+                    </a:lnB>
+                    <a:lnTlToBr w="12700" cmpd="sng">
+                      <a:noFill/>
+                      <a:prstDash val="solid"/>
+                    </a:lnTlToBr>
+                    <a:lnBlToTr w="12700" cmpd="sng">
+                      <a:noFill/>
+                      <a:prstDash val="solid"/>
+                    </a:lnBlToTr>
+                    <a:solidFill>
+                      <a:srgbClr val="5B616F"/>
+                    </a:solidFill>
+                  </a:tcPr>
+                </a:tc>
+                <a:extLst>
+                  <a:ext uri="{0D108BD9-81ED-4DB2-BD59-A6C34878D82A}">
+                    <a16:rowId xmlns:a16="http://schemas.microsoft.com/office/drawing/2014/main" val="486538524"/>
+                  </a:ext>
+                </a:extLst>
+              </a:tr>
+              <a:tr h="407087">
+                <a:tc>
+                  <a:txBody>
+                    <a:bodyPr/>
+                    <a:lstStyle/>
+                    <a:p>
+                      <a:pPr algn="just"/>
+                      <a:r>
+                        <a:rPr lang="pt-BR" sz="1800" b="1" kern="1200" dirty="0">
+                          <a:solidFill>
+                            <a:srgbClr val="9BD4BA"/>
+                          </a:solidFill>
+                          <a:effectLst/>
+                          <a:latin typeface="Agency FB" panose="020B0503020202020204" pitchFamily="34" charset="0"/>
+                          <a:ea typeface="+mn-ea"/>
+                          <a:cs typeface="+mn-cs"/>
+                        </a:rPr>
+                        <a:t>RF006 Consultar Dietas prescritas -  </a:t>
+                      </a:r>
+                      <a:r>
+                        <a:rPr lang="pt-BR" sz="1800" b="0" kern="1200" dirty="0">
+                          <a:solidFill>
+                            <a:srgbClr val="DBA1A1"/>
+                          </a:solidFill>
+                          <a:effectLst/>
+                          <a:latin typeface="Agency FB" panose="020B0503020202020204" pitchFamily="34" charset="0"/>
+                          <a:ea typeface="+mn-ea"/>
+                          <a:cs typeface="+mn-cs"/>
+                        </a:rPr>
+                        <a:t>O perfil Paciente deve conseguir visualizar a dieta prescrita pelo nutricionista dele.</a:t>
+                      </a:r>
+                    </a:p>
+                  </a:txBody>
+                  <a:tcPr>
+                    <a:lnL w="12700" cap="flat" cmpd="sng" algn="ctr">
+                      <a:noFill/>
+                      <a:prstDash val="solid"/>
+                      <a:round/>
+                      <a:headEnd type="none" w="med" len="med"/>
+                      <a:tailEnd type="none" w="med" len="med"/>
+                    </a:lnL>
+                    <a:lnR w="12700" cap="flat" cmpd="sng" algn="ctr">
+                      <a:noFill/>
+                      <a:prstDash val="solid"/>
+                      <a:round/>
+                      <a:headEnd type="none" w="med" len="med"/>
+                      <a:tailEnd type="none" w="med" len="med"/>
+                    </a:lnR>
+                    <a:lnT w="12700" cap="flat" cmpd="sng" algn="ctr">
+                      <a:noFill/>
+                      <a:prstDash val="solid"/>
+                      <a:round/>
+                      <a:headEnd type="none" w="med" len="med"/>
+                      <a:tailEnd type="none" w="med" len="med"/>
+                    </a:lnT>
+                    <a:lnB w="12700" cap="flat" cmpd="sng" algn="ctr">
+                      <a:noFill/>
+                      <a:prstDash val="solid"/>
+                      <a:round/>
+                      <a:headEnd type="none" w="med" len="med"/>
+                      <a:tailEnd type="none" w="med" len="med"/>
+                    </a:lnB>
+                    <a:lnTlToBr w="12700" cmpd="sng">
+                      <a:noFill/>
+                      <a:prstDash val="solid"/>
+                    </a:lnTlToBr>
+                    <a:lnBlToTr w="12700" cmpd="sng">
+                      <a:noFill/>
+                      <a:prstDash val="solid"/>
+                    </a:lnBlToTr>
+                    <a:solidFill>
+                      <a:srgbClr val="5B616F"/>
+                    </a:solidFill>
+                  </a:tcPr>
+                </a:tc>
+                <a:extLst>
+                  <a:ext uri="{0D108BD9-81ED-4DB2-BD59-A6C34878D82A}">
+                    <a16:rowId xmlns:a16="http://schemas.microsoft.com/office/drawing/2014/main" val="3582787433"/>
+                  </a:ext>
+                </a:extLst>
+              </a:tr>
+              <a:tr h="407087">
+                <a:tc>
+                  <a:txBody>
+                    <a:bodyPr/>
+                    <a:lstStyle/>
+                    <a:p>
+                      <a:pPr algn="just"/>
+                      <a:r>
+                        <a:rPr lang="pt-BR" sz="1800" b="1" kern="1200" dirty="0">
+                          <a:solidFill>
+                            <a:srgbClr val="9BD4BA"/>
+                          </a:solidFill>
+                          <a:effectLst/>
+                          <a:latin typeface="Agency FB" panose="020B0503020202020204" pitchFamily="34" charset="0"/>
+                          <a:ea typeface="+mn-ea"/>
+                          <a:cs typeface="+mn-cs"/>
+                        </a:rPr>
+                        <a:t>RF007 Consultar Porções de alimentos -  </a:t>
+                      </a:r>
+                      <a:r>
+                        <a:rPr lang="pt-BR" sz="1800" b="0" kern="1200" dirty="0">
+                          <a:solidFill>
+                            <a:srgbClr val="DBA1A1"/>
+                          </a:solidFill>
+                          <a:effectLst/>
+                          <a:latin typeface="Agency FB" panose="020B0503020202020204" pitchFamily="34" charset="0"/>
+                          <a:ea typeface="+mn-ea"/>
+                          <a:cs typeface="+mn-cs"/>
+                        </a:rPr>
+                        <a:t>O perfil Paciente deve conseguir visualizar outras porções de alimentos cadastradas no sistema. </a:t>
+                      </a:r>
+                    </a:p>
+                  </a:txBody>
+                  <a:tcPr>
+                    <a:lnL w="12700" cap="flat" cmpd="sng" algn="ctr">
+                      <a:noFill/>
+                      <a:prstDash val="solid"/>
+                      <a:round/>
+                      <a:headEnd type="none" w="med" len="med"/>
+                      <a:tailEnd type="none" w="med" len="med"/>
+                    </a:lnL>
+                    <a:lnR w="12700" cap="flat" cmpd="sng" algn="ctr">
+                      <a:noFill/>
+                      <a:prstDash val="solid"/>
+                      <a:round/>
+                      <a:headEnd type="none" w="med" len="med"/>
+                      <a:tailEnd type="none" w="med" len="med"/>
+                    </a:lnR>
+                    <a:lnT w="12700" cap="flat" cmpd="sng" algn="ctr">
+                      <a:noFill/>
+                      <a:prstDash val="solid"/>
+                      <a:round/>
+                      <a:headEnd type="none" w="med" len="med"/>
+                      <a:tailEnd type="none" w="med" len="med"/>
+                    </a:lnT>
+                    <a:lnB w="12700" cap="flat" cmpd="sng" algn="ctr">
+                      <a:noFill/>
+                      <a:prstDash val="solid"/>
+                      <a:round/>
+                      <a:headEnd type="none" w="med" len="med"/>
+                      <a:tailEnd type="none" w="med" len="med"/>
+                    </a:lnB>
+                    <a:lnTlToBr w="12700" cmpd="sng">
+                      <a:noFill/>
+                      <a:prstDash val="solid"/>
+                    </a:lnTlToBr>
+                    <a:lnBlToTr w="12700" cmpd="sng">
+                      <a:noFill/>
+                      <a:prstDash val="solid"/>
+                    </a:lnBlToTr>
+                    <a:solidFill>
+                      <a:srgbClr val="5B616F"/>
+                    </a:solidFill>
+                  </a:tcPr>
+                </a:tc>
+                <a:extLst>
+                  <a:ext uri="{0D108BD9-81ED-4DB2-BD59-A6C34878D82A}">
+                    <a16:rowId xmlns:a16="http://schemas.microsoft.com/office/drawing/2014/main" val="2610096705"/>
+                  </a:ext>
+                </a:extLst>
+              </a:tr>
+              <a:tr h="407087">
+                <a:tc>
+                  <a:txBody>
+                    <a:bodyPr/>
+                    <a:lstStyle/>
+                    <a:p>
+                      <a:pPr algn="just"/>
+                      <a:r>
+                        <a:rPr lang="pt-BR" sz="1800" b="1" kern="1200" dirty="0">
+                          <a:solidFill>
+                            <a:srgbClr val="9BD4BA"/>
+                          </a:solidFill>
+                          <a:effectLst/>
+                          <a:latin typeface="Agency FB" panose="020B0503020202020204" pitchFamily="34" charset="0"/>
+                          <a:ea typeface="+mn-ea"/>
+                          <a:cs typeface="+mn-cs"/>
+                        </a:rPr>
+                        <a:t>RF008 Registar consumo diário de alimento -  </a:t>
+                      </a:r>
+                      <a:r>
+                        <a:rPr lang="pt-BR" sz="1800" b="0" kern="1200" dirty="0">
+                          <a:solidFill>
+                            <a:srgbClr val="DBA1A1"/>
+                          </a:solidFill>
+                          <a:effectLst/>
+                          <a:latin typeface="Agency FB" panose="020B0503020202020204" pitchFamily="34" charset="0"/>
+                          <a:ea typeface="+mn-ea"/>
+                          <a:cs typeface="+mn-cs"/>
+                        </a:rPr>
+                        <a:t>O perfil Paciente deve conseguir registrar o consumo diário de alimento.</a:t>
+                      </a:r>
+                    </a:p>
+                  </a:txBody>
+                  <a:tcPr>
+                    <a:lnL w="12700" cap="flat" cmpd="sng" algn="ctr">
+                      <a:noFill/>
+                      <a:prstDash val="solid"/>
+                      <a:round/>
+                      <a:headEnd type="none" w="med" len="med"/>
+                      <a:tailEnd type="none" w="med" len="med"/>
+                    </a:lnL>
+                    <a:lnR w="12700" cap="flat" cmpd="sng" algn="ctr">
+                      <a:noFill/>
+                      <a:prstDash val="solid"/>
+                      <a:round/>
+                      <a:headEnd type="none" w="med" len="med"/>
+                      <a:tailEnd type="none" w="med" len="med"/>
+                    </a:lnR>
+                    <a:lnT w="12700" cap="flat" cmpd="sng" algn="ctr">
+                      <a:noFill/>
+                      <a:prstDash val="solid"/>
+                      <a:round/>
+                      <a:headEnd type="none" w="med" len="med"/>
+                      <a:tailEnd type="none" w="med" len="med"/>
+                    </a:lnT>
+                    <a:lnB w="12700" cap="flat" cmpd="sng" algn="ctr">
+                      <a:noFill/>
+                      <a:prstDash val="solid"/>
+                      <a:round/>
+                      <a:headEnd type="none" w="med" len="med"/>
+                      <a:tailEnd type="none" w="med" len="med"/>
+                    </a:lnB>
+                    <a:lnTlToBr w="12700" cmpd="sng">
+                      <a:noFill/>
+                      <a:prstDash val="solid"/>
+                    </a:lnTlToBr>
+                    <a:lnBlToTr w="12700" cmpd="sng">
+                      <a:noFill/>
+                      <a:prstDash val="solid"/>
+                    </a:lnBlToTr>
+                    <a:solidFill>
+                      <a:srgbClr val="5B616F"/>
+                    </a:solidFill>
+                  </a:tcPr>
+                </a:tc>
+                <a:extLst>
+                  <a:ext uri="{0D108BD9-81ED-4DB2-BD59-A6C34878D82A}">
+                    <a16:rowId xmlns:a16="http://schemas.microsoft.com/office/drawing/2014/main" val="1711099084"/>
+                  </a:ext>
+                </a:extLst>
+              </a:tr>
+              <a:tr h="407087">
+                <a:tc>
+                  <a:txBody>
+                    <a:bodyPr/>
+                    <a:lstStyle/>
+                    <a:p>
+                      <a:pPr algn="just"/>
+                      <a:r>
+                        <a:rPr lang="pt-BR" sz="1800" b="1" kern="1200" dirty="0">
+                          <a:solidFill>
+                            <a:srgbClr val="9BD4BA"/>
+                          </a:solidFill>
+                          <a:effectLst/>
+                          <a:latin typeface="Agency FB" panose="020B0503020202020204" pitchFamily="34" charset="0"/>
+                          <a:ea typeface="+mn-ea"/>
+                          <a:cs typeface="+mn-cs"/>
+                        </a:rPr>
+                        <a:t>RF009 Consultar relatórios de consumo de alimento -  </a:t>
+                      </a:r>
+                      <a:r>
+                        <a:rPr lang="pt-BR" sz="1800" b="0" kern="1200" dirty="0">
+                          <a:solidFill>
+                            <a:srgbClr val="DBA1A1"/>
+                          </a:solidFill>
+                          <a:effectLst/>
+                          <a:latin typeface="Agency FB" panose="020B0503020202020204" pitchFamily="34" charset="0"/>
+                          <a:ea typeface="+mn-ea"/>
+                          <a:cs typeface="+mn-cs"/>
+                        </a:rPr>
+                        <a:t>O perfil Paciente deve conseguir consultar relatórios sobre seu consumo de alimento.</a:t>
+                      </a:r>
+                    </a:p>
+                  </a:txBody>
+                  <a:tcPr>
+                    <a:lnL w="12700" cap="flat" cmpd="sng" algn="ctr">
+                      <a:noFill/>
+                      <a:prstDash val="solid"/>
+                      <a:round/>
+                      <a:headEnd type="none" w="med" len="med"/>
+                      <a:tailEnd type="none" w="med" len="med"/>
+                    </a:lnL>
+                    <a:lnR w="12700" cap="flat" cmpd="sng" algn="ctr">
+                      <a:noFill/>
+                      <a:prstDash val="solid"/>
+                      <a:round/>
+                      <a:headEnd type="none" w="med" len="med"/>
+                      <a:tailEnd type="none" w="med" len="med"/>
+                    </a:lnR>
+                    <a:lnT w="12700" cap="flat" cmpd="sng" algn="ctr">
+                      <a:noFill/>
+                      <a:prstDash val="solid"/>
+                      <a:round/>
+                      <a:headEnd type="none" w="med" len="med"/>
+                      <a:tailEnd type="none" w="med" len="med"/>
+                    </a:lnT>
+                    <a:lnB w="12700" cap="flat" cmpd="sng" algn="ctr">
+                      <a:noFill/>
+                      <a:prstDash val="solid"/>
+                      <a:round/>
+                      <a:headEnd type="none" w="med" len="med"/>
+                      <a:tailEnd type="none" w="med" len="med"/>
+                    </a:lnB>
+                    <a:lnTlToBr w="12700" cmpd="sng">
+                      <a:noFill/>
+                      <a:prstDash val="solid"/>
+                    </a:lnTlToBr>
+                    <a:lnBlToTr w="12700" cmpd="sng">
+                      <a:noFill/>
+                      <a:prstDash val="solid"/>
+                    </a:lnBlToTr>
+                    <a:solidFill>
+                      <a:srgbClr val="5B616F"/>
+                    </a:solidFill>
+                  </a:tcPr>
+                </a:tc>
+                <a:extLst>
+                  <a:ext uri="{0D108BD9-81ED-4DB2-BD59-A6C34878D82A}">
+                    <a16:rowId xmlns:a16="http://schemas.microsoft.com/office/drawing/2014/main" val="2077366541"/>
+                  </a:ext>
+                </a:extLst>
+              </a:tr>
+              <a:tr h="407087">
+                <a:tc>
+                  <a:txBody>
+                    <a:bodyPr/>
+                    <a:lstStyle/>
+                    <a:p>
+                      <a:pPr marL="0" marR="0" lvl="0" indent="0" algn="just" defTabSz="914400" rtl="0" eaLnBrk="1" fontAlgn="auto" latinLnBrk="0" hangingPunct="1">
                         <a:lnSpc>
                           <a:spcPct val="100000"/>
                         </a:lnSpc>
@@ -7589,7 +7434,19 @@
                         <a:defRPr/>
                       </a:pPr>
                       <a:r>
-                        <a:rPr lang="pt-BR" sz="1800" kern="1200" dirty="0">
+                        <a:rPr lang="pt-BR" sz="1800" b="1" kern="1200" dirty="0">
+                          <a:solidFill>
+                            <a:srgbClr val="9BD4BA"/>
+                          </a:solidFill>
+                          <a:effectLst/>
+                          <a:latin typeface="Agency FB" panose="020B0503020202020204" pitchFamily="34" charset="0"/>
+                          <a:ea typeface="+mn-ea"/>
+                          <a:cs typeface="+mn-cs"/>
+                        </a:rPr>
+                        <a:t>RF010 Cadastrar Nutricionista - </a:t>
+                      </a:r>
+                      <a:r>
+                        <a:rPr lang="pt-BR" sz="1800" b="0" kern="1200" dirty="0">
                           <a:solidFill>
                             <a:srgbClr val="DBA1A1"/>
                           </a:solidFill>
@@ -7598,58 +7455,8 @@
                           <a:ea typeface="+mn-ea"/>
                           <a:cs typeface="+mn-cs"/>
                         </a:rPr>
-                        <a:t>Cadastrar Paciente </a:t>
+                        <a:t>O perfil administrador deve somente conseguir cadastrar um nutricionista novo ou alterar os dados de um nutricionista já existente.</a:t>
                       </a:r>
-                    </a:p>
-                    <a:p>
-                      <a:r>
-                        <a:rPr lang="pt-BR" sz="1800" kern="1200" dirty="0">
-                          <a:solidFill>
-                            <a:srgbClr val="DBA1A1"/>
-                          </a:solidFill>
-                          <a:effectLst/>
-                          <a:latin typeface="Agency FB" panose="020B0503020202020204" pitchFamily="34" charset="0"/>
-                          <a:ea typeface="+mn-ea"/>
-                          <a:cs typeface="+mn-cs"/>
-                        </a:rPr>
-                        <a:t>- O paciente deve ser diferenciado do nutricionista.</a:t>
-                      </a:r>
-                    </a:p>
-                    <a:p>
-                      <a:r>
-                        <a:rPr lang="pt-BR" sz="1800" kern="1200" dirty="0">
-                          <a:solidFill>
-                            <a:srgbClr val="DBA1A1"/>
-                          </a:solidFill>
-                          <a:effectLst/>
-                          <a:latin typeface="Agency FB" panose="020B0503020202020204" pitchFamily="34" charset="0"/>
-                          <a:ea typeface="+mn-ea"/>
-                          <a:cs typeface="+mn-cs"/>
-                        </a:rPr>
-                        <a:t>	Implementação</a:t>
-                      </a:r>
-                    </a:p>
-                    <a:p>
-                      <a:r>
-                        <a:rPr lang="pt-BR" sz="1800" kern="1200" dirty="0">
-                          <a:solidFill>
-                            <a:srgbClr val="DBA1A1"/>
-                          </a:solidFill>
-                          <a:effectLst/>
-                          <a:latin typeface="Agency FB" panose="020B0503020202020204" pitchFamily="34" charset="0"/>
-                          <a:ea typeface="+mn-ea"/>
-                          <a:cs typeface="+mn-cs"/>
-                        </a:rPr>
-                        <a:t>	Obrigatório</a:t>
-                      </a:r>
-                    </a:p>
-                    <a:p>
-                      <a:endParaRPr lang="pt-BR" dirty="0">
-                        <a:solidFill>
-                          <a:srgbClr val="DBA1A1"/>
-                        </a:solidFill>
-                        <a:latin typeface="Agency FB" panose="020B0503020202020204" pitchFamily="34" charset="0"/>
-                      </a:endParaRPr>
                     </a:p>
                   </a:txBody>
                   <a:tcPr>
@@ -7696,367 +7503,7 @@
                 </a:tc>
                 <a:extLst>
                   <a:ext uri="{0D108BD9-81ED-4DB2-BD59-A6C34878D82A}">
-                    <a16:rowId xmlns:a16="http://schemas.microsoft.com/office/drawing/2014/main" val="3034851657"/>
-                  </a:ext>
-                </a:extLst>
-              </a:tr>
-              <a:tr h="370840">
-                <a:tc vMerge="1">
-                  <a:txBody>
-                    <a:bodyPr/>
-                    <a:lstStyle/>
-                    <a:p>
-                      <a:endParaRPr lang="pt-BR" dirty="0"/>
-                    </a:p>
-                  </a:txBody>
-                  <a:tcPr/>
-                </a:tc>
-                <a:tc>
-                  <a:txBody>
-                    <a:bodyPr/>
-                    <a:lstStyle/>
-                    <a:p>
-                      <a:r>
-                        <a:rPr lang="pt-BR" sz="1800" kern="1200" dirty="0">
-                          <a:solidFill>
-                            <a:srgbClr val="DBA1A1"/>
-                          </a:solidFill>
-                          <a:effectLst/>
-                          <a:latin typeface="Agency FB" panose="020B0503020202020204" pitchFamily="34" charset="0"/>
-                          <a:ea typeface="+mn-ea"/>
-                          <a:cs typeface="+mn-cs"/>
-                        </a:rPr>
-                        <a:t>Cadastrar Refeições </a:t>
-                      </a:r>
-                    </a:p>
-                    <a:p>
-                      <a:r>
-                        <a:rPr lang="pt-BR" sz="1800" kern="1200" dirty="0">
-                          <a:solidFill>
-                            <a:srgbClr val="DBA1A1"/>
-                          </a:solidFill>
-                          <a:effectLst/>
-                          <a:latin typeface="Agency FB" panose="020B0503020202020204" pitchFamily="34" charset="0"/>
-                          <a:ea typeface="+mn-ea"/>
-                          <a:cs typeface="+mn-cs"/>
-                        </a:rPr>
-                        <a:t>- Nomes acima de 30 caracteres serão abreviados.</a:t>
-                      </a:r>
-                    </a:p>
-                    <a:p>
-                      <a:r>
-                        <a:rPr lang="pt-BR" sz="1800" kern="1200" dirty="0">
-                          <a:solidFill>
-                            <a:srgbClr val="DBA1A1"/>
-                          </a:solidFill>
-                          <a:effectLst/>
-                          <a:latin typeface="Agency FB" panose="020B0503020202020204" pitchFamily="34" charset="0"/>
-                          <a:ea typeface="+mn-ea"/>
-                          <a:cs typeface="+mn-cs"/>
-                        </a:rPr>
-                        <a:t>	Usabilidade</a:t>
-                      </a:r>
-                    </a:p>
-                    <a:p>
-                      <a:r>
-                        <a:rPr lang="pt-BR" sz="1800" kern="1200" dirty="0">
-                          <a:solidFill>
-                            <a:srgbClr val="DBA1A1"/>
-                          </a:solidFill>
-                          <a:effectLst/>
-                          <a:latin typeface="Agency FB" panose="020B0503020202020204" pitchFamily="34" charset="0"/>
-                          <a:ea typeface="+mn-ea"/>
-                          <a:cs typeface="+mn-cs"/>
-                        </a:rPr>
-                        <a:t>	Obrigatório</a:t>
-                      </a:r>
-                    </a:p>
-                    <a:p>
-                      <a:endParaRPr lang="pt-BR" dirty="0">
-                        <a:solidFill>
-                          <a:srgbClr val="DBA1A1"/>
-                        </a:solidFill>
-                        <a:latin typeface="Agency FB" panose="020B0503020202020204" pitchFamily="34" charset="0"/>
-                      </a:endParaRPr>
-                    </a:p>
-                  </a:txBody>
-                  <a:tcPr>
-                    <a:lnL w="12700" cap="flat" cmpd="sng" algn="ctr">
-                      <a:noFill/>
-                      <a:prstDash val="solid"/>
-                      <a:round/>
-                      <a:headEnd type="none" w="med" len="med"/>
-                      <a:tailEnd type="none" w="med" len="med"/>
-                    </a:lnL>
-                    <a:lnR w="12700" cap="flat" cmpd="sng" algn="ctr">
-                      <a:noFill/>
-                      <a:prstDash val="solid"/>
-                      <a:round/>
-                      <a:headEnd type="none" w="med" len="med"/>
-                      <a:tailEnd type="none" w="med" len="med"/>
-                    </a:lnR>
-                    <a:lnT w="12700" cap="flat" cmpd="sng" algn="ctr">
-                      <a:noFill/>
-                      <a:prstDash val="solid"/>
-                      <a:round/>
-                      <a:headEnd type="none" w="med" len="med"/>
-                      <a:tailEnd type="none" w="med" len="med"/>
-                    </a:lnT>
-                    <a:lnB w="12700" cap="flat" cmpd="sng" algn="ctr">
-                      <a:noFill/>
-                      <a:prstDash val="solid"/>
-                      <a:round/>
-                      <a:headEnd type="none" w="med" len="med"/>
-                      <a:tailEnd type="none" w="med" len="med"/>
-                    </a:lnB>
-                    <a:lnTlToBr w="12700" cmpd="sng">
-                      <a:noFill/>
-                      <a:prstDash val="solid"/>
-                    </a:lnTlToBr>
-                    <a:lnBlToTr w="12700" cmpd="sng">
-                      <a:noFill/>
-                      <a:prstDash val="solid"/>
-                    </a:lnBlToTr>
-                    <a:solidFill>
-                      <a:srgbClr val="5B616F"/>
-                    </a:solidFill>
-                  </a:tcPr>
-                </a:tc>
-                <a:extLst>
-                  <a:ext uri="{0D108BD9-81ED-4DB2-BD59-A6C34878D82A}">
-                    <a16:rowId xmlns:a16="http://schemas.microsoft.com/office/drawing/2014/main" val="2678225723"/>
-                  </a:ext>
-                </a:extLst>
-              </a:tr>
-              <a:tr h="370840">
-                <a:tc vMerge="1">
-                  <a:txBody>
-                    <a:bodyPr/>
-                    <a:lstStyle/>
-                    <a:p>
-                      <a:endParaRPr lang="pt-BR" dirty="0"/>
-                    </a:p>
-                  </a:txBody>
-                  <a:tcPr/>
-                </a:tc>
-                <a:tc>
-                  <a:txBody>
-                    <a:bodyPr/>
-                    <a:lstStyle/>
-                    <a:p>
-                      <a:r>
-                        <a:rPr lang="pt-BR" sz="1800" kern="1200" dirty="0">
-                          <a:solidFill>
-                            <a:srgbClr val="DBA1A1"/>
-                          </a:solidFill>
-                          <a:effectLst/>
-                          <a:latin typeface="Agency FB" panose="020B0503020202020204" pitchFamily="34" charset="0"/>
-                          <a:ea typeface="+mn-ea"/>
-                          <a:cs typeface="+mn-cs"/>
-                        </a:rPr>
-                        <a:t>Cadastrar Porções de Alimentos</a:t>
-                      </a:r>
-                    </a:p>
-                    <a:p>
-                      <a:r>
-                        <a:rPr lang="pt-BR" sz="1800" kern="1200" dirty="0">
-                          <a:solidFill>
-                            <a:srgbClr val="DBA1A1"/>
-                          </a:solidFill>
-                          <a:effectLst/>
-                          <a:latin typeface="Agency FB" panose="020B0503020202020204" pitchFamily="34" charset="0"/>
-                          <a:ea typeface="+mn-ea"/>
-                          <a:cs typeface="+mn-cs"/>
-                        </a:rPr>
-                        <a:t>- As especificações da porção ficaram no campo de observações.</a:t>
-                      </a:r>
-                    </a:p>
-                    <a:p>
-                      <a:r>
-                        <a:rPr lang="pt-BR" sz="1800" kern="1200" dirty="0">
-                          <a:solidFill>
-                            <a:srgbClr val="DBA1A1"/>
-                          </a:solidFill>
-                          <a:effectLst/>
-                          <a:latin typeface="Agency FB" panose="020B0503020202020204" pitchFamily="34" charset="0"/>
-                          <a:ea typeface="+mn-ea"/>
-                          <a:cs typeface="+mn-cs"/>
-                        </a:rPr>
-                        <a:t>	Usabilidade</a:t>
-                      </a:r>
-                    </a:p>
-                    <a:p>
-                      <a:r>
-                        <a:rPr lang="pt-BR" sz="1800" kern="1200" dirty="0">
-                          <a:solidFill>
-                            <a:srgbClr val="DBA1A1"/>
-                          </a:solidFill>
-                          <a:effectLst/>
-                          <a:latin typeface="Agency FB" panose="020B0503020202020204" pitchFamily="34" charset="0"/>
-                          <a:ea typeface="+mn-ea"/>
-                          <a:cs typeface="+mn-cs"/>
-                        </a:rPr>
-                        <a:t>	Obrigatório</a:t>
-                      </a:r>
-                    </a:p>
-                  </a:txBody>
-                  <a:tcPr>
-                    <a:lnL w="12700" cap="flat" cmpd="sng" algn="ctr">
-                      <a:noFill/>
-                      <a:prstDash val="solid"/>
-                      <a:round/>
-                      <a:headEnd type="none" w="med" len="med"/>
-                      <a:tailEnd type="none" w="med" len="med"/>
-                    </a:lnL>
-                    <a:lnR w="12700" cap="flat" cmpd="sng" algn="ctr">
-                      <a:noFill/>
-                      <a:prstDash val="solid"/>
-                      <a:round/>
-                      <a:headEnd type="none" w="med" len="med"/>
-                      <a:tailEnd type="none" w="med" len="med"/>
-                    </a:lnR>
-                    <a:lnT w="12700" cap="flat" cmpd="sng" algn="ctr">
-                      <a:noFill/>
-                      <a:prstDash val="solid"/>
-                      <a:round/>
-                      <a:headEnd type="none" w="med" len="med"/>
-                      <a:tailEnd type="none" w="med" len="med"/>
-                    </a:lnT>
-                    <a:lnB w="12700" cap="flat" cmpd="sng" algn="ctr">
-                      <a:noFill/>
-                      <a:prstDash val="solid"/>
-                      <a:round/>
-                      <a:headEnd type="none" w="med" len="med"/>
-                      <a:tailEnd type="none" w="med" len="med"/>
-                    </a:lnB>
-                    <a:lnTlToBr w="12700" cmpd="sng">
-                      <a:noFill/>
-                      <a:prstDash val="solid"/>
-                    </a:lnTlToBr>
-                    <a:lnBlToTr w="12700" cmpd="sng">
-                      <a:noFill/>
-                      <a:prstDash val="solid"/>
-                    </a:lnBlToTr>
-                    <a:solidFill>
-                      <a:srgbClr val="5B616F"/>
-                    </a:solidFill>
-                  </a:tcPr>
-                </a:tc>
-                <a:extLst>
-                  <a:ext uri="{0D108BD9-81ED-4DB2-BD59-A6C34878D82A}">
-                    <a16:rowId xmlns:a16="http://schemas.microsoft.com/office/drawing/2014/main" val="1646411524"/>
-                  </a:ext>
-                </a:extLst>
-              </a:tr>
-              <a:tr h="370840">
-                <a:tc vMerge="1">
-                  <a:txBody>
-                    <a:bodyPr/>
-                    <a:lstStyle/>
-                    <a:p>
-                      <a:endParaRPr lang="pt-BR" dirty="0"/>
-                    </a:p>
-                  </a:txBody>
-                  <a:tcPr/>
-                </a:tc>
-                <a:tc>
-                  <a:txBody>
-                    <a:bodyPr/>
-                    <a:lstStyle/>
-                    <a:p>
-                      <a:r>
-                        <a:rPr lang="pt-BR" sz="1800" kern="1200" dirty="0">
-                          <a:solidFill>
-                            <a:srgbClr val="DBA1A1"/>
-                          </a:solidFill>
-                          <a:effectLst/>
-                          <a:latin typeface="Agency FB" panose="020B0503020202020204" pitchFamily="34" charset="0"/>
-                          <a:ea typeface="+mn-ea"/>
-                          <a:cs typeface="+mn-cs"/>
-                        </a:rPr>
-                        <a:t>Cadastrar Dietas</a:t>
-                      </a:r>
-                    </a:p>
-                    <a:p>
-                      <a:r>
-                        <a:rPr lang="pt-BR" sz="1800" kern="1200" dirty="0">
-                          <a:solidFill>
-                            <a:srgbClr val="DBA1A1"/>
-                          </a:solidFill>
-                          <a:effectLst/>
-                          <a:latin typeface="Agency FB" panose="020B0503020202020204" pitchFamily="34" charset="0"/>
-                          <a:ea typeface="+mn-ea"/>
-                          <a:cs typeface="+mn-cs"/>
-                        </a:rPr>
-                        <a:t>	Implementação</a:t>
-                      </a:r>
-                    </a:p>
-                    <a:p>
-                      <a:r>
-                        <a:rPr lang="pt-BR" sz="1800" kern="1200" dirty="0">
-                          <a:solidFill>
-                            <a:srgbClr val="DBA1A1"/>
-                          </a:solidFill>
-                          <a:effectLst/>
-                          <a:latin typeface="Agency FB" panose="020B0503020202020204" pitchFamily="34" charset="0"/>
-                          <a:ea typeface="+mn-ea"/>
-                          <a:cs typeface="+mn-cs"/>
-                        </a:rPr>
-                        <a:t>	Obrigatório</a:t>
-                      </a:r>
-                      <a:endParaRPr lang="pt-BR" dirty="0">
-                        <a:solidFill>
-                          <a:srgbClr val="DBA1A1"/>
-                        </a:solidFill>
-                        <a:latin typeface="Agency FB" panose="020B0503020202020204" pitchFamily="34" charset="0"/>
-                      </a:endParaRPr>
-                    </a:p>
-                  </a:txBody>
-                  <a:tcPr>
-                    <a:lnL w="12700" cap="flat" cmpd="sng" algn="ctr">
-                      <a:noFill/>
-                      <a:prstDash val="solid"/>
-                      <a:round/>
-                      <a:headEnd type="none" w="med" len="med"/>
-                      <a:tailEnd type="none" w="med" len="med"/>
-                    </a:lnL>
-                    <a:lnR w="12700" cap="flat" cmpd="sng" algn="ctr">
-                      <a:noFill/>
-                      <a:prstDash val="solid"/>
-                      <a:round/>
-                      <a:headEnd type="none" w="med" len="med"/>
-                      <a:tailEnd type="none" w="med" len="med"/>
-                    </a:lnR>
-                    <a:lnT w="12700" cap="flat" cmpd="sng" algn="ctr">
-                      <a:noFill/>
-                      <a:prstDash val="solid"/>
-                      <a:round/>
-                      <a:headEnd type="none" w="med" len="med"/>
-                      <a:tailEnd type="none" w="med" len="med"/>
-                    </a:lnT>
-                    <a:lnB w="12700" cap="flat" cmpd="sng" algn="ctr">
-                      <a:noFill/>
-                      <a:prstDash val="solid"/>
-                      <a:round/>
-                      <a:headEnd type="none" w="med" len="med"/>
-                      <a:tailEnd type="none" w="med" len="med"/>
-                    </a:lnB>
-                    <a:lnTlToBr w="12700" cmpd="sng">
-                      <a:noFill/>
-                      <a:prstDash val="solid"/>
-                    </a:lnTlToBr>
-                    <a:lnBlToTr w="12700" cmpd="sng">
-                      <a:noFill/>
-                      <a:prstDash val="solid"/>
-                    </a:lnBlToTr>
-                    <a:solidFill>
-                      <a:srgbClr val="5B616F"/>
-                    </a:solidFill>
-                  </a:tcPr>
-                </a:tc>
-                <a:extLst>
-                  <a:ext uri="{0D108BD9-81ED-4DB2-BD59-A6C34878D82A}">
-                    <a16:rowId xmlns:a16="http://schemas.microsoft.com/office/drawing/2014/main" val="1030401757"/>
+                    <a16:rowId xmlns:a16="http://schemas.microsoft.com/office/drawing/2014/main" val="2724757038"/>
                   </a:ext>
                 </a:extLst>
               </a:tr>
@@ -8199,7 +7646,7 @@
                 </a:solidFill>
                 <a:latin typeface="Agency FB" panose="020B0503020202020204" pitchFamily="34" charset="0"/>
               </a:rPr>
-              <a:t>Requisitos Funcionais e Não Funcionais</a:t>
+              <a:t>Requisitos Não Funcionais</a:t>
             </a:r>
           </a:p>
         </p:txBody>
@@ -8219,14 +7666,14 @@
           <p:nvPr>
             <p:extLst>
               <p:ext uri="{D42A27DB-BD31-4B8C-83A1-F6EECF244321}">
-                <p14:modId xmlns:p14="http://schemas.microsoft.com/office/powerpoint/2010/main" val="2927639210"/>
+                <p14:modId xmlns:p14="http://schemas.microsoft.com/office/powerpoint/2010/main" val="1877104337"/>
               </p:ext>
             </p:extLst>
           </p:nvPr>
         </p:nvGraphicFramePr>
         <p:xfrm>
-          <a:off x="846537" y="1106909"/>
-          <a:ext cx="10853490" cy="5674360"/>
+          <a:off x="458598" y="1499366"/>
+          <a:ext cx="11274804" cy="5061741"/>
         </p:xfrm>
         <a:graphic>
           <a:graphicData uri="http://schemas.openxmlformats.org/drawingml/2006/table">
@@ -8235,153 +7682,35 @@
                 <a:tableStyleId>{5C22544A-7EE6-4342-B048-85BDC9FD1C3A}</a:tableStyleId>
               </a:tblPr>
               <a:tblGrid>
-                <a:gridCol w="5426745">
+                <a:gridCol w="11274804">
                   <a:extLst>
                     <a:ext uri="{9D8B030D-6E8A-4147-A177-3AD203B41FA5}">
                       <a16:colId xmlns:a16="http://schemas.microsoft.com/office/drawing/2014/main" val="2504239251"/>
                     </a:ext>
                   </a:extLst>
                 </a:gridCol>
-                <a:gridCol w="5426745">
-                  <a:extLst>
-                    <a:ext uri="{9D8B030D-6E8A-4147-A177-3AD203B41FA5}">
-                      <a16:colId xmlns:a16="http://schemas.microsoft.com/office/drawing/2014/main" val="354975263"/>
-                    </a:ext>
-                  </a:extLst>
-                </a:gridCol>
               </a:tblGrid>
-              <a:tr h="370840">
+              <a:tr h="375793">
                 <a:tc>
                   <a:txBody>
                     <a:bodyPr/>
                     <a:lstStyle/>
                     <a:p>
+                      <a:pPr algn="just"/>
                       <a:r>
-                        <a:rPr lang="pt-BR" dirty="0">
+                        <a:rPr lang="pt-BR" sz="1800" b="1" kern="1200" dirty="0">
                           <a:solidFill>
-                            <a:srgbClr val="DBA1A1"/>
+                            <a:srgbClr val="9BD4BA"/>
                           </a:solidFill>
+                          <a:effectLst/>
                           <a:latin typeface="Agency FB" panose="020B0503020202020204" pitchFamily="34" charset="0"/>
+                          <a:ea typeface="+mn-ea"/>
+                          <a:cs typeface="+mn-cs"/>
                         </a:rPr>
-                        <a:t>Funcional</a:t>
+                        <a:t>RNF001 Requisito de segurança dos dados -  </a:t>
                       </a:r>
-                    </a:p>
-                  </a:txBody>
-                  <a:tcPr>
-                    <a:lnL w="12700" cap="flat" cmpd="sng" algn="ctr">
-                      <a:noFill/>
-                      <a:prstDash val="solid"/>
-                      <a:round/>
-                      <a:headEnd type="none" w="med" len="med"/>
-                      <a:tailEnd type="none" w="med" len="med"/>
-                    </a:lnL>
-                    <a:lnR w="12700" cap="flat" cmpd="sng" algn="ctr">
-                      <a:noFill/>
-                      <a:prstDash val="solid"/>
-                      <a:round/>
-                      <a:headEnd type="none" w="med" len="med"/>
-                      <a:tailEnd type="none" w="med" len="med"/>
-                    </a:lnR>
-                    <a:lnT w="12700" cap="flat" cmpd="sng" algn="ctr">
-                      <a:noFill/>
-                      <a:prstDash val="solid"/>
-                      <a:round/>
-                      <a:headEnd type="none" w="med" len="med"/>
-                      <a:tailEnd type="none" w="med" len="med"/>
-                    </a:lnT>
-                    <a:lnB w="12700" cap="flat" cmpd="sng" algn="ctr">
-                      <a:noFill/>
-                      <a:prstDash val="solid"/>
-                      <a:round/>
-                      <a:headEnd type="none" w="med" len="med"/>
-                      <a:tailEnd type="none" w="med" len="med"/>
-                    </a:lnB>
-                    <a:lnTlToBr w="12700" cmpd="sng">
-                      <a:noFill/>
-                      <a:prstDash val="solid"/>
-                    </a:lnTlToBr>
-                    <a:lnBlToTr w="12700" cmpd="sng">
-                      <a:noFill/>
-                      <a:prstDash val="solid"/>
-                    </a:lnBlToTr>
-                    <a:solidFill>
-                      <a:srgbClr val="5B616F"/>
-                    </a:solidFill>
-                  </a:tcPr>
-                </a:tc>
-                <a:tc>
-                  <a:txBody>
-                    <a:bodyPr/>
-                    <a:lstStyle/>
-                    <a:p>
                       <a:r>
-                        <a:rPr lang="pt-BR" dirty="0">
-                          <a:solidFill>
-                            <a:srgbClr val="DBA1A1"/>
-                          </a:solidFill>
-                          <a:latin typeface="Agency FB" panose="020B0503020202020204" pitchFamily="34" charset="0"/>
-                        </a:rPr>
-                        <a:t>Não Funcional</a:t>
-                      </a:r>
-                    </a:p>
-                  </a:txBody>
-                  <a:tcPr>
-                    <a:lnL w="12700" cap="flat" cmpd="sng" algn="ctr">
-                      <a:noFill/>
-                      <a:prstDash val="solid"/>
-                      <a:round/>
-                      <a:headEnd type="none" w="med" len="med"/>
-                      <a:tailEnd type="none" w="med" len="med"/>
-                    </a:lnL>
-                    <a:lnR w="12700" cap="flat" cmpd="sng" algn="ctr">
-                      <a:noFill/>
-                      <a:prstDash val="solid"/>
-                      <a:round/>
-                      <a:headEnd type="none" w="med" len="med"/>
-                      <a:tailEnd type="none" w="med" len="med"/>
-                    </a:lnR>
-                    <a:lnT w="12700" cap="flat" cmpd="sng" algn="ctr">
-                      <a:noFill/>
-                      <a:prstDash val="solid"/>
-                      <a:round/>
-                      <a:headEnd type="none" w="med" len="med"/>
-                      <a:tailEnd type="none" w="med" len="med"/>
-                    </a:lnT>
-                    <a:lnB w="12700" cap="flat" cmpd="sng" algn="ctr">
-                      <a:noFill/>
-                      <a:prstDash val="solid"/>
-                      <a:round/>
-                      <a:headEnd type="none" w="med" len="med"/>
-                      <a:tailEnd type="none" w="med" len="med"/>
-                    </a:lnB>
-                    <a:lnTlToBr w="12700" cmpd="sng">
-                      <a:noFill/>
-                      <a:prstDash val="solid"/>
-                    </a:lnTlToBr>
-                    <a:lnBlToTr w="12700" cmpd="sng">
-                      <a:noFill/>
-                      <a:prstDash val="solid"/>
-                    </a:lnBlToTr>
-                    <a:solidFill>
-                      <a:srgbClr val="5B616F"/>
-                    </a:solidFill>
-                  </a:tcPr>
-                </a:tc>
-                <a:extLst>
-                  <a:ext uri="{0D108BD9-81ED-4DB2-BD59-A6C34878D82A}">
-                    <a16:rowId xmlns:a16="http://schemas.microsoft.com/office/drawing/2014/main" val="2395872218"/>
-                  </a:ext>
-                </a:extLst>
-              </a:tr>
-              <a:tr h="370840">
-                <a:tc rowSpan="4">
-                  <a:txBody>
-                    <a:bodyPr/>
-                    <a:lstStyle/>
-                    <a:p>
-                      <a:pPr algn="l"/>
-                      <a:r>
-                        <a:rPr lang="pt-BR" sz="1800" kern="1200" dirty="0">
+                        <a:rPr lang="pt-BR" sz="1800" b="0" kern="1200" dirty="0">
                           <a:solidFill>
                             <a:srgbClr val="DBA1A1"/>
                           </a:solidFill>
@@ -8390,128 +7719,8 @@
                           <a:ea typeface="+mn-ea"/>
                           <a:cs typeface="+mn-cs"/>
                         </a:rPr>
-                        <a:t>Editar -  O usuário poderá editar os itens que já estão incluídos no banco de dados.</a:t>
+                        <a:t>Todos os dados da aplicação devem ser gerenciados por um SGBD para que possam ser disponibilizados para a aplicação.</a:t>
                       </a:r>
-                      <a:endParaRPr lang="pt-BR" dirty="0">
-                        <a:solidFill>
-                          <a:srgbClr val="DBA1A1"/>
-                        </a:solidFill>
-                        <a:latin typeface="Agency FB" panose="020B0503020202020204" pitchFamily="34" charset="0"/>
-                      </a:endParaRPr>
-                    </a:p>
-                  </a:txBody>
-                  <a:tcPr>
-                    <a:lnL w="12700" cap="flat" cmpd="sng" algn="ctr">
-                      <a:noFill/>
-                      <a:prstDash val="solid"/>
-                      <a:round/>
-                      <a:headEnd type="none" w="med" len="med"/>
-                      <a:tailEnd type="none" w="med" len="med"/>
-                    </a:lnL>
-                    <a:lnR w="12700" cap="flat" cmpd="sng" algn="ctr">
-                      <a:noFill/>
-                      <a:prstDash val="solid"/>
-                      <a:round/>
-                      <a:headEnd type="none" w="med" len="med"/>
-                      <a:tailEnd type="none" w="med" len="med"/>
-                    </a:lnR>
-                    <a:lnT w="12700" cap="flat" cmpd="sng" algn="ctr">
-                      <a:noFill/>
-                      <a:prstDash val="solid"/>
-                      <a:round/>
-                      <a:headEnd type="none" w="med" len="med"/>
-                      <a:tailEnd type="none" w="med" len="med"/>
-                    </a:lnT>
-                    <a:lnB w="12700" cap="flat" cmpd="sng" algn="ctr">
-                      <a:noFill/>
-                      <a:prstDash val="solid"/>
-                      <a:round/>
-                      <a:headEnd type="none" w="med" len="med"/>
-                      <a:tailEnd type="none" w="med" len="med"/>
-                    </a:lnB>
-                    <a:lnTlToBr w="12700" cmpd="sng">
-                      <a:noFill/>
-                      <a:prstDash val="solid"/>
-                    </a:lnTlToBr>
-                    <a:lnBlToTr w="12700" cmpd="sng">
-                      <a:noFill/>
-                      <a:prstDash val="solid"/>
-                    </a:lnBlToTr>
-                    <a:solidFill>
-                      <a:srgbClr val="5B616F"/>
-                    </a:solidFill>
-                  </a:tcPr>
-                </a:tc>
-                <a:tc>
-                  <a:txBody>
-                    <a:bodyPr/>
-                    <a:lstStyle/>
-                    <a:p>
-                      <a:pPr marL="0" marR="0" lvl="0" indent="0" algn="l" defTabSz="914400" rtl="0" eaLnBrk="1" fontAlgn="auto" latinLnBrk="0" hangingPunct="1">
-                        <a:lnSpc>
-                          <a:spcPct val="100000"/>
-                        </a:lnSpc>
-                        <a:spcBef>
-                          <a:spcPts val="0"/>
-                        </a:spcBef>
-                        <a:spcAft>
-                          <a:spcPts val="0"/>
-                        </a:spcAft>
-                        <a:buClrTx/>
-                        <a:buSzTx/>
-                        <a:buFontTx/>
-                        <a:buNone/>
-                        <a:tabLst/>
-                        <a:defRPr/>
-                      </a:pPr>
-                      <a:r>
-                        <a:rPr lang="pt-BR" sz="1800" kern="1200" dirty="0">
-                          <a:solidFill>
-                            <a:srgbClr val="DBA1A1"/>
-                          </a:solidFill>
-                          <a:effectLst/>
-                          <a:latin typeface="Agency FB" panose="020B0503020202020204" pitchFamily="34" charset="0"/>
-                          <a:ea typeface="+mn-ea"/>
-                          <a:cs typeface="+mn-cs"/>
-                        </a:rPr>
-                        <a:t>Só deve ser editado um item por vez.</a:t>
-                      </a:r>
-                    </a:p>
-                    <a:p>
-                      <a:r>
-                        <a:rPr lang="pt-BR" sz="1800" kern="1200" dirty="0">
-                          <a:solidFill>
-                            <a:srgbClr val="DBA1A1"/>
-                          </a:solidFill>
-                          <a:effectLst/>
-                          <a:latin typeface="Agency FB" panose="020B0503020202020204" pitchFamily="34" charset="0"/>
-                          <a:ea typeface="+mn-ea"/>
-                          <a:cs typeface="+mn-cs"/>
-                        </a:rPr>
-                        <a:t>- O usuário não será permitido escolher dois itens ao mesmo tempo.	Usabilidade</a:t>
-                      </a:r>
-                    </a:p>
-                    <a:p>
-                      <a:r>
-                        <a:rPr lang="pt-BR" sz="1800" kern="1200" dirty="0">
-                          <a:solidFill>
-                            <a:srgbClr val="DBA1A1"/>
-                          </a:solidFill>
-                          <a:effectLst/>
-                          <a:latin typeface="Agency FB" panose="020B0503020202020204" pitchFamily="34" charset="0"/>
-                          <a:ea typeface="+mn-ea"/>
-                          <a:cs typeface="+mn-cs"/>
-                        </a:rPr>
-                        <a:t>	Obrigatório</a:t>
-                      </a:r>
-                    </a:p>
-                    <a:p>
-                      <a:endParaRPr lang="pt-BR" dirty="0">
-                        <a:solidFill>
-                          <a:srgbClr val="DBA1A1"/>
-                        </a:solidFill>
-                        <a:latin typeface="Agency FB" panose="020B0503020202020204" pitchFamily="34" charset="0"/>
-                      </a:endParaRPr>
                     </a:p>
                   </a:txBody>
                   <a:tcPr>
@@ -8562,24 +7771,27 @@
                   </a:ext>
                 </a:extLst>
               </a:tr>
-              <a:tr h="370840">
-                <a:tc vMerge="1">
-                  <a:txBody>
-                    <a:bodyPr/>
-                    <a:lstStyle/>
-                    <a:p>
-                      <a:endParaRPr lang="pt-BR" dirty="0"/>
-                    </a:p>
-                  </a:txBody>
-                  <a:tcPr/>
-                </a:tc>
+              <a:tr h="293615">
                 <a:tc>
                   <a:txBody>
                     <a:bodyPr/>
                     <a:lstStyle/>
                     <a:p>
+                      <a:pPr algn="just"/>
                       <a:r>
-                        <a:rPr lang="pt-BR" sz="1800" kern="1200" dirty="0">
+                        <a:rPr lang="pt-BR" sz="1800" b="1" kern="1200" dirty="0">
+                          <a:solidFill>
+                            <a:srgbClr val="9BD4BA"/>
+                          </a:solidFill>
+                          <a:effectLst/>
+                          <a:latin typeface="Agency FB" panose="020B0503020202020204" pitchFamily="34" charset="0"/>
+                          <a:ea typeface="+mn-ea"/>
+                          <a:cs typeface="+mn-cs"/>
+                        </a:rPr>
+                        <a:t>RNF002 Requisito de desempenho -  </a:t>
+                      </a:r>
+                      <a:r>
+                        <a:rPr lang="pt-BR" sz="1800" b="0" kern="1200" dirty="0">
                           <a:solidFill>
                             <a:srgbClr val="DBA1A1"/>
                           </a:solidFill>
@@ -8588,12 +7800,79 @@
                           <a:ea typeface="+mn-ea"/>
                           <a:cs typeface="+mn-cs"/>
                         </a:rPr>
-                        <a:t>Ao final de cada edição o usuário precisa salvar a modificação</a:t>
+                        <a:t>O tempo de resposta do sistema durante qualquer requisição, deve ser no máximo de 10 segundos.</a:t>
                       </a:r>
                     </a:p>
+                  </a:txBody>
+                  <a:tcPr>
+                    <a:lnL w="12700" cap="flat" cmpd="sng" algn="ctr">
+                      <a:noFill/>
+                      <a:prstDash val="solid"/>
+                      <a:round/>
+                      <a:headEnd type="none" w="med" len="med"/>
+                      <a:tailEnd type="none" w="med" len="med"/>
+                    </a:lnL>
+                    <a:lnR w="12700" cap="flat" cmpd="sng" algn="ctr">
+                      <a:noFill/>
+                      <a:prstDash val="solid"/>
+                      <a:round/>
+                      <a:headEnd type="none" w="med" len="med"/>
+                      <a:tailEnd type="none" w="med" len="med"/>
+                    </a:lnR>
+                    <a:lnT w="12700" cap="flat" cmpd="sng" algn="ctr">
+                      <a:noFill/>
+                      <a:prstDash val="solid"/>
+                      <a:round/>
+                      <a:headEnd type="none" w="med" len="med"/>
+                      <a:tailEnd type="none" w="med" len="med"/>
+                    </a:lnT>
+                    <a:lnB w="12700" cap="flat" cmpd="sng" algn="ctr">
+                      <a:noFill/>
+                      <a:prstDash val="solid"/>
+                      <a:round/>
+                      <a:headEnd type="none" w="med" len="med"/>
+                      <a:tailEnd type="none" w="med" len="med"/>
+                    </a:lnB>
+                    <a:lnTlToBr w="12700" cmpd="sng">
+                      <a:noFill/>
+                      <a:prstDash val="solid"/>
+                    </a:lnTlToBr>
+                    <a:lnBlToTr w="12700" cmpd="sng">
+                      <a:noFill/>
+                      <a:prstDash val="solid"/>
+                    </a:lnBlToTr>
+                    <a:solidFill>
+                      <a:srgbClr val="5B616F"/>
+                    </a:solidFill>
+                  </a:tcPr>
+                </a:tc>
+                <a:extLst>
+                  <a:ext uri="{0D108BD9-81ED-4DB2-BD59-A6C34878D82A}">
+                    <a16:rowId xmlns:a16="http://schemas.microsoft.com/office/drawing/2014/main" val="205031358"/>
+                  </a:ext>
+                </a:extLst>
+              </a:tr>
+              <a:tr h="407087">
+                <a:tc>
+                  <a:txBody>
+                    <a:bodyPr/>
+                    <a:lstStyle/>
                     <a:p>
+                      <a:pPr algn="just"/>
                       <a:r>
-                        <a:rPr lang="pt-BR" sz="1800" kern="1200" dirty="0">
+                        <a:rPr lang="pt-BR" sz="1800" b="1" kern="1200" dirty="0">
+                          <a:solidFill>
+                            <a:srgbClr val="9BD4BA"/>
+                          </a:solidFill>
+                          <a:effectLst/>
+                          <a:latin typeface="Agency FB" panose="020B0503020202020204" pitchFamily="34" charset="0"/>
+                          <a:ea typeface="+mn-ea"/>
+                          <a:cs typeface="+mn-cs"/>
+                        </a:rPr>
+                        <a:t>RNF003 Requisito de Usabilidade -  </a:t>
+                      </a:r>
+                      <a:r>
+                        <a:rPr lang="pt-BR" sz="1800" b="0" kern="1200" dirty="0">
                           <a:solidFill>
                             <a:srgbClr val="DBA1A1"/>
                           </a:solidFill>
@@ -8602,12 +7881,79 @@
                           <a:ea typeface="+mn-ea"/>
                           <a:cs typeface="+mn-cs"/>
                         </a:rPr>
-                        <a:t>- O sistema não deve salvar automaticamente a modificação do usuário.	Usabilidade</a:t>
+                        <a:t>O sistema deve ser intuitivo e simples de utilizar.</a:t>
                       </a:r>
                     </a:p>
+                  </a:txBody>
+                  <a:tcPr>
+                    <a:lnL w="12700" cap="flat" cmpd="sng" algn="ctr">
+                      <a:noFill/>
+                      <a:prstDash val="solid"/>
+                      <a:round/>
+                      <a:headEnd type="none" w="med" len="med"/>
+                      <a:tailEnd type="none" w="med" len="med"/>
+                    </a:lnL>
+                    <a:lnR w="12700" cap="flat" cmpd="sng" algn="ctr">
+                      <a:noFill/>
+                      <a:prstDash val="solid"/>
+                      <a:round/>
+                      <a:headEnd type="none" w="med" len="med"/>
+                      <a:tailEnd type="none" w="med" len="med"/>
+                    </a:lnR>
+                    <a:lnT w="12700" cap="flat" cmpd="sng" algn="ctr">
+                      <a:noFill/>
+                      <a:prstDash val="solid"/>
+                      <a:round/>
+                      <a:headEnd type="none" w="med" len="med"/>
+                      <a:tailEnd type="none" w="med" len="med"/>
+                    </a:lnT>
+                    <a:lnB w="12700" cap="flat" cmpd="sng" algn="ctr">
+                      <a:noFill/>
+                      <a:prstDash val="solid"/>
+                      <a:round/>
+                      <a:headEnd type="none" w="med" len="med"/>
+                      <a:tailEnd type="none" w="med" len="med"/>
+                    </a:lnB>
+                    <a:lnTlToBr w="12700" cmpd="sng">
+                      <a:noFill/>
+                      <a:prstDash val="solid"/>
+                    </a:lnTlToBr>
+                    <a:lnBlToTr w="12700" cmpd="sng">
+                      <a:noFill/>
+                      <a:prstDash val="solid"/>
+                    </a:lnBlToTr>
+                    <a:solidFill>
+                      <a:srgbClr val="5B616F"/>
+                    </a:solidFill>
+                  </a:tcPr>
+                </a:tc>
+                <a:extLst>
+                  <a:ext uri="{0D108BD9-81ED-4DB2-BD59-A6C34878D82A}">
+                    <a16:rowId xmlns:a16="http://schemas.microsoft.com/office/drawing/2014/main" val="884950376"/>
+                  </a:ext>
+                </a:extLst>
+              </a:tr>
+              <a:tr h="407087">
+                <a:tc>
+                  <a:txBody>
+                    <a:bodyPr/>
+                    <a:lstStyle/>
                     <a:p>
+                      <a:pPr algn="just"/>
                       <a:r>
-                        <a:rPr lang="pt-BR" sz="1800" kern="1200" dirty="0">
+                        <a:rPr lang="pt-BR" sz="1800" b="1" kern="1200" dirty="0">
+                          <a:solidFill>
+                            <a:srgbClr val="9BD4BA"/>
+                          </a:solidFill>
+                          <a:effectLst/>
+                          <a:latin typeface="Agency FB" panose="020B0503020202020204" pitchFamily="34" charset="0"/>
+                          <a:ea typeface="+mn-ea"/>
+                          <a:cs typeface="+mn-cs"/>
+                        </a:rPr>
+                        <a:t>RNF004 Requisito de Confiabilidade -  </a:t>
+                      </a:r>
+                      <a:r>
+                        <a:rPr lang="pt-BR" sz="1800" b="0" kern="1200" dirty="0">
                           <a:solidFill>
                             <a:srgbClr val="DBA1A1"/>
                           </a:solidFill>
@@ -8616,7 +7962,7 @@
                           <a:ea typeface="+mn-ea"/>
                           <a:cs typeface="+mn-cs"/>
                         </a:rPr>
-                        <a:t>	Obrigatório</a:t>
+                        <a:t>Descreve os requisitos não funcionais associados à frequência de falha, e a robustez do sistema na recuperação destas falhas</a:t>
                       </a:r>
                     </a:p>
                   </a:txBody>
@@ -8664,28 +8010,31 @@
                 </a:tc>
                 <a:extLst>
                   <a:ext uri="{0D108BD9-81ED-4DB2-BD59-A6C34878D82A}">
-                    <a16:rowId xmlns:a16="http://schemas.microsoft.com/office/drawing/2014/main" val="2678225723"/>
+                    <a16:rowId xmlns:a16="http://schemas.microsoft.com/office/drawing/2014/main" val="3317817360"/>
                   </a:ext>
                 </a:extLst>
               </a:tr>
-              <a:tr h="370840">
-                <a:tc vMerge="1">
-                  <a:txBody>
-                    <a:bodyPr/>
-                    <a:lstStyle/>
-                    <a:p>
-                      <a:endParaRPr lang="pt-BR" dirty="0"/>
-                    </a:p>
-                  </a:txBody>
-                  <a:tcPr/>
-                </a:tc>
+              <a:tr h="407087">
                 <a:tc>
                   <a:txBody>
                     <a:bodyPr/>
                     <a:lstStyle/>
                     <a:p>
+                      <a:pPr algn="just"/>
                       <a:r>
-                        <a:rPr lang="pt-BR" sz="1800" kern="1200" dirty="0">
+                        <a:rPr lang="pt-BR" sz="1800" b="1" kern="1200" dirty="0">
+                          <a:solidFill>
+                            <a:srgbClr val="9BD4BA"/>
+                          </a:solidFill>
+                          <a:effectLst/>
+                          <a:latin typeface="Agency FB" panose="020B0503020202020204" pitchFamily="34" charset="0"/>
+                          <a:ea typeface="+mn-ea"/>
+                          <a:cs typeface="+mn-cs"/>
+                        </a:rPr>
+                        <a:t>RNF005 Requisito de Padrões -  </a:t>
+                      </a:r>
+                      <a:r>
+                        <a:rPr lang="pt-BR" sz="1800" b="0" kern="1200" dirty="0">
                           <a:solidFill>
                             <a:srgbClr val="DBA1A1"/>
                           </a:solidFill>
@@ -8694,12 +8043,79 @@
                           <a:ea typeface="+mn-ea"/>
                           <a:cs typeface="+mn-cs"/>
                         </a:rPr>
-                        <a:t>Deve ter um botão cancelar para a ação de edição.</a:t>
+                        <a:t>O projeto deve seguir o padrão de Projeto Orientado a Domínio, deve seguir os padrões de codificação utilizados e sugeridos pela Microsoft disponível em sua documentação oficial.</a:t>
                       </a:r>
                     </a:p>
+                  </a:txBody>
+                  <a:tcPr>
+                    <a:lnL w="12700" cap="flat" cmpd="sng" algn="ctr">
+                      <a:noFill/>
+                      <a:prstDash val="solid"/>
+                      <a:round/>
+                      <a:headEnd type="none" w="med" len="med"/>
+                      <a:tailEnd type="none" w="med" len="med"/>
+                    </a:lnL>
+                    <a:lnR w="12700" cap="flat" cmpd="sng" algn="ctr">
+                      <a:noFill/>
+                      <a:prstDash val="solid"/>
+                      <a:round/>
+                      <a:headEnd type="none" w="med" len="med"/>
+                      <a:tailEnd type="none" w="med" len="med"/>
+                    </a:lnR>
+                    <a:lnT w="12700" cap="flat" cmpd="sng" algn="ctr">
+                      <a:noFill/>
+                      <a:prstDash val="solid"/>
+                      <a:round/>
+                      <a:headEnd type="none" w="med" len="med"/>
+                      <a:tailEnd type="none" w="med" len="med"/>
+                    </a:lnT>
+                    <a:lnB w="12700" cap="flat" cmpd="sng" algn="ctr">
+                      <a:noFill/>
+                      <a:prstDash val="solid"/>
+                      <a:round/>
+                      <a:headEnd type="none" w="med" len="med"/>
+                      <a:tailEnd type="none" w="med" len="med"/>
+                    </a:lnB>
+                    <a:lnTlToBr w="12700" cmpd="sng">
+                      <a:noFill/>
+                      <a:prstDash val="solid"/>
+                    </a:lnTlToBr>
+                    <a:lnBlToTr w="12700" cmpd="sng">
+                      <a:noFill/>
+                      <a:prstDash val="solid"/>
+                    </a:lnBlToTr>
+                    <a:solidFill>
+                      <a:srgbClr val="5B616F"/>
+                    </a:solidFill>
+                  </a:tcPr>
+                </a:tc>
+                <a:extLst>
+                  <a:ext uri="{0D108BD9-81ED-4DB2-BD59-A6C34878D82A}">
+                    <a16:rowId xmlns:a16="http://schemas.microsoft.com/office/drawing/2014/main" val="486538524"/>
+                  </a:ext>
+                </a:extLst>
+              </a:tr>
+              <a:tr h="407087">
+                <a:tc>
+                  <a:txBody>
+                    <a:bodyPr/>
+                    <a:lstStyle/>
                     <a:p>
+                      <a:pPr algn="just"/>
                       <a:r>
-                        <a:rPr lang="pt-BR" sz="1800" kern="1200" dirty="0">
+                        <a:rPr lang="pt-BR" sz="1800" b="1" kern="1200" dirty="0">
+                          <a:solidFill>
+                            <a:srgbClr val="9BD4BA"/>
+                          </a:solidFill>
+                          <a:effectLst/>
+                          <a:latin typeface="Agency FB" panose="020B0503020202020204" pitchFamily="34" charset="0"/>
+                          <a:ea typeface="+mn-ea"/>
+                          <a:cs typeface="+mn-cs"/>
+                        </a:rPr>
+                        <a:t>RNF006 Requisito de Hardware e Software -  </a:t>
+                      </a:r>
+                      <a:r>
+                        <a:rPr lang="pt-BR" sz="1800" b="0" kern="1200" dirty="0">
                           <a:solidFill>
                             <a:srgbClr val="DBA1A1"/>
                           </a:solidFill>
@@ -8708,12 +8124,79 @@
                           <a:ea typeface="+mn-ea"/>
                           <a:cs typeface="+mn-cs"/>
                         </a:rPr>
-                        <a:t>- Ao clicar em cancelar a tela de edição deve ser encerrada. 	Usabilidade/Segurança</a:t>
+                        <a:t>O requisito mínimo de hardware para aplicação cliente de ser um processador dual core ou superior, no mínimo 4 GB de memória e 128 GB de Disco Rígido. Software que será utilizado pelo sistema será o sistema operacional Windows 7 (32 ou 64 bits) ou superior dependendo da escolha do Hardware anterior.</a:t>
                       </a:r>
                     </a:p>
+                  </a:txBody>
+                  <a:tcPr>
+                    <a:lnL w="12700" cap="flat" cmpd="sng" algn="ctr">
+                      <a:noFill/>
+                      <a:prstDash val="solid"/>
+                      <a:round/>
+                      <a:headEnd type="none" w="med" len="med"/>
+                      <a:tailEnd type="none" w="med" len="med"/>
+                    </a:lnL>
+                    <a:lnR w="12700" cap="flat" cmpd="sng" algn="ctr">
+                      <a:noFill/>
+                      <a:prstDash val="solid"/>
+                      <a:round/>
+                      <a:headEnd type="none" w="med" len="med"/>
+                      <a:tailEnd type="none" w="med" len="med"/>
+                    </a:lnR>
+                    <a:lnT w="12700" cap="flat" cmpd="sng" algn="ctr">
+                      <a:noFill/>
+                      <a:prstDash val="solid"/>
+                      <a:round/>
+                      <a:headEnd type="none" w="med" len="med"/>
+                      <a:tailEnd type="none" w="med" len="med"/>
+                    </a:lnT>
+                    <a:lnB w="12700" cap="flat" cmpd="sng" algn="ctr">
+                      <a:noFill/>
+                      <a:prstDash val="solid"/>
+                      <a:round/>
+                      <a:headEnd type="none" w="med" len="med"/>
+                      <a:tailEnd type="none" w="med" len="med"/>
+                    </a:lnB>
+                    <a:lnTlToBr w="12700" cmpd="sng">
+                      <a:noFill/>
+                      <a:prstDash val="solid"/>
+                    </a:lnTlToBr>
+                    <a:lnBlToTr w="12700" cmpd="sng">
+                      <a:noFill/>
+                      <a:prstDash val="solid"/>
+                    </a:lnBlToTr>
+                    <a:solidFill>
+                      <a:srgbClr val="5B616F"/>
+                    </a:solidFill>
+                  </a:tcPr>
+                </a:tc>
+                <a:extLst>
+                  <a:ext uri="{0D108BD9-81ED-4DB2-BD59-A6C34878D82A}">
+                    <a16:rowId xmlns:a16="http://schemas.microsoft.com/office/drawing/2014/main" val="3582787433"/>
+                  </a:ext>
+                </a:extLst>
+              </a:tr>
+              <a:tr h="407087">
+                <a:tc>
+                  <a:txBody>
+                    <a:bodyPr/>
+                    <a:lstStyle/>
                     <a:p>
+                      <a:pPr algn="just"/>
                       <a:r>
-                        <a:rPr lang="pt-BR" sz="1800" kern="1200" dirty="0">
+                        <a:rPr lang="pt-BR" sz="1800" b="1" kern="1200" dirty="0">
+                          <a:solidFill>
+                            <a:srgbClr val="9BD4BA"/>
+                          </a:solidFill>
+                          <a:effectLst/>
+                          <a:latin typeface="Agency FB" panose="020B0503020202020204" pitchFamily="34" charset="0"/>
+                          <a:ea typeface="+mn-ea"/>
+                          <a:cs typeface="+mn-cs"/>
+                        </a:rPr>
+                        <a:t>RNF007 Requisito de Organizacional -  </a:t>
+                      </a:r>
+                      <a:r>
+                        <a:rPr lang="pt-BR" sz="1800" b="0" kern="1200" dirty="0">
                           <a:solidFill>
                             <a:srgbClr val="DBA1A1"/>
                           </a:solidFill>
@@ -8722,7 +8205,7 @@
                           <a:ea typeface="+mn-ea"/>
                           <a:cs typeface="+mn-cs"/>
                         </a:rPr>
-                        <a:t>	Obrigatório</a:t>
+                        <a:t>Quando o sistema for homologado pelo cliente fica a critério alocação de recursos para efetuar treinamento. A documentação deve ser entregue para o cliente em uma versão digital junto com a instalação do sistema.</a:t>
                       </a:r>
                     </a:p>
                   </a:txBody>
@@ -8770,28 +8253,31 @@
                 </a:tc>
                 <a:extLst>
                   <a:ext uri="{0D108BD9-81ED-4DB2-BD59-A6C34878D82A}">
-                    <a16:rowId xmlns:a16="http://schemas.microsoft.com/office/drawing/2014/main" val="1646411524"/>
+                    <a16:rowId xmlns:a16="http://schemas.microsoft.com/office/drawing/2014/main" val="2610096705"/>
                   </a:ext>
                 </a:extLst>
               </a:tr>
-              <a:tr h="370840">
-                <a:tc vMerge="1">
-                  <a:txBody>
-                    <a:bodyPr/>
-                    <a:lstStyle/>
-                    <a:p>
-                      <a:endParaRPr lang="pt-BR" dirty="0"/>
-                    </a:p>
-                  </a:txBody>
-                  <a:tcPr/>
-                </a:tc>
+              <a:tr h="407087">
                 <a:tc>
                   <a:txBody>
                     <a:bodyPr/>
                     <a:lstStyle/>
                     <a:p>
+                      <a:pPr algn="just"/>
                       <a:r>
-                        <a:rPr lang="pt-BR" sz="1800" kern="1200" dirty="0">
+                        <a:rPr lang="pt-BR" sz="1800" b="1" kern="1200" dirty="0">
+                          <a:solidFill>
+                            <a:srgbClr val="9BD4BA"/>
+                          </a:solidFill>
+                          <a:effectLst/>
+                          <a:latin typeface="Agency FB" panose="020B0503020202020204" pitchFamily="34" charset="0"/>
+                          <a:ea typeface="+mn-ea"/>
+                          <a:cs typeface="+mn-cs"/>
+                        </a:rPr>
+                        <a:t>RNF008 Requisito de Interface -  </a:t>
+                      </a:r>
+                      <a:r>
+                        <a:rPr lang="pt-BR" sz="1800" b="0" kern="1200" dirty="0">
                           <a:solidFill>
                             <a:srgbClr val="DBA1A1"/>
                           </a:solidFill>
@@ -8800,12 +8286,79 @@
                           <a:ea typeface="+mn-ea"/>
                           <a:cs typeface="+mn-cs"/>
                         </a:rPr>
-                        <a:t>O ID deve estar na tela de edição.</a:t>
+                        <a:t>A interface deve conter o logo da empresa desenvolvedora e conter elementos do logo do cliente.</a:t>
                       </a:r>
                     </a:p>
+                  </a:txBody>
+                  <a:tcPr>
+                    <a:lnL w="12700" cap="flat" cmpd="sng" algn="ctr">
+                      <a:noFill/>
+                      <a:prstDash val="solid"/>
+                      <a:round/>
+                      <a:headEnd type="none" w="med" len="med"/>
+                      <a:tailEnd type="none" w="med" len="med"/>
+                    </a:lnL>
+                    <a:lnR w="12700" cap="flat" cmpd="sng" algn="ctr">
+                      <a:noFill/>
+                      <a:prstDash val="solid"/>
+                      <a:round/>
+                      <a:headEnd type="none" w="med" len="med"/>
+                      <a:tailEnd type="none" w="med" len="med"/>
+                    </a:lnR>
+                    <a:lnT w="12700" cap="flat" cmpd="sng" algn="ctr">
+                      <a:noFill/>
+                      <a:prstDash val="solid"/>
+                      <a:round/>
+                      <a:headEnd type="none" w="med" len="med"/>
+                      <a:tailEnd type="none" w="med" len="med"/>
+                    </a:lnT>
+                    <a:lnB w="12700" cap="flat" cmpd="sng" algn="ctr">
+                      <a:noFill/>
+                      <a:prstDash val="solid"/>
+                      <a:round/>
+                      <a:headEnd type="none" w="med" len="med"/>
+                      <a:tailEnd type="none" w="med" len="med"/>
+                    </a:lnB>
+                    <a:lnTlToBr w="12700" cmpd="sng">
+                      <a:noFill/>
+                      <a:prstDash val="solid"/>
+                    </a:lnTlToBr>
+                    <a:lnBlToTr w="12700" cmpd="sng">
+                      <a:noFill/>
+                      <a:prstDash val="solid"/>
+                    </a:lnBlToTr>
+                    <a:solidFill>
+                      <a:srgbClr val="5B616F"/>
+                    </a:solidFill>
+                  </a:tcPr>
+                </a:tc>
+                <a:extLst>
+                  <a:ext uri="{0D108BD9-81ED-4DB2-BD59-A6C34878D82A}">
+                    <a16:rowId xmlns:a16="http://schemas.microsoft.com/office/drawing/2014/main" val="1711099084"/>
+                  </a:ext>
+                </a:extLst>
+              </a:tr>
+              <a:tr h="407087">
+                <a:tc>
+                  <a:txBody>
+                    <a:bodyPr/>
+                    <a:lstStyle/>
                     <a:p>
+                      <a:pPr algn="just"/>
                       <a:r>
-                        <a:rPr lang="pt-BR" sz="1800" kern="1200" dirty="0">
+                        <a:rPr lang="pt-BR" sz="1800" b="1" kern="1200" dirty="0">
+                          <a:solidFill>
+                            <a:srgbClr val="9BD4BA"/>
+                          </a:solidFill>
+                          <a:effectLst/>
+                          <a:latin typeface="Agency FB" panose="020B0503020202020204" pitchFamily="34" charset="0"/>
+                          <a:ea typeface="+mn-ea"/>
+                          <a:cs typeface="+mn-cs"/>
+                        </a:rPr>
+                        <a:t>RNF009 Login -  </a:t>
+                      </a:r>
+                      <a:r>
+                        <a:rPr lang="pt-BR" sz="1800" b="0" kern="1200" dirty="0">
                           <a:solidFill>
                             <a:srgbClr val="DBA1A1"/>
                           </a:solidFill>
@@ -8814,42 +8367,8 @@
                           <a:ea typeface="+mn-ea"/>
                           <a:cs typeface="+mn-cs"/>
                         </a:rPr>
-                        <a:t>-Na tela de edição, o ID do item que está sendo modificado deve estar aparecendo.</a:t>
+                        <a:t>O sistema precisa ter login para gerenciar o tipo de usuário.</a:t>
                       </a:r>
-                    </a:p>
-                    <a:p>
-                      <a:r>
-                        <a:rPr lang="pt-BR" sz="1800" kern="1200" dirty="0">
-                          <a:solidFill>
-                            <a:srgbClr val="DBA1A1"/>
-                          </a:solidFill>
-                          <a:effectLst/>
-                          <a:latin typeface="Agency FB" panose="020B0503020202020204" pitchFamily="34" charset="0"/>
-                          <a:ea typeface="+mn-ea"/>
-                          <a:cs typeface="+mn-cs"/>
-                        </a:rPr>
-                        <a:t>	Sistema/Usabilidade</a:t>
-                      </a:r>
-                    </a:p>
-                    <a:p>
-                      <a:r>
-                        <a:rPr lang="pt-BR" sz="1800" kern="1200" dirty="0">
-                          <a:solidFill>
-                            <a:srgbClr val="DBA1A1"/>
-                          </a:solidFill>
-                          <a:effectLst/>
-                          <a:latin typeface="Agency FB" panose="020B0503020202020204" pitchFamily="34" charset="0"/>
-                          <a:ea typeface="+mn-ea"/>
-                          <a:cs typeface="+mn-cs"/>
-                        </a:rPr>
-                        <a:t>	Obrigatório</a:t>
-                      </a:r>
-                      <a:endParaRPr lang="pt-BR" dirty="0">
-                        <a:solidFill>
-                          <a:srgbClr val="DBA1A1"/>
-                        </a:solidFill>
-                        <a:latin typeface="Agency FB" panose="020B0503020202020204" pitchFamily="34" charset="0"/>
-                      </a:endParaRPr>
                     </a:p>
                   </a:txBody>
                   <a:tcPr>
@@ -8896,7 +8415,7 @@
                 </a:tc>
                 <a:extLst>
                   <a:ext uri="{0D108BD9-81ED-4DB2-BD59-A6C34878D82A}">
-                    <a16:rowId xmlns:a16="http://schemas.microsoft.com/office/drawing/2014/main" val="1030401757"/>
+                    <a16:rowId xmlns:a16="http://schemas.microsoft.com/office/drawing/2014/main" val="2077366541"/>
                   </a:ext>
                 </a:extLst>
               </a:tr>
@@ -8907,7 +8426,7 @@
     </p:spTree>
     <p:extLst>
       <p:ext uri="{BB962C8B-B14F-4D97-AF65-F5344CB8AC3E}">
-        <p14:creationId xmlns:p14="http://schemas.microsoft.com/office/powerpoint/2010/main" val="3432435199"/>
+        <p14:creationId xmlns:p14="http://schemas.microsoft.com/office/powerpoint/2010/main" val="3791127397"/>
       </p:ext>
     </p:extLst>
   </p:cSld>
@@ -9039,7 +8558,7 @@
                 </a:solidFill>
                 <a:latin typeface="Agency FB" panose="020B0503020202020204" pitchFamily="34" charset="0"/>
               </a:rPr>
-              <a:t>Requisitos Funcionais e Não Funcionais</a:t>
+              <a:t>Requisitos de Domínio</a:t>
             </a:r>
           </a:p>
         </p:txBody>
@@ -9059,14 +8578,14 @@
           <p:nvPr>
             <p:extLst>
               <p:ext uri="{D42A27DB-BD31-4B8C-83A1-F6EECF244321}">
-                <p14:modId xmlns:p14="http://schemas.microsoft.com/office/powerpoint/2010/main" val="1312909266"/>
+                <p14:modId xmlns:p14="http://schemas.microsoft.com/office/powerpoint/2010/main" val="1218124521"/>
               </p:ext>
             </p:extLst>
           </p:nvPr>
         </p:nvGraphicFramePr>
         <p:xfrm>
-          <a:off x="946118" y="1631673"/>
-          <a:ext cx="10853490" cy="4485640"/>
+          <a:off x="735461" y="2564768"/>
+          <a:ext cx="11274804" cy="2369901"/>
         </p:xfrm>
         <a:graphic>
           <a:graphicData uri="http://schemas.openxmlformats.org/drawingml/2006/table">
@@ -9075,153 +8594,35 @@
                 <a:tableStyleId>{5C22544A-7EE6-4342-B048-85BDC9FD1C3A}</a:tableStyleId>
               </a:tblPr>
               <a:tblGrid>
-                <a:gridCol w="5426745">
+                <a:gridCol w="11274804">
                   <a:extLst>
                     <a:ext uri="{9D8B030D-6E8A-4147-A177-3AD203B41FA5}">
                       <a16:colId xmlns:a16="http://schemas.microsoft.com/office/drawing/2014/main" val="2504239251"/>
                     </a:ext>
                   </a:extLst>
                 </a:gridCol>
-                <a:gridCol w="5426745">
-                  <a:extLst>
-                    <a:ext uri="{9D8B030D-6E8A-4147-A177-3AD203B41FA5}">
-                      <a16:colId xmlns:a16="http://schemas.microsoft.com/office/drawing/2014/main" val="354975263"/>
-                    </a:ext>
-                  </a:extLst>
-                </a:gridCol>
               </a:tblGrid>
-              <a:tr h="370840">
+              <a:tr h="375793">
                 <a:tc>
                   <a:txBody>
                     <a:bodyPr/>
                     <a:lstStyle/>
                     <a:p>
+                      <a:pPr algn="just"/>
                       <a:r>
-                        <a:rPr lang="pt-BR" dirty="0">
+                        <a:rPr lang="pt-BR" sz="1800" b="1" kern="1200" dirty="0">
                           <a:solidFill>
-                            <a:srgbClr val="DBA1A1"/>
+                            <a:srgbClr val="9BD4BA"/>
                           </a:solidFill>
+                          <a:effectLst/>
                           <a:latin typeface="Agency FB" panose="020B0503020202020204" pitchFamily="34" charset="0"/>
+                          <a:ea typeface="+mn-ea"/>
+                          <a:cs typeface="+mn-cs"/>
                         </a:rPr>
-                        <a:t>Funcional</a:t>
+                        <a:t>RD001 Dias da Semana -  </a:t>
                       </a:r>
-                    </a:p>
-                  </a:txBody>
-                  <a:tcPr>
-                    <a:lnL w="12700" cap="flat" cmpd="sng" algn="ctr">
-                      <a:noFill/>
-                      <a:prstDash val="solid"/>
-                      <a:round/>
-                      <a:headEnd type="none" w="med" len="med"/>
-                      <a:tailEnd type="none" w="med" len="med"/>
-                    </a:lnL>
-                    <a:lnR w="12700" cap="flat" cmpd="sng" algn="ctr">
-                      <a:noFill/>
-                      <a:prstDash val="solid"/>
-                      <a:round/>
-                      <a:headEnd type="none" w="med" len="med"/>
-                      <a:tailEnd type="none" w="med" len="med"/>
-                    </a:lnR>
-                    <a:lnT w="12700" cap="flat" cmpd="sng" algn="ctr">
-                      <a:noFill/>
-                      <a:prstDash val="solid"/>
-                      <a:round/>
-                      <a:headEnd type="none" w="med" len="med"/>
-                      <a:tailEnd type="none" w="med" len="med"/>
-                    </a:lnT>
-                    <a:lnB w="12700" cap="flat" cmpd="sng" algn="ctr">
-                      <a:noFill/>
-                      <a:prstDash val="solid"/>
-                      <a:round/>
-                      <a:headEnd type="none" w="med" len="med"/>
-                      <a:tailEnd type="none" w="med" len="med"/>
-                    </a:lnB>
-                    <a:lnTlToBr w="12700" cmpd="sng">
-                      <a:noFill/>
-                      <a:prstDash val="solid"/>
-                    </a:lnTlToBr>
-                    <a:lnBlToTr w="12700" cmpd="sng">
-                      <a:noFill/>
-                      <a:prstDash val="solid"/>
-                    </a:lnBlToTr>
-                    <a:solidFill>
-                      <a:srgbClr val="5B616F"/>
-                    </a:solidFill>
-                  </a:tcPr>
-                </a:tc>
-                <a:tc>
-                  <a:txBody>
-                    <a:bodyPr/>
-                    <a:lstStyle/>
-                    <a:p>
                       <a:r>
-                        <a:rPr lang="pt-BR" dirty="0">
-                          <a:solidFill>
-                            <a:srgbClr val="DBA1A1"/>
-                          </a:solidFill>
-                          <a:latin typeface="Agency FB" panose="020B0503020202020204" pitchFamily="34" charset="0"/>
-                        </a:rPr>
-                        <a:t>Não Funcional</a:t>
-                      </a:r>
-                    </a:p>
-                  </a:txBody>
-                  <a:tcPr>
-                    <a:lnL w="12700" cap="flat" cmpd="sng" algn="ctr">
-                      <a:noFill/>
-                      <a:prstDash val="solid"/>
-                      <a:round/>
-                      <a:headEnd type="none" w="med" len="med"/>
-                      <a:tailEnd type="none" w="med" len="med"/>
-                    </a:lnL>
-                    <a:lnR w="12700" cap="flat" cmpd="sng" algn="ctr">
-                      <a:noFill/>
-                      <a:prstDash val="solid"/>
-                      <a:round/>
-                      <a:headEnd type="none" w="med" len="med"/>
-                      <a:tailEnd type="none" w="med" len="med"/>
-                    </a:lnR>
-                    <a:lnT w="12700" cap="flat" cmpd="sng" algn="ctr">
-                      <a:noFill/>
-                      <a:prstDash val="solid"/>
-                      <a:round/>
-                      <a:headEnd type="none" w="med" len="med"/>
-                      <a:tailEnd type="none" w="med" len="med"/>
-                    </a:lnT>
-                    <a:lnB w="12700" cap="flat" cmpd="sng" algn="ctr">
-                      <a:noFill/>
-                      <a:prstDash val="solid"/>
-                      <a:round/>
-                      <a:headEnd type="none" w="med" len="med"/>
-                      <a:tailEnd type="none" w="med" len="med"/>
-                    </a:lnB>
-                    <a:lnTlToBr w="12700" cmpd="sng">
-                      <a:noFill/>
-                      <a:prstDash val="solid"/>
-                    </a:lnTlToBr>
-                    <a:lnBlToTr w="12700" cmpd="sng">
-                      <a:noFill/>
-                      <a:prstDash val="solid"/>
-                    </a:lnBlToTr>
-                    <a:solidFill>
-                      <a:srgbClr val="5B616F"/>
-                    </a:solidFill>
-                  </a:tcPr>
-                </a:tc>
-                <a:extLst>
-                  <a:ext uri="{0D108BD9-81ED-4DB2-BD59-A6C34878D82A}">
-                    <a16:rowId xmlns:a16="http://schemas.microsoft.com/office/drawing/2014/main" val="2395872218"/>
-                  </a:ext>
-                </a:extLst>
-              </a:tr>
-              <a:tr h="370840">
-                <a:tc rowSpan="3">
-                  <a:txBody>
-                    <a:bodyPr/>
-                    <a:lstStyle/>
-                    <a:p>
-                      <a:pPr algn="l"/>
-                      <a:r>
-                        <a:rPr lang="pt-BR" sz="1800" kern="1200" dirty="0">
+                        <a:rPr lang="pt-BR" sz="1800" b="0" kern="1200" dirty="0">
                           <a:solidFill>
                             <a:srgbClr val="DBA1A1"/>
                           </a:solidFill>
@@ -9230,176 +8631,8 @@
                           <a:ea typeface="+mn-ea"/>
                           <a:cs typeface="+mn-cs"/>
                         </a:rPr>
-                        <a:t>Excluir -  O usuário poderá excluir os registros.</a:t>
+                        <a:t>Deve conter um código (identificador único), um nome (segunda, terça…).</a:t>
                       </a:r>
-                      <a:endParaRPr lang="pt-BR" dirty="0">
-                        <a:solidFill>
-                          <a:srgbClr val="DBA1A1"/>
-                        </a:solidFill>
-                        <a:latin typeface="Agency FB" panose="020B0503020202020204" pitchFamily="34" charset="0"/>
-                      </a:endParaRPr>
-                    </a:p>
-                  </a:txBody>
-                  <a:tcPr>
-                    <a:lnL w="12700" cap="flat" cmpd="sng" algn="ctr">
-                      <a:noFill/>
-                      <a:prstDash val="solid"/>
-                      <a:round/>
-                      <a:headEnd type="none" w="med" len="med"/>
-                      <a:tailEnd type="none" w="med" len="med"/>
-                    </a:lnL>
-                    <a:lnR w="12700" cap="flat" cmpd="sng" algn="ctr">
-                      <a:noFill/>
-                      <a:prstDash val="solid"/>
-                      <a:round/>
-                      <a:headEnd type="none" w="med" len="med"/>
-                      <a:tailEnd type="none" w="med" len="med"/>
-                    </a:lnR>
-                    <a:lnT w="12700" cap="flat" cmpd="sng" algn="ctr">
-                      <a:noFill/>
-                      <a:prstDash val="solid"/>
-                      <a:round/>
-                      <a:headEnd type="none" w="med" len="med"/>
-                      <a:tailEnd type="none" w="med" len="med"/>
-                    </a:lnT>
-                    <a:lnB w="12700" cap="flat" cmpd="sng" algn="ctr">
-                      <a:noFill/>
-                      <a:prstDash val="solid"/>
-                      <a:round/>
-                      <a:headEnd type="none" w="med" len="med"/>
-                      <a:tailEnd type="none" w="med" len="med"/>
-                    </a:lnB>
-                    <a:lnTlToBr w="12700" cmpd="sng">
-                      <a:noFill/>
-                      <a:prstDash val="solid"/>
-                    </a:lnTlToBr>
-                    <a:lnBlToTr w="12700" cmpd="sng">
-                      <a:noFill/>
-                      <a:prstDash val="solid"/>
-                    </a:lnBlToTr>
-                    <a:solidFill>
-                      <a:srgbClr val="5B616F"/>
-                    </a:solidFill>
-                  </a:tcPr>
-                </a:tc>
-                <a:tc>
-                  <a:txBody>
-                    <a:bodyPr/>
-                    <a:lstStyle/>
-                    <a:p>
-                      <a:pPr marL="0" marR="0" lvl="0" indent="0" algn="l" defTabSz="914400" rtl="0" eaLnBrk="1" fontAlgn="auto" latinLnBrk="0" hangingPunct="1">
-                        <a:lnSpc>
-                          <a:spcPct val="100000"/>
-                        </a:lnSpc>
-                        <a:spcBef>
-                          <a:spcPts val="0"/>
-                        </a:spcBef>
-                        <a:spcAft>
-                          <a:spcPts val="0"/>
-                        </a:spcAft>
-                        <a:buClrTx/>
-                        <a:buSzTx/>
-                        <a:buFontTx/>
-                        <a:buNone/>
-                        <a:tabLst/>
-                        <a:defRPr/>
-                      </a:pPr>
-                      <a:r>
-                        <a:rPr lang="pt-BR" sz="1800" kern="1200" dirty="0">
-                          <a:solidFill>
-                            <a:srgbClr val="DBA1A1"/>
-                          </a:solidFill>
-                          <a:effectLst/>
-                          <a:latin typeface="Agency FB" panose="020B0503020202020204" pitchFamily="34" charset="0"/>
-                          <a:ea typeface="+mn-ea"/>
-                          <a:cs typeface="+mn-cs"/>
-                        </a:rPr>
-                        <a:t>Deve haver um botão com a função de excluir o item selecionado na tela de pesquisa.</a:t>
-                      </a:r>
-                    </a:p>
-                    <a:p>
-                      <a:pPr marL="285750" marR="0" lvl="0" indent="-285750" algn="l" defTabSz="914400" rtl="0" eaLnBrk="1" fontAlgn="auto" latinLnBrk="0" hangingPunct="1">
-                        <a:lnSpc>
-                          <a:spcPct val="100000"/>
-                        </a:lnSpc>
-                        <a:spcBef>
-                          <a:spcPts val="0"/>
-                        </a:spcBef>
-                        <a:spcAft>
-                          <a:spcPts val="0"/>
-                        </a:spcAft>
-                        <a:buClrTx/>
-                        <a:buSzTx/>
-                        <a:buFontTx/>
-                        <a:buChar char="-"/>
-                        <a:tabLst/>
-                        <a:defRPr/>
-                      </a:pPr>
-                      <a:r>
-                        <a:rPr lang="pt-BR" sz="1800" kern="1200" dirty="0">
-                          <a:solidFill>
-                            <a:srgbClr val="DBA1A1"/>
-                          </a:solidFill>
-                          <a:effectLst/>
-                          <a:latin typeface="Agency FB" panose="020B0503020202020204" pitchFamily="34" charset="0"/>
-                          <a:ea typeface="+mn-ea"/>
-                          <a:cs typeface="+mn-cs"/>
-                        </a:rPr>
-                        <a:t>Somente para o(a) nutricionista.</a:t>
-                      </a:r>
-                    </a:p>
-                    <a:p>
-                      <a:pPr marL="0" marR="0" lvl="0" indent="0" algn="l" defTabSz="914400" rtl="0" eaLnBrk="1" fontAlgn="auto" latinLnBrk="0" hangingPunct="1">
-                        <a:lnSpc>
-                          <a:spcPct val="100000"/>
-                        </a:lnSpc>
-                        <a:spcBef>
-                          <a:spcPts val="0"/>
-                        </a:spcBef>
-                        <a:spcAft>
-                          <a:spcPts val="0"/>
-                        </a:spcAft>
-                        <a:buClrTx/>
-                        <a:buSzTx/>
-                        <a:buFontTx/>
-                        <a:buNone/>
-                        <a:tabLst/>
-                        <a:defRPr/>
-                      </a:pPr>
-                      <a:r>
-                        <a:rPr lang="pt-BR" sz="1800" kern="1200" dirty="0">
-                          <a:solidFill>
-                            <a:srgbClr val="DBA1A1"/>
-                          </a:solidFill>
-                          <a:effectLst/>
-                          <a:latin typeface="Agency FB" panose="020B0503020202020204" pitchFamily="34" charset="0"/>
-                          <a:ea typeface="+mn-ea"/>
-                          <a:cs typeface="+mn-cs"/>
-                        </a:rPr>
-                        <a:t>	Usabilidade/Segurança</a:t>
-                      </a:r>
-                    </a:p>
-                    <a:p>
-                      <a:r>
-                        <a:rPr lang="pt-BR" sz="1800" kern="1200" dirty="0">
-                          <a:solidFill>
-                            <a:srgbClr val="DBA1A1"/>
-                          </a:solidFill>
-                          <a:effectLst/>
-                          <a:latin typeface="Agency FB" panose="020B0503020202020204" pitchFamily="34" charset="0"/>
-                          <a:ea typeface="+mn-ea"/>
-                          <a:cs typeface="+mn-cs"/>
-                        </a:rPr>
-                        <a:t>	Obrigatório</a:t>
-                      </a:r>
-                    </a:p>
-                    <a:p>
-                      <a:endParaRPr lang="pt-BR" dirty="0">
-                        <a:solidFill>
-                          <a:srgbClr val="DBA1A1"/>
-                        </a:solidFill>
-                        <a:latin typeface="Agency FB" panose="020B0503020202020204" pitchFamily="34" charset="0"/>
-                      </a:endParaRPr>
                     </a:p>
                   </a:txBody>
                   <a:tcPr>
@@ -9450,24 +8683,27 @@
                   </a:ext>
                 </a:extLst>
               </a:tr>
-              <a:tr h="370840">
-                <a:tc vMerge="1">
-                  <a:txBody>
-                    <a:bodyPr/>
-                    <a:lstStyle/>
-                    <a:p>
-                      <a:endParaRPr lang="pt-BR" dirty="0"/>
-                    </a:p>
-                  </a:txBody>
-                  <a:tcPr/>
-                </a:tc>
+              <a:tr h="293615">
                 <a:tc>
                   <a:txBody>
                     <a:bodyPr/>
                     <a:lstStyle/>
                     <a:p>
+                      <a:pPr algn="just"/>
                       <a:r>
-                        <a:rPr lang="pt-BR" sz="1800" kern="1200" dirty="0">
+                        <a:rPr lang="pt-BR" sz="1800" b="1" kern="1200" dirty="0">
+                          <a:solidFill>
+                            <a:srgbClr val="9BD4BA"/>
+                          </a:solidFill>
+                          <a:effectLst/>
+                          <a:latin typeface="Agency FB" panose="020B0503020202020204" pitchFamily="34" charset="0"/>
+                          <a:ea typeface="+mn-ea"/>
+                          <a:cs typeface="+mn-cs"/>
+                        </a:rPr>
+                        <a:t>RD002 Dieta -  </a:t>
+                      </a:r>
+                      <a:r>
+                        <a:rPr lang="pt-BR" sz="1800" b="0" kern="1200" dirty="0">
                           <a:solidFill>
                             <a:srgbClr val="DBA1A1"/>
                           </a:solidFill>
@@ -9476,12 +8712,79 @@
                           <a:ea typeface="+mn-ea"/>
                           <a:cs typeface="+mn-cs"/>
                         </a:rPr>
-                        <a:t>A cor do botão deve se destacar.</a:t>
+                        <a:t>Deve conter um código (identificador único), um nome, descrição, porções de alimento e usuários.</a:t>
                       </a:r>
                     </a:p>
+                  </a:txBody>
+                  <a:tcPr>
+                    <a:lnL w="12700" cap="flat" cmpd="sng" algn="ctr">
+                      <a:noFill/>
+                      <a:prstDash val="solid"/>
+                      <a:round/>
+                      <a:headEnd type="none" w="med" len="med"/>
+                      <a:tailEnd type="none" w="med" len="med"/>
+                    </a:lnL>
+                    <a:lnR w="12700" cap="flat" cmpd="sng" algn="ctr">
+                      <a:noFill/>
+                      <a:prstDash val="solid"/>
+                      <a:round/>
+                      <a:headEnd type="none" w="med" len="med"/>
+                      <a:tailEnd type="none" w="med" len="med"/>
+                    </a:lnR>
+                    <a:lnT w="12700" cap="flat" cmpd="sng" algn="ctr">
+                      <a:noFill/>
+                      <a:prstDash val="solid"/>
+                      <a:round/>
+                      <a:headEnd type="none" w="med" len="med"/>
+                      <a:tailEnd type="none" w="med" len="med"/>
+                    </a:lnT>
+                    <a:lnB w="12700" cap="flat" cmpd="sng" algn="ctr">
+                      <a:noFill/>
+                      <a:prstDash val="solid"/>
+                      <a:round/>
+                      <a:headEnd type="none" w="med" len="med"/>
+                      <a:tailEnd type="none" w="med" len="med"/>
+                    </a:lnB>
+                    <a:lnTlToBr w="12700" cmpd="sng">
+                      <a:noFill/>
+                      <a:prstDash val="solid"/>
+                    </a:lnTlToBr>
+                    <a:lnBlToTr w="12700" cmpd="sng">
+                      <a:noFill/>
+                      <a:prstDash val="solid"/>
+                    </a:lnBlToTr>
+                    <a:solidFill>
+                      <a:srgbClr val="5B616F"/>
+                    </a:solidFill>
+                  </a:tcPr>
+                </a:tc>
+                <a:extLst>
+                  <a:ext uri="{0D108BD9-81ED-4DB2-BD59-A6C34878D82A}">
+                    <a16:rowId xmlns:a16="http://schemas.microsoft.com/office/drawing/2014/main" val="205031358"/>
+                  </a:ext>
+                </a:extLst>
+              </a:tr>
+              <a:tr h="407087">
+                <a:tc>
+                  <a:txBody>
+                    <a:bodyPr/>
+                    <a:lstStyle/>
                     <a:p>
+                      <a:pPr algn="just"/>
                       <a:r>
-                        <a:rPr lang="pt-BR" sz="1800" kern="1200" dirty="0">
+                        <a:rPr lang="pt-BR" sz="1800" b="1" kern="1200" dirty="0">
+                          <a:solidFill>
+                            <a:srgbClr val="9BD4BA"/>
+                          </a:solidFill>
+                          <a:effectLst/>
+                          <a:latin typeface="Agency FB" panose="020B0503020202020204" pitchFamily="34" charset="0"/>
+                          <a:ea typeface="+mn-ea"/>
+                          <a:cs typeface="+mn-cs"/>
+                        </a:rPr>
+                        <a:t>RD003 Perfil -  </a:t>
+                      </a:r>
+                      <a:r>
+                        <a:rPr lang="pt-BR" sz="1800" b="0" kern="1200" dirty="0">
                           <a:solidFill>
                             <a:srgbClr val="DBA1A1"/>
                           </a:solidFill>
@@ -9490,12 +8793,79 @@
                           <a:ea typeface="+mn-ea"/>
                           <a:cs typeface="+mn-cs"/>
                         </a:rPr>
-                        <a:t>- O texto do botão deve ser legível. </a:t>
+                        <a:t>Deve conter um código (identificador único), um nome, descrição e usuários que possuem o perfil (Paciente, nutricionista).</a:t>
                       </a:r>
                     </a:p>
+                  </a:txBody>
+                  <a:tcPr>
+                    <a:lnL w="12700" cap="flat" cmpd="sng" algn="ctr">
+                      <a:noFill/>
+                      <a:prstDash val="solid"/>
+                      <a:round/>
+                      <a:headEnd type="none" w="med" len="med"/>
+                      <a:tailEnd type="none" w="med" len="med"/>
+                    </a:lnL>
+                    <a:lnR w="12700" cap="flat" cmpd="sng" algn="ctr">
+                      <a:noFill/>
+                      <a:prstDash val="solid"/>
+                      <a:round/>
+                      <a:headEnd type="none" w="med" len="med"/>
+                      <a:tailEnd type="none" w="med" len="med"/>
+                    </a:lnR>
+                    <a:lnT w="12700" cap="flat" cmpd="sng" algn="ctr">
+                      <a:noFill/>
+                      <a:prstDash val="solid"/>
+                      <a:round/>
+                      <a:headEnd type="none" w="med" len="med"/>
+                      <a:tailEnd type="none" w="med" len="med"/>
+                    </a:lnT>
+                    <a:lnB w="12700" cap="flat" cmpd="sng" algn="ctr">
+                      <a:noFill/>
+                      <a:prstDash val="solid"/>
+                      <a:round/>
+                      <a:headEnd type="none" w="med" len="med"/>
+                      <a:tailEnd type="none" w="med" len="med"/>
+                    </a:lnB>
+                    <a:lnTlToBr w="12700" cmpd="sng">
+                      <a:noFill/>
+                      <a:prstDash val="solid"/>
+                    </a:lnTlToBr>
+                    <a:lnBlToTr w="12700" cmpd="sng">
+                      <a:noFill/>
+                      <a:prstDash val="solid"/>
+                    </a:lnBlToTr>
+                    <a:solidFill>
+                      <a:srgbClr val="5B616F"/>
+                    </a:solidFill>
+                  </a:tcPr>
+                </a:tc>
+                <a:extLst>
+                  <a:ext uri="{0D108BD9-81ED-4DB2-BD59-A6C34878D82A}">
+                    <a16:rowId xmlns:a16="http://schemas.microsoft.com/office/drawing/2014/main" val="884950376"/>
+                  </a:ext>
+                </a:extLst>
+              </a:tr>
+              <a:tr h="407087">
+                <a:tc>
+                  <a:txBody>
+                    <a:bodyPr/>
+                    <a:lstStyle/>
                     <a:p>
+                      <a:pPr algn="just"/>
                       <a:r>
-                        <a:rPr lang="pt-BR" sz="1800" kern="1200" dirty="0">
+                        <a:rPr lang="pt-BR" sz="1800" b="1" kern="1200" dirty="0">
+                          <a:solidFill>
+                            <a:srgbClr val="9BD4BA"/>
+                          </a:solidFill>
+                          <a:effectLst/>
+                          <a:latin typeface="Agency FB" panose="020B0503020202020204" pitchFamily="34" charset="0"/>
+                          <a:ea typeface="+mn-ea"/>
+                          <a:cs typeface="+mn-cs"/>
+                        </a:rPr>
+                        <a:t>RD004 Porção de Alimento -  </a:t>
+                      </a:r>
+                      <a:r>
+                        <a:rPr lang="pt-BR" sz="1800" b="0" kern="1200" dirty="0">
                           <a:solidFill>
                             <a:srgbClr val="DBA1A1"/>
                           </a:solidFill>
@@ -9504,12 +8874,79 @@
                           <a:ea typeface="+mn-ea"/>
                           <a:cs typeface="+mn-cs"/>
                         </a:rPr>
-                        <a:t>	Usabilidade</a:t>
+                        <a:t>Deve conter um código (identificador único), um nome, descrição, os dias da semana e as refeições.</a:t>
                       </a:r>
                     </a:p>
+                  </a:txBody>
+                  <a:tcPr>
+                    <a:lnL w="12700" cap="flat" cmpd="sng" algn="ctr">
+                      <a:noFill/>
+                      <a:prstDash val="solid"/>
+                      <a:round/>
+                      <a:headEnd type="none" w="med" len="med"/>
+                      <a:tailEnd type="none" w="med" len="med"/>
+                    </a:lnL>
+                    <a:lnR w="12700" cap="flat" cmpd="sng" algn="ctr">
+                      <a:noFill/>
+                      <a:prstDash val="solid"/>
+                      <a:round/>
+                      <a:headEnd type="none" w="med" len="med"/>
+                      <a:tailEnd type="none" w="med" len="med"/>
+                    </a:lnR>
+                    <a:lnT w="12700" cap="flat" cmpd="sng" algn="ctr">
+                      <a:noFill/>
+                      <a:prstDash val="solid"/>
+                      <a:round/>
+                      <a:headEnd type="none" w="med" len="med"/>
+                      <a:tailEnd type="none" w="med" len="med"/>
+                    </a:lnT>
+                    <a:lnB w="12700" cap="flat" cmpd="sng" algn="ctr">
+                      <a:noFill/>
+                      <a:prstDash val="solid"/>
+                      <a:round/>
+                      <a:headEnd type="none" w="med" len="med"/>
+                      <a:tailEnd type="none" w="med" len="med"/>
+                    </a:lnB>
+                    <a:lnTlToBr w="12700" cmpd="sng">
+                      <a:noFill/>
+                      <a:prstDash val="solid"/>
+                    </a:lnTlToBr>
+                    <a:lnBlToTr w="12700" cmpd="sng">
+                      <a:noFill/>
+                      <a:prstDash val="solid"/>
+                    </a:lnBlToTr>
+                    <a:solidFill>
+                      <a:srgbClr val="5B616F"/>
+                    </a:solidFill>
+                  </a:tcPr>
+                </a:tc>
+                <a:extLst>
+                  <a:ext uri="{0D108BD9-81ED-4DB2-BD59-A6C34878D82A}">
+                    <a16:rowId xmlns:a16="http://schemas.microsoft.com/office/drawing/2014/main" val="3317817360"/>
+                  </a:ext>
+                </a:extLst>
+              </a:tr>
+              <a:tr h="407087">
+                <a:tc>
+                  <a:txBody>
+                    <a:bodyPr/>
+                    <a:lstStyle/>
                     <a:p>
+                      <a:pPr algn="just"/>
                       <a:r>
-                        <a:rPr lang="pt-BR" sz="1800" kern="1200" dirty="0">
+                        <a:rPr lang="pt-BR" sz="1800" b="1" kern="1200" dirty="0">
+                          <a:solidFill>
+                            <a:srgbClr val="9BD4BA"/>
+                          </a:solidFill>
+                          <a:effectLst/>
+                          <a:latin typeface="Agency FB" panose="020B0503020202020204" pitchFamily="34" charset="0"/>
+                          <a:ea typeface="+mn-ea"/>
+                          <a:cs typeface="+mn-cs"/>
+                        </a:rPr>
+                        <a:t>RD005 Refeição -  </a:t>
+                      </a:r>
+                      <a:r>
+                        <a:rPr lang="pt-BR" sz="1800" b="0" kern="1200" dirty="0">
                           <a:solidFill>
                             <a:srgbClr val="DBA1A1"/>
                           </a:solidFill>
@@ -9518,16 +8955,8 @@
                           <a:ea typeface="+mn-ea"/>
                           <a:cs typeface="+mn-cs"/>
                         </a:rPr>
-                        <a:t>	Desejável</a:t>
+                        <a:t>Deve conter um código (identificador único), um nome e uma descrição.</a:t>
                       </a:r>
-                    </a:p>
-                    <a:p>
-                      <a:endParaRPr lang="pt-BR" dirty="0">
-                        <a:solidFill>
-                          <a:srgbClr val="DBA1A1"/>
-                        </a:solidFill>
-                        <a:latin typeface="Agency FB" panose="020B0503020202020204" pitchFamily="34" charset="0"/>
-                      </a:endParaRPr>
                     </a:p>
                   </a:txBody>
                   <a:tcPr>
@@ -9574,28 +9003,31 @@
                 </a:tc>
                 <a:extLst>
                   <a:ext uri="{0D108BD9-81ED-4DB2-BD59-A6C34878D82A}">
-                    <a16:rowId xmlns:a16="http://schemas.microsoft.com/office/drawing/2014/main" val="2678225723"/>
+                    <a16:rowId xmlns:a16="http://schemas.microsoft.com/office/drawing/2014/main" val="486538524"/>
                   </a:ext>
                 </a:extLst>
               </a:tr>
-              <a:tr h="370840">
-                <a:tc vMerge="1">
-                  <a:txBody>
-                    <a:bodyPr/>
-                    <a:lstStyle/>
-                    <a:p>
-                      <a:endParaRPr lang="pt-BR" dirty="0"/>
-                    </a:p>
-                  </a:txBody>
-                  <a:tcPr/>
-                </a:tc>
+              <a:tr h="407087">
                 <a:tc>
                   <a:txBody>
                     <a:bodyPr/>
                     <a:lstStyle/>
                     <a:p>
+                      <a:pPr algn="just"/>
                       <a:r>
-                        <a:rPr lang="pt-BR" sz="1800" kern="1200" dirty="0">
+                        <a:rPr lang="pt-BR" sz="1800" b="1" kern="1200" dirty="0">
+                          <a:solidFill>
+                            <a:srgbClr val="9BD4BA"/>
+                          </a:solidFill>
+                          <a:effectLst/>
+                          <a:latin typeface="Agency FB" panose="020B0503020202020204" pitchFamily="34" charset="0"/>
+                          <a:ea typeface="+mn-ea"/>
+                          <a:cs typeface="+mn-cs"/>
+                        </a:rPr>
+                        <a:t>RD006 Usuário -  </a:t>
+                      </a:r>
+                      <a:r>
+                        <a:rPr lang="pt-BR" sz="1800" b="0" kern="1200" dirty="0">
                           <a:solidFill>
                             <a:srgbClr val="DBA1A1"/>
                           </a:solidFill>
@@ -9604,12 +9036,10 @@
                           <a:ea typeface="+mn-ea"/>
                           <a:cs typeface="+mn-cs"/>
                         </a:rPr>
-                        <a:t>O item apagado não deve aparecer na página. </a:t>
+                        <a:t>Deve conter um código (identificador único), um nome, </a:t>
                       </a:r>
-                    </a:p>
-                    <a:p>
                       <a:r>
-                        <a:rPr lang="pt-BR" sz="1800" kern="1200" dirty="0">
+                        <a:rPr lang="pt-BR" sz="1800" b="0" kern="1200" dirty="0" err="1">
                           <a:solidFill>
                             <a:srgbClr val="DBA1A1"/>
                           </a:solidFill>
@@ -9618,12 +9048,10 @@
                           <a:ea typeface="+mn-ea"/>
                           <a:cs typeface="+mn-cs"/>
                         </a:rPr>
-                        <a:t>	Sistema</a:t>
+                        <a:t>Usuario</a:t>
                       </a:r>
-                    </a:p>
-                    <a:p>
                       <a:r>
-                        <a:rPr lang="pt-BR" sz="1800" kern="1200" dirty="0">
+                        <a:rPr lang="pt-BR" sz="1800" b="0" kern="1200" dirty="0">
                           <a:solidFill>
                             <a:srgbClr val="DBA1A1"/>
                           </a:solidFill>
@@ -9632,7 +9060,7 @@
                           <a:ea typeface="+mn-ea"/>
                           <a:cs typeface="+mn-cs"/>
                         </a:rPr>
-                        <a:t>	Obrigatório</a:t>
+                        <a:t>, senha, um perfil(Nutricionista ou Paciente).</a:t>
                       </a:r>
                     </a:p>
                   </a:txBody>
@@ -9680,7 +9108,7 @@
                 </a:tc>
                 <a:extLst>
                   <a:ext uri="{0D108BD9-81ED-4DB2-BD59-A6C34878D82A}">
-                    <a16:rowId xmlns:a16="http://schemas.microsoft.com/office/drawing/2014/main" val="1646411524"/>
+                    <a16:rowId xmlns:a16="http://schemas.microsoft.com/office/drawing/2014/main" val="3582787433"/>
                   </a:ext>
                 </a:extLst>
               </a:tr>
@@ -9691,7 +9119,7 @@
     </p:spTree>
     <p:extLst>
       <p:ext uri="{BB962C8B-B14F-4D97-AF65-F5344CB8AC3E}">
-        <p14:creationId xmlns:p14="http://schemas.microsoft.com/office/powerpoint/2010/main" val="608110467"/>
+        <p14:creationId xmlns:p14="http://schemas.microsoft.com/office/powerpoint/2010/main" val="810491549"/>
       </p:ext>
     </p:extLst>
   </p:cSld>

</xml_diff>